<commit_message>
slides overhaul done and dropped erroneous code on notebook
</commit_message>
<xml_diff>
--- a/Phase_1_Project Slides.pptx
+++ b/Phase_1_Project Slides.pptx
@@ -7,16 +7,18 @@
   <p:sldIdLst>
     <p:sldId id="257" r:id="rId5"/>
     <p:sldId id="259" r:id="rId6"/>
-    <p:sldId id="260" r:id="rId7"/>
-    <p:sldId id="261" r:id="rId8"/>
-    <p:sldId id="262" r:id="rId9"/>
-    <p:sldId id="263" r:id="rId10"/>
-    <p:sldId id="264" r:id="rId11"/>
-    <p:sldId id="265" r:id="rId12"/>
-    <p:sldId id="266" r:id="rId13"/>
-    <p:sldId id="267" r:id="rId14"/>
-    <p:sldId id="268" r:id="rId15"/>
-    <p:sldId id="270" r:id="rId16"/>
+    <p:sldId id="261" r:id="rId7"/>
+    <p:sldId id="262" r:id="rId8"/>
+    <p:sldId id="263" r:id="rId9"/>
+    <p:sldId id="266" r:id="rId10"/>
+    <p:sldId id="271" r:id="rId11"/>
+    <p:sldId id="264" r:id="rId12"/>
+    <p:sldId id="272" r:id="rId13"/>
+    <p:sldId id="265" r:id="rId14"/>
+    <p:sldId id="273" r:id="rId15"/>
+    <p:sldId id="267" r:id="rId16"/>
+    <p:sldId id="268" r:id="rId17"/>
+    <p:sldId id="270" r:id="rId18"/>
   </p:sldIdLst>
   <p:sldSz cx="12192000" cy="6858000"/>
   <p:notesSz cx="6858000" cy="9144000"/>
@@ -367,7 +369,7 @@
           <a:p>
             <a:fld id="{9184DA70-C731-4C70-880D-CCD4705E623C}" type="datetime1">
               <a:rPr lang="en-US" smtClean="0"/>
-              <a:t>11/21/2024</a:t>
+              <a:t>11/23/2024</a:t>
             </a:fld>
             <a:endParaRPr lang="en-US" dirty="0"/>
           </a:p>
@@ -555,7 +557,7 @@
           <a:p>
             <a:fld id="{B612A279-0833-481D-8C56-F67FD0AC6C50}" type="datetime1">
               <a:rPr lang="en-US" smtClean="0"/>
-              <a:t>11/21/2024</a:t>
+              <a:t>11/23/2024</a:t>
             </a:fld>
             <a:endParaRPr lang="en-US" dirty="0"/>
           </a:p>
@@ -797,7 +799,7 @@
           <a:p>
             <a:fld id="{6587DA83-5663-4C9C-B9AA-0B40A3DAFF81}" type="datetime1">
               <a:rPr lang="en-US" smtClean="0"/>
-              <a:t>11/21/2024</a:t>
+              <a:t>11/23/2024</a:t>
             </a:fld>
             <a:endParaRPr lang="en-US" dirty="0"/>
           </a:p>
@@ -985,7 +987,7 @@
           <a:p>
             <a:fld id="{4BE1D723-8F53-4F53-90B0-1982A396982E}" type="datetime1">
               <a:rPr lang="en-US" smtClean="0"/>
-              <a:t>11/21/2024</a:t>
+              <a:t>11/23/2024</a:t>
             </a:fld>
             <a:endParaRPr lang="en-US" dirty="0"/>
           </a:p>
@@ -1358,7 +1360,7 @@
           <a:p>
             <a:fld id="{97669AF7-7BEB-44E4-9852-375E34362B5B}" type="datetime1">
               <a:rPr lang="en-US" smtClean="0"/>
-              <a:t>11/21/2024</a:t>
+              <a:t>11/23/2024</a:t>
             </a:fld>
             <a:endParaRPr lang="en-US" dirty="0"/>
           </a:p>
@@ -1613,7 +1615,7 @@
           <a:p>
             <a:fld id="{BAAAC38D-0552-4C82-B593-E6124DFADBE2}" type="datetime1">
               <a:rPr lang="en-US" smtClean="0"/>
-              <a:t>11/21/2024</a:t>
+              <a:t>11/23/2024</a:t>
             </a:fld>
             <a:endParaRPr lang="en-US" dirty="0"/>
           </a:p>
@@ -2010,7 +2012,7 @@
           <a:p>
             <a:fld id="{D9DF0F1C-5577-4ACB-BB62-DF8F3C494C7E}" type="datetime1">
               <a:rPr lang="en-US" smtClean="0"/>
-              <a:t>11/21/2024</a:t>
+              <a:t>11/23/2024</a:t>
             </a:fld>
             <a:endParaRPr lang="en-US" dirty="0"/>
           </a:p>
@@ -2146,7 +2148,7 @@
           <a:p>
             <a:fld id="{1775B394-D9F9-4F0C-B15D-605F45CB9E9F}" type="datetime1">
               <a:rPr lang="en-US" smtClean="0"/>
-              <a:t>11/21/2024</a:t>
+              <a:t>11/23/2024</a:t>
             </a:fld>
             <a:endParaRPr lang="en-US" dirty="0"/>
           </a:p>
@@ -2303,7 +2305,7 @@
           <a:p>
             <a:fld id="{39667345-2558-425A-8533-9BFDBCE15005}" type="datetime1">
               <a:rPr lang="en-US" smtClean="0"/>
-              <a:t>11/21/2024</a:t>
+              <a:t>11/23/2024</a:t>
             </a:fld>
             <a:endParaRPr lang="en-US" dirty="0"/>
           </a:p>
@@ -2632,7 +2634,7 @@
           <a:p>
             <a:fld id="{92BEA474-078D-4E9B-9B14-09A87B19DC46}" type="datetime1">
               <a:rPr lang="en-US" smtClean="0"/>
-              <a:t>11/21/2024</a:t>
+              <a:t>11/23/2024</a:t>
             </a:fld>
             <a:endParaRPr lang="en-US" dirty="0"/>
           </a:p>
@@ -2982,7 +2984,7 @@
           <a:p>
             <a:fld id="{4907D986-8816-4272-A432-0437A28A9828}" type="datetime1">
               <a:rPr lang="en-US" smtClean="0"/>
-              <a:t>11/21/2024</a:t>
+              <a:t>11/23/2024</a:t>
             </a:fld>
             <a:endParaRPr lang="en-US" dirty="0"/>
           </a:p>
@@ -3243,7 +3245,7 @@
           <a:p>
             <a:fld id="{62D6E202-B606-4609-B914-27C9371A1F6D}" type="datetime1">
               <a:rPr lang="en-US" smtClean="0"/>
-              <a:t>11/21/2024</a:t>
+              <a:t>11/23/2024</a:t>
             </a:fld>
             <a:endParaRPr lang="en-US" dirty="0"/>
           </a:p>
@@ -4096,7 +4098,7 @@
           <p:cNvPr id="2" name="Title 1">
             <a:extLst>
               <a:ext uri="{FF2B5EF4-FFF2-40B4-BE49-F238E27FC236}">
-                <a16:creationId xmlns:a16="http://schemas.microsoft.com/office/drawing/2014/main" id="{00514E30-3524-FB92-0DA0-DA81FD42CDB1}"/>
+                <a16:creationId xmlns:a16="http://schemas.microsoft.com/office/drawing/2014/main" id="{E7E5987C-9491-6E52-B18C-F534C1DB8E17}"/>
               </a:ext>
             </a:extLst>
           </p:cNvPr>
@@ -4110,7 +4112,7 @@
         <p:spPr/>
         <p:txBody>
           <a:bodyPr>
-            <a:normAutofit/>
+            <a:noAutofit/>
           </a:bodyPr>
           <a:lstStyle/>
           <a:p>
@@ -4120,7 +4122,7 @@
                 <a:ea typeface="Roboto" panose="02000000000000000000" pitchFamily="2" charset="0"/>
                 <a:cs typeface="Roboto" panose="02000000000000000000" pitchFamily="2" charset="0"/>
               </a:rPr>
-              <a:t>Recommendations</a:t>
+              <a:t>Data Analysis - Safety by Engine Configuration</a:t>
             </a:r>
           </a:p>
         </p:txBody>
@@ -4130,7 +4132,7 @@
           <p:cNvPr id="3" name="Content Placeholder 2">
             <a:extLst>
               <a:ext uri="{FF2B5EF4-FFF2-40B4-BE49-F238E27FC236}">
-                <a16:creationId xmlns:a16="http://schemas.microsoft.com/office/drawing/2014/main" id="{DC64E229-FD46-3D0A-7D99-7DA246770BB9}"/>
+                <a16:creationId xmlns:a16="http://schemas.microsoft.com/office/drawing/2014/main" id="{5EE906AE-F47E-F035-9CDA-726C8C4F13C2}"/>
               </a:ext>
             </a:extLst>
           </p:cNvPr>
@@ -4143,114 +4145,69 @@
         </p:nvSpPr>
         <p:spPr/>
         <p:txBody>
-          <a:bodyPr>
-            <a:normAutofit fontScale="92500"/>
-          </a:bodyPr>
-          <a:lstStyle/>
-          <a:p>
-            <a:pPr>
-              <a:buFont typeface="+mj-lt"/>
-              <a:buAutoNum type="arabicPeriod"/>
-            </a:pPr>
+          <a:bodyPr/>
+          <a:lstStyle/>
+          <a:p>
             <a:r>
               <a:rPr lang="en-US" sz="2400" b="1" dirty="0">
                 <a:latin typeface="Arial" panose="020B0604020202020204" pitchFamily="34" charset="0"/>
                 <a:cs typeface="Arial" panose="020B0604020202020204" pitchFamily="34" charset="0"/>
               </a:rPr>
-              <a:t>Focus on Proven Safe Models</a:t>
+              <a:t>Visualization</a:t>
             </a:r>
             <a:r>
               <a:rPr lang="en-US" sz="2400" dirty="0">
                 <a:latin typeface="Arial" panose="020B0604020202020204" pitchFamily="34" charset="0"/>
                 <a:cs typeface="Arial" panose="020B0604020202020204" pitchFamily="34" charset="0"/>
               </a:rPr>
-              <a:t>:</a:t>
-            </a:r>
-          </a:p>
-          <a:p>
-            <a:pPr marL="742950" lvl="1" indent="-285750">
-              <a:buFont typeface="+mj-lt"/>
-              <a:buAutoNum type="arabicPeriod"/>
+              <a:t>: </a:t>
+            </a:r>
+            <a:r>
+              <a:rPr lang="en-US" sz="2400" i="1" dirty="0">
+                <a:latin typeface="Arial" panose="020B0604020202020204" pitchFamily="34" charset="0"/>
+                <a:cs typeface="Arial" panose="020B0604020202020204" pitchFamily="34" charset="0"/>
+              </a:rPr>
+              <a:t>Fatality Rate by Number of Engines (Bar Chart)</a:t>
+            </a:r>
+            <a:endParaRPr lang="en-US" sz="2400" dirty="0">
+              <a:latin typeface="Arial" panose="020B0604020202020204" pitchFamily="34" charset="0"/>
+              <a:cs typeface="Arial" panose="020B0604020202020204" pitchFamily="34" charset="0"/>
+            </a:endParaRPr>
+          </a:p>
+          <a:p>
+            <a:pPr>
+              <a:buFont typeface="Arial" panose="020B0604020202020204" pitchFamily="34" charset="0"/>
+              <a:buChar char="•"/>
             </a:pPr>
+            <a:r>
+              <a:rPr lang="en-US" sz="2400" b="1" dirty="0">
+                <a:latin typeface="Arial" panose="020B0604020202020204" pitchFamily="34" charset="0"/>
+                <a:cs typeface="Arial" panose="020B0604020202020204" pitchFamily="34" charset="0"/>
+              </a:rPr>
+              <a:t>Key Insight</a:t>
+            </a:r>
             <a:r>
               <a:rPr lang="en-US" sz="2400" dirty="0">
                 <a:latin typeface="Arial" panose="020B0604020202020204" pitchFamily="34" charset="0"/>
                 <a:cs typeface="Arial" panose="020B0604020202020204" pitchFamily="34" charset="0"/>
               </a:rPr>
-              <a:t>Select aircraft like modern iterations of Boeing and Airbus models with strong safety records.</a:t>
-            </a:r>
-          </a:p>
-          <a:p>
-            <a:pPr>
-              <a:buFont typeface="+mj-lt"/>
-              <a:buAutoNum type="arabicPeriod"/>
-            </a:pPr>
+              <a:t>: Multi-engine aircraft have lower fatality rates than single-engine aircraft, emphasizing the safety of redundancy.</a:t>
+            </a:r>
+          </a:p>
+          <a:p>
             <a:r>
               <a:rPr lang="en-US" sz="2400" b="1" dirty="0">
                 <a:latin typeface="Arial" panose="020B0604020202020204" pitchFamily="34" charset="0"/>
                 <a:cs typeface="Arial" panose="020B0604020202020204" pitchFamily="34" charset="0"/>
               </a:rPr>
-              <a:t>Emphasize Multi-Engine Aircraft</a:t>
+              <a:t>Business Recommendation</a:t>
             </a:r>
             <a:r>
               <a:rPr lang="en-US" sz="2400" dirty="0">
                 <a:latin typeface="Arial" panose="020B0604020202020204" pitchFamily="34" charset="0"/>
                 <a:cs typeface="Arial" panose="020B0604020202020204" pitchFamily="34" charset="0"/>
               </a:rPr>
-              <a:t>:</a:t>
-            </a:r>
-          </a:p>
-          <a:p>
-            <a:pPr marL="742950" lvl="1" indent="-285750">
-              <a:buFont typeface="+mj-lt"/>
-              <a:buAutoNum type="arabicPeriod"/>
-            </a:pPr>
-            <a:r>
-              <a:rPr lang="en-US" sz="2400" dirty="0">
-                <a:latin typeface="Arial" panose="020B0604020202020204" pitchFamily="34" charset="0"/>
-                <a:cs typeface="Arial" panose="020B0604020202020204" pitchFamily="34" charset="0"/>
-              </a:rPr>
-              <a:t>Multi-engine redundancy enhances safety for high-stakes and commercial operations.</a:t>
-            </a:r>
-          </a:p>
-          <a:p>
-            <a:pPr>
-              <a:buFont typeface="+mj-lt"/>
-              <a:buAutoNum type="arabicPeriod"/>
-            </a:pPr>
-            <a:r>
-              <a:rPr lang="en-US" sz="2400" b="1" dirty="0">
-                <a:latin typeface="Arial" panose="020B0604020202020204" pitchFamily="34" charset="0"/>
-                <a:cs typeface="Arial" panose="020B0604020202020204" pitchFamily="34" charset="0"/>
-              </a:rPr>
-              <a:t>Invest in Technology</a:t>
-            </a:r>
-            <a:r>
-              <a:rPr lang="en-US" sz="2400" dirty="0">
-                <a:latin typeface="Arial" panose="020B0604020202020204" pitchFamily="34" charset="0"/>
-                <a:cs typeface="Arial" panose="020B0604020202020204" pitchFamily="34" charset="0"/>
-              </a:rPr>
-              <a:t>:</a:t>
-            </a:r>
-          </a:p>
-          <a:p>
-            <a:pPr marL="742950" lvl="1" indent="-285750">
-              <a:buFont typeface="+mj-lt"/>
-              <a:buAutoNum type="arabicPeriod"/>
-            </a:pPr>
-            <a:r>
-              <a:rPr lang="en-US" sz="2400" dirty="0" err="1">
-                <a:latin typeface="Arial" panose="020B0604020202020204" pitchFamily="34" charset="0"/>
-                <a:cs typeface="Arial" panose="020B0604020202020204" pitchFamily="34" charset="0"/>
-              </a:rPr>
-              <a:t>Opt</a:t>
-            </a:r>
-            <a:r>
-              <a:rPr lang="en-US" sz="2400" dirty="0">
-                <a:latin typeface="Arial" panose="020B0604020202020204" pitchFamily="34" charset="0"/>
-                <a:cs typeface="Arial" panose="020B0604020202020204" pitchFamily="34" charset="0"/>
-              </a:rPr>
-              <a:t> for aircraft with advanced weather detection and automation features.</a:t>
+              <a:t>: Prioritize multi-engine aircraft for high-stakes commercial operations.</a:t>
             </a:r>
           </a:p>
           <a:p>
@@ -4261,7 +4218,7 @@
     </p:spTree>
     <p:extLst>
       <p:ext uri="{BB962C8B-B14F-4D97-AF65-F5344CB8AC3E}">
-        <p14:creationId xmlns:p14="http://schemas.microsoft.com/office/powerpoint/2010/main" val="3561342553"/>
+        <p14:creationId xmlns:p14="http://schemas.microsoft.com/office/powerpoint/2010/main" val="4113656350"/>
       </p:ext>
     </p:extLst>
   </p:cSld>
@@ -4288,115 +4245,40 @@
           <a:chExt cx="0" cy="0"/>
         </a:xfrm>
       </p:grpSpPr>
-      <p:sp>
-        <p:nvSpPr>
-          <p:cNvPr id="2" name="Title 1">
+      <p:pic>
+        <p:nvPicPr>
+          <p:cNvPr id="3" name="Picture 2">
             <a:extLst>
               <a:ext uri="{FF2B5EF4-FFF2-40B4-BE49-F238E27FC236}">
-                <a16:creationId xmlns:a16="http://schemas.microsoft.com/office/drawing/2014/main" id="{74592DD9-94CD-F2D4-641D-92250202CD8D}"/>
+                <a16:creationId xmlns:a16="http://schemas.microsoft.com/office/drawing/2014/main" id="{2315E7CB-FA88-31E9-EE40-61493227B415}"/>
               </a:ext>
             </a:extLst>
           </p:cNvPr>
-          <p:cNvSpPr>
-            <a:spLocks noGrp="1"/>
-          </p:cNvSpPr>
-          <p:nvPr>
-            <p:ph type="title"/>
-          </p:nvPr>
-        </p:nvSpPr>
-        <p:spPr/>
-        <p:txBody>
-          <a:bodyPr/>
-          <a:lstStyle/>
-          <a:p>
-            <a:r>
-              <a:rPr lang="en-US" sz="5400" dirty="0">
-                <a:latin typeface="Roboto" panose="02000000000000000000" pitchFamily="2" charset="0"/>
-                <a:ea typeface="Roboto" panose="02000000000000000000" pitchFamily="2" charset="0"/>
-                <a:cs typeface="Roboto" panose="02000000000000000000" pitchFamily="2" charset="0"/>
-              </a:rPr>
-              <a:t>Next</a:t>
-            </a:r>
-            <a:r>
-              <a:rPr lang="en-US" dirty="0"/>
-              <a:t> </a:t>
-            </a:r>
-            <a:r>
-              <a:rPr lang="en-US" sz="5400" dirty="0">
-                <a:latin typeface="Roboto" panose="02000000000000000000" pitchFamily="2" charset="0"/>
-                <a:ea typeface="Roboto" panose="02000000000000000000" pitchFamily="2" charset="0"/>
-                <a:cs typeface="Roboto" panose="02000000000000000000" pitchFamily="2" charset="0"/>
-              </a:rPr>
-              <a:t>Steps</a:t>
-            </a:r>
-          </a:p>
-        </p:txBody>
-      </p:sp>
-      <p:sp>
-        <p:nvSpPr>
-          <p:cNvPr id="3" name="Content Placeholder 2">
-            <a:extLst>
-              <a:ext uri="{FF2B5EF4-FFF2-40B4-BE49-F238E27FC236}">
-                <a16:creationId xmlns:a16="http://schemas.microsoft.com/office/drawing/2014/main" id="{C0FFBAA3-05B9-9C50-2A82-98A0EDC78671}"/>
-              </a:ext>
-            </a:extLst>
-          </p:cNvPr>
-          <p:cNvSpPr>
-            <a:spLocks noGrp="1"/>
-          </p:cNvSpPr>
-          <p:nvPr>
-            <p:ph idx="1"/>
-          </p:nvPr>
-        </p:nvSpPr>
-        <p:spPr/>
-        <p:txBody>
-          <a:bodyPr/>
-          <a:lstStyle/>
-          <a:p>
-            <a:pPr marL="514350" indent="-514350">
-              <a:buAutoNum type="arabicPeriod"/>
-            </a:pPr>
-            <a:r>
-              <a:rPr lang="en-US" sz="2400" dirty="0">
-                <a:latin typeface="Arial" panose="020B0604020202020204" pitchFamily="34" charset="0"/>
-                <a:cs typeface="Arial" panose="020B0604020202020204" pitchFamily="34" charset="0"/>
-              </a:rPr>
-              <a:t>Further evaluate specific aircraft models for operational feasibility and financial viability</a:t>
-            </a:r>
-          </a:p>
-          <a:p>
-            <a:pPr marL="514350" indent="-514350">
-              <a:buAutoNum type="arabicPeriod"/>
-            </a:pPr>
-            <a:r>
-              <a:rPr lang="en-US" sz="2400" dirty="0">
-                <a:latin typeface="Arial" panose="020B0604020202020204" pitchFamily="34" charset="0"/>
-                <a:cs typeface="Arial" panose="020B0604020202020204" pitchFamily="34" charset="0"/>
-              </a:rPr>
-              <a:t>Collaborate with manufacturers for detailed safety reports</a:t>
-            </a:r>
-          </a:p>
-          <a:p>
-            <a:pPr marL="514350" indent="-514350">
-              <a:buAutoNum type="arabicPeriod"/>
-            </a:pPr>
-            <a:r>
-              <a:rPr lang="en-US" sz="2400" dirty="0">
-                <a:latin typeface="Arial" panose="020B0604020202020204" pitchFamily="34" charset="0"/>
-                <a:cs typeface="Arial" panose="020B0604020202020204" pitchFamily="34" charset="0"/>
-              </a:rPr>
-              <a:t>Begin procurement of recommended aircraft models.</a:t>
-            </a:r>
-          </a:p>
-          <a:p>
-            <a:endParaRPr lang="en-US" dirty="0"/>
-          </a:p>
-        </p:txBody>
-      </p:sp>
+          <p:cNvPicPr>
+            <a:picLocks noChangeAspect="1"/>
+          </p:cNvPicPr>
+          <p:nvPr/>
+        </p:nvPicPr>
+        <p:blipFill>
+          <a:blip r:embed="rId2"/>
+          <a:stretch>
+            <a:fillRect/>
+          </a:stretch>
+        </p:blipFill>
+        <p:spPr>
+          <a:xfrm>
+            <a:off x="2762250" y="1200150"/>
+            <a:ext cx="6667500" cy="4457700"/>
+          </a:xfrm>
+          <a:prstGeom prst="rect">
+            <a:avLst/>
+          </a:prstGeom>
+        </p:spPr>
+      </p:pic>
     </p:spTree>
     <p:extLst>
       <p:ext uri="{BB962C8B-B14F-4D97-AF65-F5344CB8AC3E}">
-        <p14:creationId xmlns:p14="http://schemas.microsoft.com/office/powerpoint/2010/main" val="589155919"/>
+        <p14:creationId xmlns:p14="http://schemas.microsoft.com/office/powerpoint/2010/main" val="488264841"/>
       </p:ext>
     </p:extLst>
   </p:cSld>
@@ -4428,6 +4310,339 @@
           <p:cNvPr id="2" name="Title 1">
             <a:extLst>
               <a:ext uri="{FF2B5EF4-FFF2-40B4-BE49-F238E27FC236}">
+                <a16:creationId xmlns:a16="http://schemas.microsoft.com/office/drawing/2014/main" id="{00514E30-3524-FB92-0DA0-DA81FD42CDB1}"/>
+              </a:ext>
+            </a:extLst>
+          </p:cNvPr>
+          <p:cNvSpPr>
+            <a:spLocks noGrp="1"/>
+          </p:cNvSpPr>
+          <p:nvPr>
+            <p:ph type="title"/>
+          </p:nvPr>
+        </p:nvSpPr>
+        <p:spPr/>
+        <p:txBody>
+          <a:bodyPr>
+            <a:normAutofit/>
+          </a:bodyPr>
+          <a:lstStyle/>
+          <a:p>
+            <a:r>
+              <a:rPr lang="en-US" sz="5400" dirty="0">
+                <a:latin typeface="Roboto" panose="02000000000000000000" pitchFamily="2" charset="0"/>
+                <a:ea typeface="Roboto" panose="02000000000000000000" pitchFamily="2" charset="0"/>
+                <a:cs typeface="Roboto" panose="02000000000000000000" pitchFamily="2" charset="0"/>
+              </a:rPr>
+              <a:t>Recommendations</a:t>
+            </a:r>
+          </a:p>
+        </p:txBody>
+      </p:sp>
+      <p:sp>
+        <p:nvSpPr>
+          <p:cNvPr id="3" name="Content Placeholder 2">
+            <a:extLst>
+              <a:ext uri="{FF2B5EF4-FFF2-40B4-BE49-F238E27FC236}">
+                <a16:creationId xmlns:a16="http://schemas.microsoft.com/office/drawing/2014/main" id="{DC64E229-FD46-3D0A-7D99-7DA246770BB9}"/>
+              </a:ext>
+            </a:extLst>
+          </p:cNvPr>
+          <p:cNvSpPr>
+            <a:spLocks noGrp="1"/>
+          </p:cNvSpPr>
+          <p:nvPr>
+            <p:ph idx="1"/>
+          </p:nvPr>
+        </p:nvSpPr>
+        <p:spPr/>
+        <p:txBody>
+          <a:bodyPr>
+            <a:normAutofit fontScale="92500"/>
+          </a:bodyPr>
+          <a:lstStyle/>
+          <a:p>
+            <a:pPr>
+              <a:buFont typeface="+mj-lt"/>
+              <a:buAutoNum type="arabicPeriod"/>
+            </a:pPr>
+            <a:r>
+              <a:rPr lang="en-US" sz="2400" b="1" dirty="0">
+                <a:latin typeface="Arial" panose="020B0604020202020204" pitchFamily="34" charset="0"/>
+                <a:cs typeface="Arial" panose="020B0604020202020204" pitchFamily="34" charset="0"/>
+              </a:rPr>
+              <a:t>Focus on Proven Safe Models</a:t>
+            </a:r>
+            <a:r>
+              <a:rPr lang="en-US" sz="2400" dirty="0">
+                <a:latin typeface="Arial" panose="020B0604020202020204" pitchFamily="34" charset="0"/>
+                <a:cs typeface="Arial" panose="020B0604020202020204" pitchFamily="34" charset="0"/>
+              </a:rPr>
+              <a:t>:</a:t>
+            </a:r>
+          </a:p>
+          <a:p>
+            <a:pPr marL="457200" lvl="1" indent="0">
+              <a:buNone/>
+            </a:pPr>
+            <a:r>
+              <a:rPr lang="en-US" sz="2400" dirty="0">
+                <a:latin typeface="Arial" panose="020B0604020202020204" pitchFamily="34" charset="0"/>
+                <a:cs typeface="Arial" panose="020B0604020202020204" pitchFamily="34" charset="0"/>
+              </a:rPr>
+              <a:t> Select aircraft like modern iterations of Boeing and Airbus models with strong safety records.</a:t>
+            </a:r>
+          </a:p>
+          <a:p>
+            <a:pPr>
+              <a:buFont typeface="+mj-lt"/>
+              <a:buAutoNum type="arabicPeriod"/>
+            </a:pPr>
+            <a:r>
+              <a:rPr lang="en-US" sz="2400" b="1" dirty="0">
+                <a:latin typeface="Arial" panose="020B0604020202020204" pitchFamily="34" charset="0"/>
+                <a:cs typeface="Arial" panose="020B0604020202020204" pitchFamily="34" charset="0"/>
+              </a:rPr>
+              <a:t>Emphasize on Multi-Engine Aircraft</a:t>
+            </a:r>
+            <a:r>
+              <a:rPr lang="en-US" sz="2400" dirty="0">
+                <a:latin typeface="Arial" panose="020B0604020202020204" pitchFamily="34" charset="0"/>
+                <a:cs typeface="Arial" panose="020B0604020202020204" pitchFamily="34" charset="0"/>
+              </a:rPr>
+              <a:t>:</a:t>
+            </a:r>
+          </a:p>
+          <a:p>
+            <a:pPr marL="457200" lvl="1" indent="0">
+              <a:buNone/>
+            </a:pPr>
+            <a:r>
+              <a:rPr lang="en-US" sz="2400" dirty="0">
+                <a:latin typeface="Arial" panose="020B0604020202020204" pitchFamily="34" charset="0"/>
+                <a:cs typeface="Arial" panose="020B0604020202020204" pitchFamily="34" charset="0"/>
+              </a:rPr>
+              <a:t>Multi-engine redundancy enhances safety for high-stakes and commercial operations.</a:t>
+            </a:r>
+          </a:p>
+          <a:p>
+            <a:pPr>
+              <a:buFont typeface="+mj-lt"/>
+              <a:buAutoNum type="arabicPeriod"/>
+            </a:pPr>
+            <a:r>
+              <a:rPr lang="en-US" sz="2400" b="1" dirty="0">
+                <a:latin typeface="Arial" panose="020B0604020202020204" pitchFamily="34" charset="0"/>
+                <a:cs typeface="Arial" panose="020B0604020202020204" pitchFamily="34" charset="0"/>
+              </a:rPr>
+              <a:t>Invest in Technology</a:t>
+            </a:r>
+            <a:r>
+              <a:rPr lang="en-US" sz="2400" dirty="0">
+                <a:latin typeface="Arial" panose="020B0604020202020204" pitchFamily="34" charset="0"/>
+                <a:cs typeface="Arial" panose="020B0604020202020204" pitchFamily="34" charset="0"/>
+              </a:rPr>
+              <a:t>:</a:t>
+            </a:r>
+          </a:p>
+          <a:p>
+            <a:pPr marL="457200" lvl="1" indent="0">
+              <a:buNone/>
+            </a:pPr>
+            <a:r>
+              <a:rPr lang="en-US" sz="2400" dirty="0" err="1">
+                <a:latin typeface="Arial" panose="020B0604020202020204" pitchFamily="34" charset="0"/>
+                <a:cs typeface="Arial" panose="020B0604020202020204" pitchFamily="34" charset="0"/>
+              </a:rPr>
+              <a:t>Opt</a:t>
+            </a:r>
+            <a:r>
+              <a:rPr lang="en-US" sz="2400" dirty="0">
+                <a:latin typeface="Arial" panose="020B0604020202020204" pitchFamily="34" charset="0"/>
+                <a:cs typeface="Arial" panose="020B0604020202020204" pitchFamily="34" charset="0"/>
+              </a:rPr>
+              <a:t> for aircraft with advanced weather detection and automation features.</a:t>
+            </a:r>
+          </a:p>
+          <a:p>
+            <a:endParaRPr lang="en-US" dirty="0"/>
+          </a:p>
+        </p:txBody>
+      </p:sp>
+    </p:spTree>
+    <p:extLst>
+      <p:ext uri="{BB962C8B-B14F-4D97-AF65-F5344CB8AC3E}">
+        <p14:creationId xmlns:p14="http://schemas.microsoft.com/office/powerpoint/2010/main" val="3561342553"/>
+      </p:ext>
+    </p:extLst>
+  </p:cSld>
+  <p:clrMapOvr>
+    <a:masterClrMapping/>
+  </p:clrMapOvr>
+</p:sld>
+</file>
+
+<file path=ppt/slides/slide13.xml><?xml version="1.0" encoding="utf-8"?>
+<p:sld xmlns:a="http://schemas.openxmlformats.org/drawingml/2006/main" xmlns:r="http://schemas.openxmlformats.org/officeDocument/2006/relationships" xmlns:p="http://schemas.openxmlformats.org/presentationml/2006/main">
+  <p:cSld>
+    <p:spTree>
+      <p:nvGrpSpPr>
+        <p:cNvPr id="1" name=""/>
+        <p:cNvGrpSpPr/>
+        <p:nvPr/>
+      </p:nvGrpSpPr>
+      <p:grpSpPr>
+        <a:xfrm>
+          <a:off x="0" y="0"/>
+          <a:ext cx="0" cy="0"/>
+          <a:chOff x="0" y="0"/>
+          <a:chExt cx="0" cy="0"/>
+        </a:xfrm>
+      </p:grpSpPr>
+      <p:sp>
+        <p:nvSpPr>
+          <p:cNvPr id="2" name="Title 1">
+            <a:extLst>
+              <a:ext uri="{FF2B5EF4-FFF2-40B4-BE49-F238E27FC236}">
+                <a16:creationId xmlns:a16="http://schemas.microsoft.com/office/drawing/2014/main" id="{74592DD9-94CD-F2D4-641D-92250202CD8D}"/>
+              </a:ext>
+            </a:extLst>
+          </p:cNvPr>
+          <p:cNvSpPr>
+            <a:spLocks noGrp="1"/>
+          </p:cNvSpPr>
+          <p:nvPr>
+            <p:ph type="title"/>
+          </p:nvPr>
+        </p:nvSpPr>
+        <p:spPr/>
+        <p:txBody>
+          <a:bodyPr/>
+          <a:lstStyle/>
+          <a:p>
+            <a:r>
+              <a:rPr lang="en-US" sz="5400" dirty="0">
+                <a:latin typeface="Roboto" panose="02000000000000000000" pitchFamily="2" charset="0"/>
+                <a:ea typeface="Roboto" panose="02000000000000000000" pitchFamily="2" charset="0"/>
+                <a:cs typeface="Roboto" panose="02000000000000000000" pitchFamily="2" charset="0"/>
+              </a:rPr>
+              <a:t>Next</a:t>
+            </a:r>
+            <a:r>
+              <a:rPr lang="en-US" dirty="0"/>
+              <a:t> </a:t>
+            </a:r>
+            <a:r>
+              <a:rPr lang="en-US" sz="5400" dirty="0">
+                <a:latin typeface="Roboto" panose="02000000000000000000" pitchFamily="2" charset="0"/>
+                <a:ea typeface="Roboto" panose="02000000000000000000" pitchFamily="2" charset="0"/>
+                <a:cs typeface="Roboto" panose="02000000000000000000" pitchFamily="2" charset="0"/>
+              </a:rPr>
+              <a:t>Steps</a:t>
+            </a:r>
+          </a:p>
+        </p:txBody>
+      </p:sp>
+      <p:sp>
+        <p:nvSpPr>
+          <p:cNvPr id="3" name="Content Placeholder 2">
+            <a:extLst>
+              <a:ext uri="{FF2B5EF4-FFF2-40B4-BE49-F238E27FC236}">
+                <a16:creationId xmlns:a16="http://schemas.microsoft.com/office/drawing/2014/main" id="{C0FFBAA3-05B9-9C50-2A82-98A0EDC78671}"/>
+              </a:ext>
+            </a:extLst>
+          </p:cNvPr>
+          <p:cNvSpPr>
+            <a:spLocks noGrp="1"/>
+          </p:cNvSpPr>
+          <p:nvPr>
+            <p:ph idx="1"/>
+          </p:nvPr>
+        </p:nvSpPr>
+        <p:spPr/>
+        <p:txBody>
+          <a:bodyPr/>
+          <a:lstStyle/>
+          <a:p>
+            <a:r>
+              <a:rPr lang="en-US" b="1" dirty="0"/>
+              <a:t>Deep Dive into Top Models: </a:t>
+            </a:r>
+            <a:r>
+              <a:rPr lang="en-US" dirty="0"/>
+              <a:t>Conduct safety and reliability assessments for frequently used aircraft models.</a:t>
+            </a:r>
+          </a:p>
+          <a:p>
+            <a:r>
+              <a:rPr lang="en-US" b="1" dirty="0"/>
+              <a:t>Pilot Program for Multi-Engine Aircraft: </a:t>
+            </a:r>
+            <a:r>
+              <a:rPr lang="en-US" dirty="0"/>
+              <a:t>Test the operational and financial performance of multi-engine aircraft in select routes.</a:t>
+            </a:r>
+          </a:p>
+          <a:p>
+            <a:r>
+              <a:rPr lang="en-US" b="1" dirty="0"/>
+              <a:t>Strengthen Safety Culture: </a:t>
+            </a:r>
+            <a:r>
+              <a:rPr lang="en-US" dirty="0"/>
+              <a:t>Enhance training programs and maintenance schedules for high-usage aircraft.</a:t>
+            </a:r>
+          </a:p>
+          <a:p>
+            <a:r>
+              <a:rPr lang="en-US" b="1" dirty="0"/>
+              <a:t>Address Data Gaps: </a:t>
+            </a:r>
+            <a:r>
+              <a:rPr lang="en-US" dirty="0"/>
+              <a:t>Collaborate with aviation authorities to improve weather and accident reporting standards.</a:t>
+            </a:r>
+          </a:p>
+          <a:p>
+            <a:endParaRPr lang="en-US" dirty="0"/>
+          </a:p>
+        </p:txBody>
+      </p:sp>
+    </p:spTree>
+    <p:extLst>
+      <p:ext uri="{BB962C8B-B14F-4D97-AF65-F5344CB8AC3E}">
+        <p14:creationId xmlns:p14="http://schemas.microsoft.com/office/powerpoint/2010/main" val="589155919"/>
+      </p:ext>
+    </p:extLst>
+  </p:cSld>
+  <p:clrMapOvr>
+    <a:masterClrMapping/>
+  </p:clrMapOvr>
+</p:sld>
+</file>
+
+<file path=ppt/slides/slide14.xml><?xml version="1.0" encoding="utf-8"?>
+<p:sld xmlns:a="http://schemas.openxmlformats.org/drawingml/2006/main" xmlns:r="http://schemas.openxmlformats.org/officeDocument/2006/relationships" xmlns:p="http://schemas.openxmlformats.org/presentationml/2006/main">
+  <p:cSld>
+    <p:spTree>
+      <p:nvGrpSpPr>
+        <p:cNvPr id="1" name=""/>
+        <p:cNvGrpSpPr/>
+        <p:nvPr/>
+      </p:nvGrpSpPr>
+      <p:grpSpPr>
+        <a:xfrm>
+          <a:off x="0" y="0"/>
+          <a:ext cx="0" cy="0"/>
+          <a:chOff x="0" y="0"/>
+          <a:chExt cx="0" cy="0"/>
+        </a:xfrm>
+      </p:grpSpPr>
+      <p:sp>
+        <p:nvSpPr>
+          <p:cNvPr id="2" name="Title 1">
+            <a:extLst>
+              <a:ext uri="{FF2B5EF4-FFF2-40B4-BE49-F238E27FC236}">
                 <a16:creationId xmlns:a16="http://schemas.microsoft.com/office/drawing/2014/main" id="{0F38C349-4F17-D401-C6DA-07E04D720100}"/>
               </a:ext>
             </a:extLst>
@@ -4444,6 +4659,7 @@
           <a:bodyPr/>
           <a:lstStyle/>
           <a:p>
+            <a:pPr algn="ctr"/>
             <a:r>
               <a:rPr lang="en-US" dirty="0"/>
               <a:t>Thank You. </a:t>
@@ -4505,18 +4721,11 @@
           </a:p>
           <a:p>
             <a:r>
-              <a:rPr lang="en-US" sz="1400" cap="none" dirty="0" err="1">
-                <a:latin typeface="Arial" panose="020B0604020202020204" pitchFamily="34" charset="0"/>
-                <a:cs typeface="Arial" panose="020B0604020202020204" pitchFamily="34" charset="0"/>
-              </a:rPr>
-              <a:t>Linkedin</a:t>
-            </a:r>
-            <a:r>
               <a:rPr lang="en-US" sz="1400" cap="none" dirty="0">
                 <a:latin typeface="Arial" panose="020B0604020202020204" pitchFamily="34" charset="0"/>
                 <a:cs typeface="Arial" panose="020B0604020202020204" pitchFamily="34" charset="0"/>
               </a:rPr>
-              <a:t> profile: https://www.linkedin.com/in/lydia-mangoa-2b5b68a8?lipi=urn%3Ali%3Apage%3Ad_flagship3_profile_view_base_contact_details%3BsgMVvZ7QTASgptfjPpr2cw%3D%3D</a:t>
+              <a:t>LinkedIn profile: https://www.linkedin.com/in/lydia-mangoa-2b5b68a8?lipi=urn%3Ali%3Apage%3Ad_flagship3_profile_view_base_contact_details%3BsgMVvZ7QTASgptfjPpr2cw%3D%3D</a:t>
             </a:r>
             <a:endParaRPr lang="en-US" sz="1400" dirty="0">
               <a:latin typeface="Arial" panose="020B0604020202020204" pitchFamily="34" charset="0"/>
@@ -4608,278 +4817,69 @@
         <p:spPr/>
         <p:txBody>
           <a:bodyPr>
-            <a:normAutofit lnSpcReduction="10000"/>
+            <a:normAutofit fontScale="85000" lnSpcReduction="20000"/>
           </a:bodyPr>
           <a:lstStyle/>
           <a:p>
-            <a:pPr marL="0" marR="0" lvl="0" indent="0" algn="l" defTabSz="914400" rtl="0" eaLnBrk="0" fontAlgn="base" latinLnBrk="0" hangingPunct="0">
-              <a:lnSpc>
-                <a:spcPct val="100000"/>
-              </a:lnSpc>
-              <a:spcBef>
-                <a:spcPct val="0"/>
-              </a:spcBef>
-              <a:spcAft>
-                <a:spcPct val="0"/>
-              </a:spcAft>
-              <a:buClrTx/>
-              <a:buSzTx/>
-              <a:buNone/>
-              <a:tabLst/>
+            <a:r>
+              <a:rPr lang="en-US" sz="2400" b="1" dirty="0"/>
+              <a:t>Goal</a:t>
+            </a:r>
+            <a:r>
+              <a:rPr lang="en-US" sz="2400" dirty="0"/>
+              <a:t>: </a:t>
+            </a:r>
+          </a:p>
+          <a:p>
+            <a:r>
+              <a:rPr lang="en-US" sz="2400" dirty="0"/>
+              <a:t>Identify low-risk aircraft models for commercial and private operations by analyzing historical aviation accident data.</a:t>
+            </a:r>
+          </a:p>
+          <a:p>
+            <a:r>
+              <a:rPr lang="en-US" sz="2400" b="1" dirty="0"/>
+              <a:t>Objectives</a:t>
+            </a:r>
+            <a:r>
+              <a:rPr lang="en-US" sz="2400" dirty="0"/>
+              <a:t>:</a:t>
+            </a:r>
+          </a:p>
+          <a:p>
+            <a:pPr>
+              <a:buFont typeface="Arial" panose="020B0604020202020204" pitchFamily="34" charset="0"/>
+              <a:buChar char="•"/>
             </a:pPr>
             <a:r>
-              <a:rPr kumimoji="0" lang="en-US" altLang="en-US" sz="2800" b="1" i="1" u="none" strike="noStrike" cap="none" normalizeH="0" baseline="0" dirty="0">
-                <a:ln>
-                  <a:noFill/>
-                </a:ln>
-                <a:solidFill>
-                  <a:schemeClr val="tx1"/>
-                </a:solidFill>
-                <a:effectLst/>
-                <a:latin typeface="Arial" panose="020B0604020202020204" pitchFamily="34" charset="0"/>
-              </a:rPr>
-              <a:t>Goal</a:t>
-            </a:r>
-            <a:r>
-              <a:rPr kumimoji="0" lang="en-US" altLang="en-US" sz="2800" b="0" i="0" u="none" strike="noStrike" cap="none" normalizeH="0" baseline="0" dirty="0">
-                <a:ln>
-                  <a:noFill/>
-                </a:ln>
-                <a:solidFill>
-                  <a:schemeClr val="tx1"/>
-                </a:solidFill>
-                <a:effectLst/>
-                <a:latin typeface="Arial" panose="020B0604020202020204" pitchFamily="34" charset="0"/>
-              </a:rPr>
-              <a:t>: </a:t>
-            </a:r>
-          </a:p>
-          <a:p>
-            <a:pPr marL="0" marR="0" lvl="0" indent="0" algn="l" defTabSz="914400" rtl="0" eaLnBrk="0" fontAlgn="base" latinLnBrk="0" hangingPunct="0">
-              <a:lnSpc>
-                <a:spcPct val="100000"/>
-              </a:lnSpc>
-              <a:spcBef>
-                <a:spcPct val="0"/>
-              </a:spcBef>
-              <a:spcAft>
-                <a:spcPct val="0"/>
-              </a:spcAft>
-              <a:buClrTx/>
-              <a:buSzTx/>
-              <a:buNone/>
-              <a:tabLst/>
+              <a:rPr lang="en-US" sz="2400" dirty="0"/>
+              <a:t>Understand trends in aviation accidents.</a:t>
+            </a:r>
+          </a:p>
+          <a:p>
+            <a:pPr>
+              <a:buFont typeface="Arial" panose="020B0604020202020204" pitchFamily="34" charset="0"/>
+              <a:buChar char="•"/>
             </a:pPr>
             <a:r>
-              <a:rPr kumimoji="0" lang="en-US" altLang="en-US" sz="2800" b="0" i="0" u="none" strike="noStrike" cap="none" normalizeH="0" baseline="0" dirty="0">
-                <a:ln>
-                  <a:noFill/>
-                </a:ln>
-                <a:solidFill>
-                  <a:schemeClr val="tx1"/>
-                </a:solidFill>
-                <a:effectLst/>
-                <a:latin typeface="Arial" panose="020B0604020202020204" pitchFamily="34" charset="0"/>
-              </a:rPr>
-              <a:t>Identify low-risk aircraft models to guide the company’s entry into aviation.</a:t>
-            </a:r>
-          </a:p>
-          <a:p>
-            <a:pPr marL="0" marR="0" lvl="0" indent="0" algn="l" defTabSz="914400" rtl="0" eaLnBrk="0" fontAlgn="base" latinLnBrk="0" hangingPunct="0">
-              <a:lnSpc>
-                <a:spcPct val="100000"/>
-              </a:lnSpc>
-              <a:spcBef>
-                <a:spcPct val="0"/>
-              </a:spcBef>
-              <a:spcAft>
-                <a:spcPct val="0"/>
-              </a:spcAft>
-              <a:buClrTx/>
-              <a:buSzTx/>
-              <a:buFontTx/>
+              <a:rPr lang="en-US" sz="2400" dirty="0"/>
+              <a:t>Evaluate the impact of aircraft design (e.g., engine configurations) on safety.</a:t>
+            </a:r>
+          </a:p>
+          <a:p>
+            <a:pPr>
+              <a:buFont typeface="Arial" panose="020B0604020202020204" pitchFamily="34" charset="0"/>
               <a:buChar char="•"/>
-              <a:tabLst/>
             </a:pPr>
-            <a:endParaRPr kumimoji="0" lang="en-US" altLang="en-US" sz="2800" b="1" i="1" u="none" strike="noStrike" cap="none" normalizeH="0" baseline="0" dirty="0">
-              <a:ln>
-                <a:noFill/>
-              </a:ln>
-              <a:solidFill>
-                <a:schemeClr val="tx1"/>
-              </a:solidFill>
-              <a:effectLst/>
-              <a:latin typeface="Sans Serif Collection" panose="020B0502040504020204" pitchFamily="34" charset="0"/>
-              <a:ea typeface="Sans Serif Collection" panose="020B0502040504020204" pitchFamily="34" charset="0"/>
-              <a:cs typeface="Sans Serif Collection" panose="020B0502040504020204" pitchFamily="34" charset="0"/>
-            </a:endParaRPr>
-          </a:p>
-          <a:p>
-            <a:pPr marL="0" marR="0" lvl="0" indent="0" algn="l" defTabSz="914400" rtl="0" eaLnBrk="0" fontAlgn="base" latinLnBrk="0" hangingPunct="0">
-              <a:lnSpc>
-                <a:spcPct val="100000"/>
-              </a:lnSpc>
-              <a:spcBef>
-                <a:spcPct val="0"/>
-              </a:spcBef>
-              <a:spcAft>
-                <a:spcPct val="0"/>
-              </a:spcAft>
-              <a:buClrTx/>
-              <a:buSzTx/>
-              <a:buFontTx/>
-              <a:buChar char="•"/>
-              <a:tabLst/>
-            </a:pPr>
-            <a:r>
-              <a:rPr kumimoji="0" lang="en-US" altLang="en-US" sz="2800" b="1" i="1" u="none" strike="noStrike" cap="none" normalizeH="0" baseline="0" dirty="0">
-                <a:ln>
-                  <a:noFill/>
-                </a:ln>
-                <a:solidFill>
-                  <a:schemeClr val="tx1"/>
-                </a:solidFill>
-                <a:effectLst/>
-                <a:latin typeface="Arial" panose="020B0604020202020204" pitchFamily="34" charset="0"/>
-              </a:rPr>
-              <a:t>Focus Areas</a:t>
-            </a:r>
-            <a:r>
-              <a:rPr kumimoji="0" lang="en-US" altLang="en-US" sz="2800" b="1" i="0" u="none" strike="noStrike" cap="none" normalizeH="0" baseline="0" dirty="0">
-                <a:ln>
-                  <a:noFill/>
-                </a:ln>
-                <a:solidFill>
-                  <a:schemeClr val="tx1"/>
-                </a:solidFill>
-                <a:effectLst/>
-                <a:latin typeface="Arial" panose="020B0604020202020204" pitchFamily="34" charset="0"/>
-              </a:rPr>
-              <a:t>:</a:t>
-            </a:r>
-          </a:p>
-          <a:p>
-            <a:pPr marL="0" marR="0" lvl="0" indent="0" algn="l" defTabSz="914400" rtl="0" eaLnBrk="0" fontAlgn="base" latinLnBrk="0" hangingPunct="0">
-              <a:lnSpc>
-                <a:spcPct val="100000"/>
-              </a:lnSpc>
-              <a:spcBef>
-                <a:spcPct val="0"/>
-              </a:spcBef>
-              <a:spcAft>
-                <a:spcPct val="0"/>
-              </a:spcAft>
-              <a:buClrTx/>
-              <a:buSzTx/>
-              <a:buFontTx/>
-              <a:buChar char="•"/>
-              <a:tabLst/>
-            </a:pPr>
-            <a:endParaRPr kumimoji="0" lang="en-US" altLang="en-US" sz="2800" b="1" i="0" u="none" strike="noStrike" cap="none" normalizeH="0" baseline="0" dirty="0">
-              <a:ln>
-                <a:noFill/>
-              </a:ln>
-              <a:solidFill>
-                <a:schemeClr val="tx1"/>
-              </a:solidFill>
-              <a:effectLst/>
-              <a:latin typeface="Arial" panose="020B0604020202020204" pitchFamily="34" charset="0"/>
-            </a:endParaRPr>
-          </a:p>
-          <a:p>
-            <a:pPr marL="0" marR="0" lvl="0" indent="0" algn="l" defTabSz="914400" rtl="0" eaLnBrk="0" fontAlgn="base" latinLnBrk="0" hangingPunct="0">
-              <a:lnSpc>
-                <a:spcPct val="100000"/>
-              </a:lnSpc>
-              <a:spcBef>
-                <a:spcPct val="0"/>
-              </a:spcBef>
-              <a:spcAft>
-                <a:spcPct val="0"/>
-              </a:spcAft>
-              <a:buClrTx/>
-              <a:buSzTx/>
-              <a:buFontTx/>
-              <a:buChar char="•"/>
-              <a:tabLst/>
-            </a:pPr>
-            <a:r>
-              <a:rPr kumimoji="0" lang="en-US" altLang="en-US" sz="2800" b="0" i="0" u="none" strike="noStrike" cap="none" normalizeH="0" baseline="0" dirty="0">
-                <a:ln>
-                  <a:noFill/>
-                </a:ln>
-                <a:solidFill>
-                  <a:schemeClr val="tx1"/>
-                </a:solidFill>
-                <a:effectLst/>
-                <a:latin typeface="Arial" panose="020B0604020202020204" pitchFamily="34" charset="0"/>
-              </a:rPr>
-              <a:t>Accident rates by aircraft model.</a:t>
-            </a:r>
-          </a:p>
-          <a:p>
-            <a:pPr marL="0" marR="0" lvl="0" indent="0" algn="l" defTabSz="914400" rtl="0" eaLnBrk="0" fontAlgn="base" latinLnBrk="0" hangingPunct="0">
-              <a:lnSpc>
-                <a:spcPct val="100000"/>
-              </a:lnSpc>
-              <a:spcBef>
-                <a:spcPct val="0"/>
-              </a:spcBef>
-              <a:spcAft>
-                <a:spcPct val="0"/>
-              </a:spcAft>
-              <a:buClrTx/>
-              <a:buSzTx/>
-              <a:buFontTx/>
-              <a:buChar char="•"/>
-              <a:tabLst/>
-            </a:pPr>
-            <a:r>
-              <a:rPr kumimoji="0" lang="en-US" altLang="en-US" sz="2800" b="0" i="0" u="none" strike="noStrike" cap="none" normalizeH="0" baseline="0" dirty="0">
-                <a:ln>
-                  <a:noFill/>
-                </a:ln>
-                <a:solidFill>
-                  <a:schemeClr val="tx1"/>
-                </a:solidFill>
-                <a:effectLst/>
-                <a:latin typeface="Arial" panose="020B0604020202020204" pitchFamily="34" charset="0"/>
-              </a:rPr>
-              <a:t>Safety impact of engine configurations.</a:t>
-            </a:r>
-          </a:p>
-          <a:p>
-            <a:pPr marL="0" marR="0" lvl="0" indent="0" algn="l" defTabSz="914400" rtl="0" eaLnBrk="0" fontAlgn="base" latinLnBrk="0" hangingPunct="0">
-              <a:lnSpc>
-                <a:spcPct val="100000"/>
-              </a:lnSpc>
-              <a:spcBef>
-                <a:spcPct val="0"/>
-              </a:spcBef>
-              <a:spcAft>
-                <a:spcPct val="0"/>
-              </a:spcAft>
-              <a:buClrTx/>
-              <a:buSzTx/>
-              <a:buFontTx/>
-              <a:buChar char="•"/>
-              <a:tabLst/>
-            </a:pPr>
-            <a:r>
-              <a:rPr kumimoji="0" lang="en-US" altLang="en-US" sz="2800" b="0" i="0" u="none" strike="noStrike" cap="none" normalizeH="0" baseline="0" dirty="0">
-                <a:ln>
-                  <a:noFill/>
-                </a:ln>
-                <a:solidFill>
-                  <a:schemeClr val="tx1"/>
-                </a:solidFill>
-                <a:effectLst/>
-                <a:latin typeface="Arial" panose="020B0604020202020204" pitchFamily="34" charset="0"/>
-              </a:rPr>
-              <a:t>Trends in aviation accidents.</a:t>
-            </a:r>
-          </a:p>
-          <a:p>
+            <a:r>
+              <a:rPr lang="en-US" sz="2400" dirty="0"/>
+              <a:t>Provide data-driven recommendations to guide fleet selection.</a:t>
+            </a:r>
+          </a:p>
+          <a:p>
+            <a:br>
+              <a:rPr lang="en-US" sz="2400" dirty="0"/>
+            </a:br>
             <a:endParaRPr lang="en-US" dirty="0"/>
           </a:p>
         </p:txBody>
@@ -4919,7 +4919,7 @@
           <p:cNvPr id="2" name="Title 1">
             <a:extLst>
               <a:ext uri="{FF2B5EF4-FFF2-40B4-BE49-F238E27FC236}">
-                <a16:creationId xmlns:a16="http://schemas.microsoft.com/office/drawing/2014/main" id="{246E25F8-7ACD-307F-1B3A-44A40140FD55}"/>
+                <a16:creationId xmlns:a16="http://schemas.microsoft.com/office/drawing/2014/main" id="{20852498-FD0A-6112-CC03-F09BF840D835}"/>
               </a:ext>
             </a:extLst>
           </p:cNvPr>
@@ -4943,23 +4943,7 @@
                 <a:ea typeface="Roboto" panose="02000000000000000000" pitchFamily="2" charset="0"/>
                 <a:cs typeface="Roboto" panose="02000000000000000000" pitchFamily="2" charset="0"/>
               </a:rPr>
-              <a:t>Overview </a:t>
-            </a:r>
-            <a:r>
-              <a:rPr lang="en-US" sz="5400" dirty="0" err="1">
-                <a:latin typeface="Roboto" panose="02000000000000000000" pitchFamily="2" charset="0"/>
-                <a:ea typeface="Roboto" panose="02000000000000000000" pitchFamily="2" charset="0"/>
-                <a:cs typeface="Roboto" panose="02000000000000000000" pitchFamily="2" charset="0"/>
-              </a:rPr>
-              <a:t>cont</a:t>
-            </a:r>
-            <a:r>
-              <a:rPr lang="en-US" sz="5400" dirty="0">
-                <a:latin typeface="Roboto" panose="02000000000000000000" pitchFamily="2" charset="0"/>
-                <a:ea typeface="Roboto" panose="02000000000000000000" pitchFamily="2" charset="0"/>
-                <a:cs typeface="Roboto" panose="02000000000000000000" pitchFamily="2" charset="0"/>
-              </a:rPr>
-              <a:t>…</a:t>
+              <a:t>Business Understanding</a:t>
             </a:r>
           </a:p>
         </p:txBody>
@@ -4969,7 +4953,7 @@
           <p:cNvPr id="3" name="Content Placeholder 2">
             <a:extLst>
               <a:ext uri="{FF2B5EF4-FFF2-40B4-BE49-F238E27FC236}">
-                <a16:creationId xmlns:a16="http://schemas.microsoft.com/office/drawing/2014/main" id="{4DCB3C64-5D87-B842-9C4D-F03AF3648417}"/>
+                <a16:creationId xmlns:a16="http://schemas.microsoft.com/office/drawing/2014/main" id="{5A20FB74-06C8-8DB2-E456-2E38AEE54F37}"/>
               </a:ext>
             </a:extLst>
           </p:cNvPr>
@@ -4985,235 +4969,42 @@
           <a:bodyPr/>
           <a:lstStyle/>
           <a:p>
-            <a:pPr marL="0" marR="0" lvl="0" indent="0" algn="l" defTabSz="914400" rtl="0" eaLnBrk="0" fontAlgn="base" latinLnBrk="0" hangingPunct="0">
-              <a:lnSpc>
-                <a:spcPct val="100000"/>
-              </a:lnSpc>
-              <a:spcBef>
-                <a:spcPct val="0"/>
-              </a:spcBef>
-              <a:spcAft>
-                <a:spcPct val="0"/>
-              </a:spcAft>
-              <a:buClrTx/>
-              <a:buSzTx/>
-              <a:buFontTx/>
+            <a:r>
+              <a:rPr lang="en-US" sz="2000" b="1" dirty="0"/>
+              <a:t>Stakeholders</a:t>
+            </a:r>
+            <a:r>
+              <a:rPr lang="en-US" sz="2000" dirty="0"/>
+              <a:t>:</a:t>
+            </a:r>
+          </a:p>
+          <a:p>
+            <a:pPr>
+              <a:buFont typeface="Arial" panose="020B0604020202020204" pitchFamily="34" charset="0"/>
               <a:buChar char="•"/>
-              <a:tabLst/>
             </a:pPr>
             <a:r>
-              <a:rPr kumimoji="0" lang="en-US" altLang="en-US" sz="2400" b="0" i="1" u="none" strike="noStrike" cap="none" normalizeH="0" baseline="0" dirty="0">
-                <a:ln>
-                  <a:noFill/>
-                </a:ln>
-                <a:solidFill>
-                  <a:schemeClr val="tx1"/>
-                </a:solidFill>
-                <a:effectLst/>
-                <a:latin typeface="Arial" panose="020B0604020202020204" pitchFamily="34" charset="0"/>
-                <a:cs typeface="Arial" panose="020B0604020202020204" pitchFamily="34" charset="0"/>
-              </a:rPr>
-              <a:t>Outcome</a:t>
-            </a:r>
-            <a:r>
-              <a:rPr kumimoji="0" lang="en-US" altLang="en-US" sz="2400" b="0" i="0" u="none" strike="noStrike" cap="none" normalizeH="0" baseline="0" dirty="0">
-                <a:ln>
-                  <a:noFill/>
-                </a:ln>
-                <a:solidFill>
-                  <a:schemeClr val="tx1"/>
-                </a:solidFill>
-                <a:effectLst/>
-                <a:latin typeface="Arial" panose="020B0604020202020204" pitchFamily="34" charset="0"/>
-                <a:cs typeface="Arial" panose="020B0604020202020204" pitchFamily="34" charset="0"/>
-              </a:rPr>
-              <a:t>:</a:t>
-            </a:r>
-          </a:p>
-          <a:p>
-            <a:pPr marL="0" marR="0" lvl="0" indent="0" algn="l" defTabSz="914400" rtl="0" eaLnBrk="0" fontAlgn="base" latinLnBrk="0" hangingPunct="0">
-              <a:lnSpc>
-                <a:spcPct val="100000"/>
-              </a:lnSpc>
-              <a:spcBef>
-                <a:spcPct val="0"/>
-              </a:spcBef>
-              <a:spcAft>
-                <a:spcPct val="0"/>
-              </a:spcAft>
-              <a:buClrTx/>
-              <a:buSzTx/>
-              <a:buFontTx/>
+              <a:rPr lang="en-US" sz="2000" b="1" dirty="0"/>
+              <a:t>Head of Aviation Division</a:t>
+            </a:r>
+            <a:r>
+              <a:rPr lang="en-US" sz="2000" dirty="0"/>
+              <a:t>: Makes purchasing decisions.</a:t>
+            </a:r>
+          </a:p>
+          <a:p>
+            <a:pPr>
+              <a:buFont typeface="Arial" panose="020B0604020202020204" pitchFamily="34" charset="0"/>
               <a:buChar char="•"/>
-              <a:tabLst/>
             </a:pPr>
-            <a:endParaRPr lang="en-US" altLang="en-US" sz="2400" dirty="0">
-              <a:latin typeface="Arial" panose="020B0604020202020204" pitchFamily="34" charset="0"/>
-              <a:cs typeface="Arial" panose="020B0604020202020204" pitchFamily="34" charset="0"/>
-            </a:endParaRPr>
-          </a:p>
-          <a:p>
-            <a:pPr marL="0" marR="0" lvl="0" indent="0" algn="l" defTabSz="914400" rtl="0" eaLnBrk="0" fontAlgn="base" latinLnBrk="0" hangingPunct="0">
-              <a:lnSpc>
-                <a:spcPct val="100000"/>
-              </a:lnSpc>
-              <a:spcBef>
-                <a:spcPct val="0"/>
-              </a:spcBef>
-              <a:spcAft>
-                <a:spcPct val="0"/>
-              </a:spcAft>
-              <a:buClrTx/>
-              <a:buSzTx/>
-              <a:buNone/>
-              <a:tabLst/>
-            </a:pPr>
-            <a:r>
-              <a:rPr kumimoji="0" lang="en-US" altLang="en-US" sz="2400" b="0" i="0" u="none" strike="noStrike" cap="none" normalizeH="0" baseline="0" dirty="0">
-                <a:ln>
-                  <a:noFill/>
-                </a:ln>
-                <a:solidFill>
-                  <a:schemeClr val="tx1"/>
-                </a:solidFill>
-                <a:effectLst/>
-                <a:latin typeface="Arial" panose="020B0604020202020204" pitchFamily="34" charset="0"/>
-                <a:cs typeface="Arial" panose="020B0604020202020204" pitchFamily="34" charset="0"/>
-              </a:rPr>
-              <a:t>Actionable insights for aircraft selection. </a:t>
-            </a:r>
-          </a:p>
-          <a:p>
-            <a:pPr marL="0" marR="0" lvl="0" indent="0" algn="l" defTabSz="914400" rtl="0" eaLnBrk="0" fontAlgn="base" latinLnBrk="0" hangingPunct="0">
-              <a:lnSpc>
-                <a:spcPct val="100000"/>
-              </a:lnSpc>
-              <a:spcBef>
-                <a:spcPct val="0"/>
-              </a:spcBef>
-              <a:spcAft>
-                <a:spcPct val="0"/>
-              </a:spcAft>
-              <a:buClrTx/>
-              <a:buSzTx/>
-              <a:buFontTx/>
-              <a:buChar char="•"/>
-              <a:tabLst/>
-            </a:pPr>
-            <a:endParaRPr lang="en-US" altLang="en-US" sz="2400" dirty="0">
-              <a:latin typeface="Arial" panose="020B0604020202020204" pitchFamily="34" charset="0"/>
-              <a:cs typeface="Arial" panose="020B0604020202020204" pitchFamily="34" charset="0"/>
-            </a:endParaRPr>
-          </a:p>
-          <a:p>
-            <a:pPr marL="0" marR="0" lvl="0" indent="0" algn="l" defTabSz="914400" rtl="0" eaLnBrk="0" fontAlgn="base" latinLnBrk="0" hangingPunct="0">
-              <a:lnSpc>
-                <a:spcPct val="100000"/>
-              </a:lnSpc>
-              <a:spcBef>
-                <a:spcPct val="0"/>
-              </a:spcBef>
-              <a:spcAft>
-                <a:spcPct val="0"/>
-              </a:spcAft>
-              <a:buClrTx/>
-              <a:buSzTx/>
-              <a:buFontTx/>
-              <a:buChar char="•"/>
-              <a:tabLst/>
-            </a:pPr>
-            <a:r>
-              <a:rPr lang="en-US" sz="2400" b="1" dirty="0">
-                <a:latin typeface="Arial" panose="020B0604020202020204" pitchFamily="34" charset="0"/>
-                <a:cs typeface="Arial" panose="020B0604020202020204" pitchFamily="34" charset="0"/>
-              </a:rPr>
-              <a:t>Source</a:t>
-            </a:r>
-            <a:r>
-              <a:rPr lang="en-US" sz="2400" dirty="0">
-                <a:latin typeface="Arial" panose="020B0604020202020204" pitchFamily="34" charset="0"/>
-                <a:cs typeface="Arial" panose="020B0604020202020204" pitchFamily="34" charset="0"/>
-              </a:rPr>
-              <a:t>: </a:t>
-            </a:r>
-          </a:p>
-          <a:p>
-            <a:pPr marL="0" marR="0" lvl="0" indent="0" algn="l" defTabSz="914400" rtl="0" eaLnBrk="0" fontAlgn="base" latinLnBrk="0" hangingPunct="0">
-              <a:lnSpc>
-                <a:spcPct val="100000"/>
-              </a:lnSpc>
-              <a:spcBef>
-                <a:spcPct val="0"/>
-              </a:spcBef>
-              <a:spcAft>
-                <a:spcPct val="0"/>
-              </a:spcAft>
-              <a:buClrTx/>
-              <a:buSzTx/>
-              <a:buFontTx/>
-              <a:buChar char="•"/>
-              <a:tabLst/>
-            </a:pPr>
-            <a:endParaRPr lang="en-US" sz="2400" dirty="0">
-              <a:latin typeface="Arial" panose="020B0604020202020204" pitchFamily="34" charset="0"/>
-              <a:cs typeface="Arial" panose="020B0604020202020204" pitchFamily="34" charset="0"/>
-            </a:endParaRPr>
-          </a:p>
-          <a:p>
-            <a:pPr marL="0" marR="0" lvl="0" indent="0" algn="l" defTabSz="914400" rtl="0" eaLnBrk="0" fontAlgn="base" latinLnBrk="0" hangingPunct="0">
-              <a:lnSpc>
-                <a:spcPct val="100000"/>
-              </a:lnSpc>
-              <a:spcBef>
-                <a:spcPct val="0"/>
-              </a:spcBef>
-              <a:spcAft>
-                <a:spcPct val="0"/>
-              </a:spcAft>
-              <a:buClrTx/>
-              <a:buSzTx/>
-              <a:buFontTx/>
-              <a:buChar char="•"/>
-              <a:tabLst/>
-            </a:pPr>
-            <a:r>
-              <a:rPr lang="en-US" sz="2400" dirty="0">
-                <a:latin typeface="Arial" panose="020B0604020202020204" pitchFamily="34" charset="0"/>
-                <a:cs typeface="Arial" panose="020B0604020202020204" pitchFamily="34" charset="0"/>
-              </a:rPr>
-              <a:t>Kaggle Aviation Accident Database Synopses.</a:t>
-            </a:r>
-            <a:br>
-              <a:rPr lang="en-US" sz="2400" dirty="0">
-                <a:latin typeface="Arial" panose="020B0604020202020204" pitchFamily="34" charset="0"/>
-                <a:cs typeface="Arial" panose="020B0604020202020204" pitchFamily="34" charset="0"/>
-              </a:rPr>
-            </a:br>
-            <a:r>
-              <a:rPr lang="en-US" sz="2400" b="1" dirty="0">
-                <a:latin typeface="Arial" panose="020B0604020202020204" pitchFamily="34" charset="0"/>
-                <a:cs typeface="Arial" panose="020B0604020202020204" pitchFamily="34" charset="0"/>
-              </a:rPr>
-              <a:t>Data</a:t>
-            </a:r>
-            <a:r>
-              <a:rPr lang="en-US" sz="2400" dirty="0">
-                <a:latin typeface="Arial" panose="020B0604020202020204" pitchFamily="34" charset="0"/>
-                <a:cs typeface="Arial" panose="020B0604020202020204" pitchFamily="34" charset="0"/>
-              </a:rPr>
-              <a:t>: 24,670 aviation accident records spanning decades.</a:t>
-            </a:r>
-            <a:endParaRPr kumimoji="0" lang="en-US" altLang="en-US" sz="2400" b="0" i="0" u="none" strike="noStrike" cap="none" normalizeH="0" baseline="0" dirty="0">
-              <a:ln>
-                <a:noFill/>
-              </a:ln>
-              <a:solidFill>
-                <a:schemeClr val="tx1"/>
-              </a:solidFill>
-              <a:effectLst/>
-              <a:latin typeface="Arial" panose="020B0604020202020204" pitchFamily="34" charset="0"/>
-              <a:cs typeface="Arial" panose="020B0604020202020204" pitchFamily="34" charset="0"/>
-            </a:endParaRPr>
+            <a:r>
+              <a:rPr lang="en-US" sz="2000" b="1" dirty="0"/>
+              <a:t>Leadership Team</a:t>
+            </a:r>
+            <a:r>
+              <a:rPr lang="en-US" sz="2000" dirty="0"/>
+              <a:t>: Focused on minimizing financial and operational risks.</a:t>
+            </a:r>
           </a:p>
           <a:p>
             <a:endParaRPr lang="en-US" dirty="0"/>
@@ -5223,7 +5014,7 @@
     </p:spTree>
     <p:extLst>
       <p:ext uri="{BB962C8B-B14F-4D97-AF65-F5344CB8AC3E}">
-        <p14:creationId xmlns:p14="http://schemas.microsoft.com/office/powerpoint/2010/main" val="1860534700"/>
+        <p14:creationId xmlns:p14="http://schemas.microsoft.com/office/powerpoint/2010/main" val="1752692847"/>
       </p:ext>
     </p:extLst>
   </p:cSld>
@@ -5255,7 +5046,7 @@
           <p:cNvPr id="2" name="Title 1">
             <a:extLst>
               <a:ext uri="{FF2B5EF4-FFF2-40B4-BE49-F238E27FC236}">
-                <a16:creationId xmlns:a16="http://schemas.microsoft.com/office/drawing/2014/main" id="{20852498-FD0A-6112-CC03-F09BF840D835}"/>
+                <a16:creationId xmlns:a16="http://schemas.microsoft.com/office/drawing/2014/main" id="{E0E3F5F8-8A81-751A-797B-3971A3045510}"/>
               </a:ext>
             </a:extLst>
           </p:cNvPr>
@@ -5279,7 +5070,23 @@
                 <a:ea typeface="Roboto" panose="02000000000000000000" pitchFamily="2" charset="0"/>
                 <a:cs typeface="Roboto" panose="02000000000000000000" pitchFamily="2" charset="0"/>
               </a:rPr>
-              <a:t>Business Understanding</a:t>
+              <a:t>Business Understanding </a:t>
+            </a:r>
+            <a:r>
+              <a:rPr lang="en-US" sz="5400" dirty="0" err="1">
+                <a:latin typeface="Roboto" panose="02000000000000000000" pitchFamily="2" charset="0"/>
+                <a:ea typeface="Roboto" panose="02000000000000000000" pitchFamily="2" charset="0"/>
+                <a:cs typeface="Roboto" panose="02000000000000000000" pitchFamily="2" charset="0"/>
+              </a:rPr>
+              <a:t>cont</a:t>
+            </a:r>
+            <a:r>
+              <a:rPr lang="en-US" sz="5400" dirty="0">
+                <a:latin typeface="Roboto" panose="02000000000000000000" pitchFamily="2" charset="0"/>
+                <a:ea typeface="Roboto" panose="02000000000000000000" pitchFamily="2" charset="0"/>
+                <a:cs typeface="Roboto" panose="02000000000000000000" pitchFamily="2" charset="0"/>
+              </a:rPr>
+              <a:t>…</a:t>
             </a:r>
           </a:p>
         </p:txBody>
@@ -5289,7 +5096,7 @@
           <p:cNvPr id="3" name="Content Placeholder 2">
             <a:extLst>
               <a:ext uri="{FF2B5EF4-FFF2-40B4-BE49-F238E27FC236}">
-                <a16:creationId xmlns:a16="http://schemas.microsoft.com/office/drawing/2014/main" id="{5A20FB74-06C8-8DB2-E456-2E38AEE54F37}"/>
+                <a16:creationId xmlns:a16="http://schemas.microsoft.com/office/drawing/2014/main" id="{E32C52B5-B19A-342E-B593-EB01797629C1}"/>
               </a:ext>
             </a:extLst>
           </p:cNvPr>
@@ -5306,17 +5113,11 @@
           <a:lstStyle/>
           <a:p>
             <a:r>
-              <a:rPr lang="en-US" sz="2400" b="1" dirty="0">
-                <a:latin typeface="Arial" panose="020B0604020202020204" pitchFamily="34" charset="0"/>
-                <a:cs typeface="Arial" panose="020B0604020202020204" pitchFamily="34" charset="0"/>
-              </a:rPr>
-              <a:t>Key Questions</a:t>
-            </a:r>
-            <a:r>
-              <a:rPr lang="en-US" sz="2400" dirty="0">
-                <a:latin typeface="Arial" panose="020B0604020202020204" pitchFamily="34" charset="0"/>
-                <a:cs typeface="Arial" panose="020B0604020202020204" pitchFamily="34" charset="0"/>
-              </a:rPr>
+              <a:rPr lang="en-US" sz="2000" b="1" dirty="0"/>
+              <a:t>Key Business Questions</a:t>
+            </a:r>
+            <a:r>
+              <a:rPr lang="en-US" sz="2000" dirty="0"/>
               <a:t>:</a:t>
             </a:r>
           </a:p>
@@ -5326,10 +5127,7 @@
               <a:buAutoNum type="arabicPeriod"/>
             </a:pPr>
             <a:r>
-              <a:rPr lang="en-US" sz="2400" dirty="0">
-                <a:latin typeface="Arial" panose="020B0604020202020204" pitchFamily="34" charset="0"/>
-                <a:cs typeface="Arial" panose="020B0604020202020204" pitchFamily="34" charset="0"/>
-              </a:rPr>
+              <a:rPr lang="en-US" sz="2000" dirty="0"/>
               <a:t>Which aircraft models have the lowest accident rates?</a:t>
             </a:r>
           </a:p>
@@ -5339,11 +5137,8 @@
               <a:buAutoNum type="arabicPeriod"/>
             </a:pPr>
             <a:r>
-              <a:rPr lang="en-US" sz="2400" dirty="0">
-                <a:latin typeface="Arial" panose="020B0604020202020204" pitchFamily="34" charset="0"/>
-                <a:cs typeface="Arial" panose="020B0604020202020204" pitchFamily="34" charset="0"/>
-              </a:rPr>
-              <a:t>How does the number of engines influence safety and fatality rates?</a:t>
+              <a:rPr lang="en-US" sz="2000" dirty="0"/>
+              <a:t>How does engine configuration affect safety and fatality rates?</a:t>
             </a:r>
           </a:p>
           <a:p>
@@ -5352,22 +5147,36 @@
               <a:buAutoNum type="arabicPeriod"/>
             </a:pPr>
             <a:r>
-              <a:rPr lang="en-US" sz="2400" dirty="0">
-                <a:latin typeface="Arial" panose="020B0604020202020204" pitchFamily="34" charset="0"/>
-                <a:cs typeface="Arial" panose="020B0604020202020204" pitchFamily="34" charset="0"/>
-              </a:rPr>
-              <a:t>How can accident trends guide aircraft selection?</a:t>
-            </a:r>
-          </a:p>
-          <a:p>
-            <a:endParaRPr lang="en-US" dirty="0"/>
+              <a:rPr lang="en-US" sz="2000" dirty="0"/>
+              <a:t>What accident trends should inform aircraft selection?</a:t>
+            </a:r>
+          </a:p>
+          <a:p>
+            <a:endParaRPr lang="en-US" dirty="0"/>
+          </a:p>
+          <a:p>
+            <a:r>
+              <a:rPr lang="en-US" b="1" dirty="0"/>
+              <a:t>Why This Matters</a:t>
+            </a:r>
+            <a:r>
+              <a:rPr lang="en-US" dirty="0"/>
+              <a:t>:</a:t>
+            </a:r>
+            <a:br>
+              <a:rPr lang="en-US" dirty="0"/>
+            </a:br>
+            <a:r>
+              <a:rPr lang="en-US" dirty="0"/>
+              <a:t>Reducing operational risks and improving safety enhances the company’s reputation and ensures financial sustainability.</a:t>
+            </a:r>
           </a:p>
         </p:txBody>
       </p:sp>
     </p:spTree>
     <p:extLst>
       <p:ext uri="{BB962C8B-B14F-4D97-AF65-F5344CB8AC3E}">
-        <p14:creationId xmlns:p14="http://schemas.microsoft.com/office/powerpoint/2010/main" val="1752692847"/>
+        <p14:creationId xmlns:p14="http://schemas.microsoft.com/office/powerpoint/2010/main" val="3091001545"/>
       </p:ext>
     </p:extLst>
   </p:cSld>
@@ -5399,7 +5208,7 @@
           <p:cNvPr id="2" name="Title 1">
             <a:extLst>
               <a:ext uri="{FF2B5EF4-FFF2-40B4-BE49-F238E27FC236}">
-                <a16:creationId xmlns:a16="http://schemas.microsoft.com/office/drawing/2014/main" id="{E0E3F5F8-8A81-751A-797B-3971A3045510}"/>
+                <a16:creationId xmlns:a16="http://schemas.microsoft.com/office/drawing/2014/main" id="{C4630202-7EF7-30DB-68CD-ADC90D7632B1}"/>
               </a:ext>
             </a:extLst>
           </p:cNvPr>
@@ -5423,21 +5232,8 @@
                 <a:ea typeface="Roboto" panose="02000000000000000000" pitchFamily="2" charset="0"/>
                 <a:cs typeface="Roboto" panose="02000000000000000000" pitchFamily="2" charset="0"/>
               </a:rPr>
-              <a:t>Business Understanding </a:t>
-            </a:r>
-            <a:r>
-              <a:rPr lang="en-US" sz="5400" dirty="0" err="1">
-                <a:latin typeface="Roboto" panose="02000000000000000000" pitchFamily="2" charset="0"/>
-                <a:ea typeface="Roboto" panose="02000000000000000000" pitchFamily="2" charset="0"/>
-                <a:cs typeface="Roboto" panose="02000000000000000000" pitchFamily="2" charset="0"/>
-              </a:rPr>
-              <a:t>cont</a:t>
-            </a:r>
-            <a:endParaRPr lang="en-US" sz="5400" dirty="0">
-              <a:latin typeface="Roboto" panose="02000000000000000000" pitchFamily="2" charset="0"/>
-              <a:ea typeface="Roboto" panose="02000000000000000000" pitchFamily="2" charset="0"/>
-              <a:cs typeface="Roboto" panose="02000000000000000000" pitchFamily="2" charset="0"/>
-            </a:endParaRPr>
+              <a:t>Data Understanding</a:t>
+            </a:r>
           </a:p>
         </p:txBody>
       </p:sp>
@@ -5446,7 +5242,7 @@
           <p:cNvPr id="3" name="Content Placeholder 2">
             <a:extLst>
               <a:ext uri="{FF2B5EF4-FFF2-40B4-BE49-F238E27FC236}">
-                <a16:creationId xmlns:a16="http://schemas.microsoft.com/office/drawing/2014/main" id="{E32C52B5-B19A-342E-B593-EB01797629C1}"/>
+                <a16:creationId xmlns:a16="http://schemas.microsoft.com/office/drawing/2014/main" id="{2A8F5749-72C2-FE73-6BD3-130758FB121A}"/>
               </a:ext>
             </a:extLst>
           </p:cNvPr>
@@ -5463,17 +5259,22 @@
           <a:lstStyle/>
           <a:p>
             <a:r>
-              <a:rPr lang="en-US" sz="2400" b="1" dirty="0">
-                <a:latin typeface="Arial" panose="020B0604020202020204" pitchFamily="34" charset="0"/>
-                <a:cs typeface="Arial" panose="020B0604020202020204" pitchFamily="34" charset="0"/>
-              </a:rPr>
-              <a:t>Stakeholders</a:t>
-            </a:r>
-            <a:r>
-              <a:rPr lang="en-US" sz="2400" dirty="0">
-                <a:latin typeface="Arial" panose="020B0604020202020204" pitchFamily="34" charset="0"/>
-                <a:cs typeface="Arial" panose="020B0604020202020204" pitchFamily="34" charset="0"/>
-              </a:rPr>
+              <a:rPr lang="en-US" sz="2000" b="1" dirty="0"/>
+              <a:t>Data Source</a:t>
+            </a:r>
+            <a:r>
+              <a:rPr lang="en-US" sz="2000" dirty="0"/>
+              <a:t>: The Kaggle Aviation Accident Database Synopses, a historical dataset with 88,889 records of aviation accidents.</a:t>
+            </a:r>
+            <a:br>
+              <a:rPr lang="en-US" sz="2000" dirty="0"/>
+            </a:br>
+            <a:r>
+              <a:rPr lang="en-US" sz="2000" b="1" dirty="0"/>
+              <a:t>Key Variables Analyzed</a:t>
+            </a:r>
+            <a:r>
+              <a:rPr lang="en-US" sz="2000" dirty="0"/>
               <a:t>:</a:t>
             </a:r>
           </a:p>
@@ -5483,18 +5284,12 @@
               <a:buChar char="•"/>
             </a:pPr>
             <a:r>
-              <a:rPr lang="en-US" sz="2400" b="1" dirty="0">
-                <a:latin typeface="Arial" panose="020B0604020202020204" pitchFamily="34" charset="0"/>
-                <a:cs typeface="Arial" panose="020B0604020202020204" pitchFamily="34" charset="0"/>
-              </a:rPr>
-              <a:t>Head of Aviation Division</a:t>
-            </a:r>
-            <a:r>
-              <a:rPr lang="en-US" sz="2400" dirty="0">
-                <a:latin typeface="Arial" panose="020B0604020202020204" pitchFamily="34" charset="0"/>
-                <a:cs typeface="Arial" panose="020B0604020202020204" pitchFamily="34" charset="0"/>
-              </a:rPr>
-              <a:t>: Decision-maker for purchases.</a:t>
+              <a:rPr lang="en-US" sz="2000" b="1" dirty="0"/>
+              <a:t>Aircraft Models</a:t>
+            </a:r>
+            <a:r>
+              <a:rPr lang="en-US" sz="2000" dirty="0"/>
+              <a:t>: Accident frequency by model.</a:t>
             </a:r>
           </a:p>
           <a:p>
@@ -5503,49 +5298,37 @@
               <a:buChar char="•"/>
             </a:pPr>
             <a:r>
-              <a:rPr lang="en-US" sz="2400" b="1" dirty="0">
-                <a:latin typeface="Arial" panose="020B0604020202020204" pitchFamily="34" charset="0"/>
-                <a:cs typeface="Arial" panose="020B0604020202020204" pitchFamily="34" charset="0"/>
-              </a:rPr>
-              <a:t>Leadership Team</a:t>
-            </a:r>
-            <a:r>
-              <a:rPr lang="en-US" sz="2400" dirty="0">
-                <a:latin typeface="Arial" panose="020B0604020202020204" pitchFamily="34" charset="0"/>
-                <a:cs typeface="Arial" panose="020B0604020202020204" pitchFamily="34" charset="0"/>
-              </a:rPr>
-              <a:t>: Focused on risk and financial viability.</a:t>
-            </a:r>
-          </a:p>
-          <a:p>
-            <a:endParaRPr lang="en-US" sz="2400" b="1" dirty="0">
-              <a:latin typeface="Arial" panose="020B0604020202020204" pitchFamily="34" charset="0"/>
-              <a:cs typeface="Arial" panose="020B0604020202020204" pitchFamily="34" charset="0"/>
-            </a:endParaRPr>
-          </a:p>
-          <a:p>
-            <a:r>
-              <a:rPr lang="en-US" sz="2400" b="1" dirty="0">
-                <a:latin typeface="Arial" panose="020B0604020202020204" pitchFamily="34" charset="0"/>
-                <a:cs typeface="Arial" panose="020B0604020202020204" pitchFamily="34" charset="0"/>
-              </a:rPr>
-              <a:t>Business Impact</a:t>
-            </a:r>
-            <a:r>
-              <a:rPr lang="en-US" sz="2400" dirty="0">
-                <a:latin typeface="Arial" panose="020B0604020202020204" pitchFamily="34" charset="0"/>
-                <a:cs typeface="Arial" panose="020B0604020202020204" pitchFamily="34" charset="0"/>
-              </a:rPr>
-              <a:t>: </a:t>
-            </a:r>
-          </a:p>
-          <a:p>
-            <a:r>
-              <a:rPr lang="en-US" sz="2400" dirty="0">
-                <a:latin typeface="Arial" panose="020B0604020202020204" pitchFamily="34" charset="0"/>
-                <a:cs typeface="Arial" panose="020B0604020202020204" pitchFamily="34" charset="0"/>
-              </a:rPr>
-              <a:t>Mitigate risk, enhance safety, and build a strong market reputation.</a:t>
+              <a:rPr lang="en-US" sz="2000" b="1" dirty="0"/>
+              <a:t>Number of Engines</a:t>
+            </a:r>
+            <a:r>
+              <a:rPr lang="en-US" sz="2000" dirty="0"/>
+              <a:t>: Impact on safety and fatalities.</a:t>
+            </a:r>
+          </a:p>
+          <a:p>
+            <a:pPr>
+              <a:buFont typeface="Arial" panose="020B0604020202020204" pitchFamily="34" charset="0"/>
+              <a:buChar char="•"/>
+            </a:pPr>
+            <a:r>
+              <a:rPr lang="en-US" sz="2000" b="1" dirty="0"/>
+              <a:t>Weather Conditions</a:t>
+            </a:r>
+            <a:r>
+              <a:rPr lang="en-US" sz="2000" dirty="0"/>
+              <a:t>: Influence on accident rates.</a:t>
+            </a:r>
+            <a:br>
+              <a:rPr lang="en-US" sz="2000" dirty="0"/>
+            </a:br>
+            <a:r>
+              <a:rPr lang="en-US" sz="2000" b="1" dirty="0"/>
+              <a:t>Challenges</a:t>
+            </a:r>
+            <a:r>
+              <a:rPr lang="en-US" sz="2000" dirty="0"/>
+              <a:t>: Addressing missing data and inconsistent reporting (e.g., unknown weather conditions).</a:t>
             </a:r>
           </a:p>
           <a:p>
@@ -5556,7 +5339,7 @@
     </p:spTree>
     <p:extLst>
       <p:ext uri="{BB962C8B-B14F-4D97-AF65-F5344CB8AC3E}">
-        <p14:creationId xmlns:p14="http://schemas.microsoft.com/office/powerpoint/2010/main" val="3091001545"/>
+        <p14:creationId xmlns:p14="http://schemas.microsoft.com/office/powerpoint/2010/main" val="3584887658"/>
       </p:ext>
     </p:extLst>
   </p:cSld>
@@ -5588,7 +5371,7 @@
           <p:cNvPr id="2" name="Title 1">
             <a:extLst>
               <a:ext uri="{FF2B5EF4-FFF2-40B4-BE49-F238E27FC236}">
-                <a16:creationId xmlns:a16="http://schemas.microsoft.com/office/drawing/2014/main" id="{C4630202-7EF7-30DB-68CD-ADC90D7632B1}"/>
+                <a16:creationId xmlns:a16="http://schemas.microsoft.com/office/drawing/2014/main" id="{0B0E9430-E1EE-0855-2EE9-818323A1CD08}"/>
               </a:ext>
             </a:extLst>
           </p:cNvPr>
@@ -5602,7 +5385,7 @@
         <p:spPr/>
         <p:txBody>
           <a:bodyPr>
-            <a:normAutofit/>
+            <a:noAutofit/>
           </a:bodyPr>
           <a:lstStyle/>
           <a:p>
@@ -5612,7 +5395,7 @@
                 <a:ea typeface="Roboto" panose="02000000000000000000" pitchFamily="2" charset="0"/>
                 <a:cs typeface="Roboto" panose="02000000000000000000" pitchFamily="2" charset="0"/>
               </a:rPr>
-              <a:t>Data Understanding</a:t>
+              <a:t>Data Analysis </a:t>
             </a:r>
           </a:p>
         </p:txBody>
@@ -5622,7 +5405,7 @@
           <p:cNvPr id="3" name="Content Placeholder 2">
             <a:extLst>
               <a:ext uri="{FF2B5EF4-FFF2-40B4-BE49-F238E27FC236}">
-                <a16:creationId xmlns:a16="http://schemas.microsoft.com/office/drawing/2014/main" id="{2A8F5749-72C2-FE73-6BD3-130758FB121A}"/>
+                <a16:creationId xmlns:a16="http://schemas.microsoft.com/office/drawing/2014/main" id="{24340F0C-7AC1-516B-94BF-F2E84E7796CF}"/>
               </a:ext>
             </a:extLst>
           </p:cNvPr>
@@ -5643,15 +5426,26 @@
                 <a:latin typeface="Arial" panose="020B0604020202020204" pitchFamily="34" charset="0"/>
                 <a:cs typeface="Arial" panose="020B0604020202020204" pitchFamily="34" charset="0"/>
               </a:rPr>
-              <a:t>Key Features Analyzed</a:t>
+              <a:t>Visualization</a:t>
             </a:r>
             <a:r>
               <a:rPr lang="en-US" sz="2400" dirty="0">
                 <a:latin typeface="Arial" panose="020B0604020202020204" pitchFamily="34" charset="0"/>
                 <a:cs typeface="Arial" panose="020B0604020202020204" pitchFamily="34" charset="0"/>
               </a:rPr>
-              <a:t>:</a:t>
-            </a:r>
+              <a:t>: </a:t>
+            </a:r>
+            <a:r>
+              <a:rPr lang="en-US" sz="2400" i="1" dirty="0">
+                <a:latin typeface="Arial" panose="020B0604020202020204" pitchFamily="34" charset="0"/>
+                <a:cs typeface="Arial" panose="020B0604020202020204" pitchFamily="34" charset="0"/>
+              </a:rPr>
+              <a:t>Top 10 Aircraft Makes by Accident Count (Bar Chart)</a:t>
+            </a:r>
+            <a:endParaRPr lang="en-US" sz="2400" dirty="0">
+              <a:latin typeface="Arial" panose="020B0604020202020204" pitchFamily="34" charset="0"/>
+              <a:cs typeface="Arial" panose="020B0604020202020204" pitchFamily="34" charset="0"/>
+            </a:endParaRPr>
           </a:p>
           <a:p>
             <a:pPr>
@@ -5659,27 +5453,39 @@
               <a:buChar char="•"/>
             </a:pPr>
             <a:r>
+              <a:rPr lang="en-US" sz="2400" b="1" dirty="0">
+                <a:latin typeface="Arial" panose="020B0604020202020204" pitchFamily="34" charset="0"/>
+                <a:cs typeface="Arial" panose="020B0604020202020204" pitchFamily="34" charset="0"/>
+              </a:rPr>
+              <a:t>Key Insight</a:t>
+            </a:r>
+            <a:r>
               <a:rPr lang="en-US" sz="2400" dirty="0">
                 <a:latin typeface="Arial" panose="020B0604020202020204" pitchFamily="34" charset="0"/>
                 <a:cs typeface="Arial" panose="020B0604020202020204" pitchFamily="34" charset="0"/>
               </a:rPr>
-              <a:t>Aircraft type and model, number of engines, injury severity, and accident outcomes.</a:t>
-            </a:r>
-          </a:p>
-          <a:p>
-            <a:pPr>
-              <a:buFont typeface="Arial" panose="020B0604020202020204" pitchFamily="34" charset="0"/>
-              <a:buChar char="•"/>
-            </a:pPr>
+              <a:t>: High accident counts for some models (e.g., Cessna, Piper) may reflect widespread use rather than inherent risk.</a:t>
+            </a:r>
+          </a:p>
+          <a:p>
+            <a:r>
+              <a:rPr lang="en-US" sz="2400" b="1" dirty="0">
+                <a:latin typeface="Arial" panose="020B0604020202020204" pitchFamily="34" charset="0"/>
+                <a:cs typeface="Arial" panose="020B0604020202020204" pitchFamily="34" charset="0"/>
+              </a:rPr>
+              <a:t>Business Recommendation</a:t>
+            </a:r>
             <a:r>
               <a:rPr lang="en-US" sz="2400" dirty="0">
                 <a:latin typeface="Arial" panose="020B0604020202020204" pitchFamily="34" charset="0"/>
                 <a:cs typeface="Arial" panose="020B0604020202020204" pitchFamily="34" charset="0"/>
               </a:rPr>
-              <a:t>Data was cleaned to address missing values and inconsistencies.</a:t>
-            </a:r>
-          </a:p>
-          <a:p>
+              <a:t>: </a:t>
+            </a:r>
+            <a:r>
+              <a:rPr lang="en-US" sz="2000" dirty="0"/>
+              <a:t>Focus safety audits and maintenance efforts on these high-usage models</a:t>
+            </a:r>
             <a:endParaRPr lang="en-US" dirty="0"/>
           </a:p>
         </p:txBody>
@@ -5687,7 +5493,7 @@
     </p:spTree>
     <p:extLst>
       <p:ext uri="{BB962C8B-B14F-4D97-AF65-F5344CB8AC3E}">
-        <p14:creationId xmlns:p14="http://schemas.microsoft.com/office/powerpoint/2010/main" val="3584887658"/>
+        <p14:creationId xmlns:p14="http://schemas.microsoft.com/office/powerpoint/2010/main" val="4082943146"/>
       </p:ext>
     </p:extLst>
   </p:cSld>
@@ -5714,132 +5520,40 @@
           <a:chExt cx="0" cy="0"/>
         </a:xfrm>
       </p:grpSpPr>
-      <p:sp>
-        <p:nvSpPr>
-          <p:cNvPr id="2" name="Title 1">
+      <p:pic>
+        <p:nvPicPr>
+          <p:cNvPr id="3" name="Picture 2">
             <a:extLst>
               <a:ext uri="{FF2B5EF4-FFF2-40B4-BE49-F238E27FC236}">
-                <a16:creationId xmlns:a16="http://schemas.microsoft.com/office/drawing/2014/main" id="{91410208-8E0A-EDBF-DC8F-055EC616847D}"/>
+                <a16:creationId xmlns:a16="http://schemas.microsoft.com/office/drawing/2014/main" id="{88D6360C-18EE-643D-7CD1-A5736AD40575}"/>
               </a:ext>
             </a:extLst>
           </p:cNvPr>
-          <p:cNvSpPr>
-            <a:spLocks noGrp="1"/>
-          </p:cNvSpPr>
-          <p:nvPr>
-            <p:ph type="title"/>
-          </p:nvPr>
-        </p:nvSpPr>
-        <p:spPr/>
-        <p:txBody>
-          <a:bodyPr>
-            <a:noAutofit/>
-          </a:bodyPr>
-          <a:lstStyle/>
-          <a:p>
-            <a:r>
-              <a:rPr lang="en-US" sz="5400" dirty="0">
-                <a:latin typeface="Roboto" panose="02000000000000000000" pitchFamily="2" charset="0"/>
-                <a:ea typeface="Roboto" panose="02000000000000000000" pitchFamily="2" charset="0"/>
-                <a:cs typeface="Roboto" panose="02000000000000000000" pitchFamily="2" charset="0"/>
-              </a:rPr>
-              <a:t>Data Analysis - Accident Trends Over Time</a:t>
-            </a:r>
-          </a:p>
-        </p:txBody>
-      </p:sp>
-      <p:sp>
-        <p:nvSpPr>
-          <p:cNvPr id="3" name="Content Placeholder 2">
-            <a:extLst>
-              <a:ext uri="{FF2B5EF4-FFF2-40B4-BE49-F238E27FC236}">
-                <a16:creationId xmlns:a16="http://schemas.microsoft.com/office/drawing/2014/main" id="{74CD5CB9-2678-608B-B4E7-852FEFB793BD}"/>
-              </a:ext>
-            </a:extLst>
-          </p:cNvPr>
-          <p:cNvSpPr>
-            <a:spLocks noGrp="1"/>
-          </p:cNvSpPr>
-          <p:nvPr>
-            <p:ph idx="1"/>
-          </p:nvPr>
-        </p:nvSpPr>
-        <p:spPr/>
-        <p:txBody>
-          <a:bodyPr/>
-          <a:lstStyle/>
-          <a:p>
-            <a:r>
-              <a:rPr lang="en-US" sz="2400" b="1" dirty="0">
-                <a:latin typeface="Arial" panose="020B0604020202020204" pitchFamily="34" charset="0"/>
-                <a:cs typeface="Arial" panose="020B0604020202020204" pitchFamily="34" charset="0"/>
-              </a:rPr>
-              <a:t>Visualization</a:t>
-            </a:r>
-            <a:r>
-              <a:rPr lang="en-US" sz="2400" dirty="0">
-                <a:latin typeface="Arial" panose="020B0604020202020204" pitchFamily="34" charset="0"/>
-                <a:cs typeface="Arial" panose="020B0604020202020204" pitchFamily="34" charset="0"/>
-              </a:rPr>
-              <a:t>: </a:t>
-            </a:r>
-            <a:r>
-              <a:rPr lang="en-US" sz="2400" i="1" dirty="0">
-                <a:latin typeface="Arial" panose="020B0604020202020204" pitchFamily="34" charset="0"/>
-                <a:cs typeface="Arial" panose="020B0604020202020204" pitchFamily="34" charset="0"/>
-              </a:rPr>
-              <a:t>Yearly Trend in Aviation Accidents (Line Chart)</a:t>
-            </a:r>
-            <a:endParaRPr lang="en-US" sz="2400" dirty="0">
-              <a:latin typeface="Arial" panose="020B0604020202020204" pitchFamily="34" charset="0"/>
-              <a:cs typeface="Arial" panose="020B0604020202020204" pitchFamily="34" charset="0"/>
-            </a:endParaRPr>
-          </a:p>
-          <a:p>
-            <a:pPr>
-              <a:buFont typeface="Arial" panose="020B0604020202020204" pitchFamily="34" charset="0"/>
-              <a:buChar char="•"/>
-            </a:pPr>
-            <a:r>
-              <a:rPr lang="en-US" sz="2400" b="1" dirty="0">
-                <a:latin typeface="Arial" panose="020B0604020202020204" pitchFamily="34" charset="0"/>
-                <a:cs typeface="Arial" panose="020B0604020202020204" pitchFamily="34" charset="0"/>
-              </a:rPr>
-              <a:t>Key Insight</a:t>
-            </a:r>
-            <a:r>
-              <a:rPr lang="en-US" sz="2400" dirty="0">
-                <a:latin typeface="Arial" panose="020B0604020202020204" pitchFamily="34" charset="0"/>
-                <a:cs typeface="Arial" panose="020B0604020202020204" pitchFamily="34" charset="0"/>
-              </a:rPr>
-              <a:t>: A steady decline in accident frequencies over time reflects improved safety practices.</a:t>
-            </a:r>
-          </a:p>
-          <a:p>
-            <a:r>
-              <a:rPr lang="en-US" sz="2400" b="1" dirty="0">
-                <a:latin typeface="Arial" panose="020B0604020202020204" pitchFamily="34" charset="0"/>
-                <a:cs typeface="Arial" panose="020B0604020202020204" pitchFamily="34" charset="0"/>
-              </a:rPr>
-              <a:t>Business Impact</a:t>
-            </a:r>
-            <a:r>
-              <a:rPr lang="en-US" sz="2400" dirty="0">
-                <a:latin typeface="Arial" panose="020B0604020202020204" pitchFamily="34" charset="0"/>
-                <a:cs typeface="Arial" panose="020B0604020202020204" pitchFamily="34" charset="0"/>
-              </a:rPr>
-              <a:t>: Focus on modern aircraft, leveraging advancements in technology and safety features.</a:t>
-            </a:r>
-          </a:p>
-          <a:p>
-            <a:endParaRPr lang="en-US" dirty="0"/>
-          </a:p>
-        </p:txBody>
-      </p:sp>
+          <p:cNvPicPr>
+            <a:picLocks noChangeAspect="1"/>
+          </p:cNvPicPr>
+          <p:nvPr/>
+        </p:nvPicPr>
+        <p:blipFill>
+          <a:blip r:embed="rId2"/>
+          <a:stretch>
+            <a:fillRect/>
+          </a:stretch>
+        </p:blipFill>
+        <p:spPr>
+          <a:xfrm>
+            <a:off x="1962150" y="619125"/>
+            <a:ext cx="8267700" cy="5619750"/>
+          </a:xfrm>
+          <a:prstGeom prst="rect">
+            <a:avLst/>
+          </a:prstGeom>
+        </p:spPr>
+      </p:pic>
     </p:spTree>
     <p:extLst>
       <p:ext uri="{BB962C8B-B14F-4D97-AF65-F5344CB8AC3E}">
-        <p14:creationId xmlns:p14="http://schemas.microsoft.com/office/powerpoint/2010/main" val="1657394520"/>
+        <p14:creationId xmlns:p14="http://schemas.microsoft.com/office/powerpoint/2010/main" val="4158027654"/>
       </p:ext>
     </p:extLst>
   </p:cSld>
@@ -5871,7 +5585,7 @@
           <p:cNvPr id="2" name="Title 1">
             <a:extLst>
               <a:ext uri="{FF2B5EF4-FFF2-40B4-BE49-F238E27FC236}">
-                <a16:creationId xmlns:a16="http://schemas.microsoft.com/office/drawing/2014/main" id="{E7E5987C-9491-6E52-B18C-F534C1DB8E17}"/>
+                <a16:creationId xmlns:a16="http://schemas.microsoft.com/office/drawing/2014/main" id="{91410208-8E0A-EDBF-DC8F-055EC616847D}"/>
               </a:ext>
             </a:extLst>
           </p:cNvPr>
@@ -5895,7 +5609,23 @@
                 <a:ea typeface="Roboto" panose="02000000000000000000" pitchFamily="2" charset="0"/>
                 <a:cs typeface="Roboto" panose="02000000000000000000" pitchFamily="2" charset="0"/>
               </a:rPr>
-              <a:t>Data Analysis - Safety by Engine Configuration</a:t>
+              <a:t>Data Analysis </a:t>
+            </a:r>
+            <a:r>
+              <a:rPr lang="en-US" sz="5400" dirty="0" err="1">
+                <a:latin typeface="Roboto" panose="02000000000000000000" pitchFamily="2" charset="0"/>
+                <a:ea typeface="Roboto" panose="02000000000000000000" pitchFamily="2" charset="0"/>
+                <a:cs typeface="Roboto" panose="02000000000000000000" pitchFamily="2" charset="0"/>
+              </a:rPr>
+              <a:t>Cont</a:t>
+            </a:r>
+            <a:r>
+              <a:rPr lang="en-US" sz="5400" dirty="0">
+                <a:latin typeface="Roboto" panose="02000000000000000000" pitchFamily="2" charset="0"/>
+                <a:ea typeface="Roboto" panose="02000000000000000000" pitchFamily="2" charset="0"/>
+                <a:cs typeface="Roboto" panose="02000000000000000000" pitchFamily="2" charset="0"/>
+              </a:rPr>
+              <a:t>…</a:t>
             </a:r>
           </a:p>
         </p:txBody>
@@ -5905,7 +5635,7 @@
           <p:cNvPr id="3" name="Content Placeholder 2">
             <a:extLst>
               <a:ext uri="{FF2B5EF4-FFF2-40B4-BE49-F238E27FC236}">
-                <a16:creationId xmlns:a16="http://schemas.microsoft.com/office/drawing/2014/main" id="{5EE906AE-F47E-F035-9CDA-726C8C4F13C2}"/>
+                <a16:creationId xmlns:a16="http://schemas.microsoft.com/office/drawing/2014/main" id="{74CD5CB9-2678-608B-B4E7-852FEFB793BD}"/>
               </a:ext>
             </a:extLst>
           </p:cNvPr>
@@ -5940,7 +5670,7 @@
                 <a:latin typeface="Arial" panose="020B0604020202020204" pitchFamily="34" charset="0"/>
                 <a:cs typeface="Arial" panose="020B0604020202020204" pitchFamily="34" charset="0"/>
               </a:rPr>
-              <a:t>Fatality Rate by Number of Engines (Bar Chart)</a:t>
+              <a:t>Yearly Trend in Aviation Accidents (Line Chart)</a:t>
             </a:r>
             <a:endParaRPr lang="en-US" sz="2400" dirty="0">
               <a:latin typeface="Arial" panose="020B0604020202020204" pitchFamily="34" charset="0"/>
@@ -5964,26 +5694,36 @@
                 <a:latin typeface="Arial" panose="020B0604020202020204" pitchFamily="34" charset="0"/>
                 <a:cs typeface="Arial" panose="020B0604020202020204" pitchFamily="34" charset="0"/>
               </a:rPr>
-              <a:t>: Multi-engine aircraft have lower fatality rates than single-engine aircraft, emphasizing the safety of redundancy.</a:t>
-            </a:r>
-          </a:p>
-          <a:p>
+              <a:t>: </a:t>
+            </a:r>
+            <a:r>
+              <a:rPr lang="en-US" sz="2000" dirty="0"/>
+              <a:t>A declining trend in accidents since the 1980s, reflecting technological advancements and improved safety practices. Modern aircraft are safer due to enhanced navigation, automation, and design improvements.</a:t>
+            </a:r>
+          </a:p>
+          <a:p>
+            <a:pPr>
+              <a:buFont typeface="Arial" panose="020B0604020202020204" pitchFamily="34" charset="0"/>
+              <a:buChar char="•"/>
+            </a:pPr>
             <a:r>
               <a:rPr lang="en-US" sz="2400" b="1" dirty="0">
                 <a:latin typeface="Arial" panose="020B0604020202020204" pitchFamily="34" charset="0"/>
                 <a:cs typeface="Arial" panose="020B0604020202020204" pitchFamily="34" charset="0"/>
               </a:rPr>
-              <a:t>Business Impact</a:t>
+              <a:t>Business Recommendation</a:t>
             </a:r>
             <a:r>
               <a:rPr lang="en-US" sz="2400" dirty="0">
                 <a:latin typeface="Arial" panose="020B0604020202020204" pitchFamily="34" charset="0"/>
                 <a:cs typeface="Arial" panose="020B0604020202020204" pitchFamily="34" charset="0"/>
               </a:rPr>
-              <a:t>: Prioritize multi-engine aircraft for high-stakes commercial operations.</a:t>
-            </a:r>
-          </a:p>
-          <a:p>
+              <a:t>: </a:t>
+            </a:r>
+            <a:r>
+              <a:rPr lang="en-US" sz="2000" dirty="0"/>
+              <a:t>Focus fleet acquisitions on newer models with advanced safety features.</a:t>
+            </a:r>
             <a:endParaRPr lang="en-US" dirty="0"/>
           </a:p>
         </p:txBody>
@@ -5991,7 +5731,7 @@
     </p:spTree>
     <p:extLst>
       <p:ext uri="{BB962C8B-B14F-4D97-AF65-F5344CB8AC3E}">
-        <p14:creationId xmlns:p14="http://schemas.microsoft.com/office/powerpoint/2010/main" val="4113656350"/>
+        <p14:creationId xmlns:p14="http://schemas.microsoft.com/office/powerpoint/2010/main" val="1657394520"/>
       </p:ext>
     </p:extLst>
   </p:cSld>
@@ -6018,132 +5758,40 @@
           <a:chExt cx="0" cy="0"/>
         </a:xfrm>
       </p:grpSpPr>
-      <p:sp>
-        <p:nvSpPr>
-          <p:cNvPr id="2" name="Title 1">
+      <p:pic>
+        <p:nvPicPr>
+          <p:cNvPr id="3" name="Picture 2">
             <a:extLst>
               <a:ext uri="{FF2B5EF4-FFF2-40B4-BE49-F238E27FC236}">
-                <a16:creationId xmlns:a16="http://schemas.microsoft.com/office/drawing/2014/main" id="{0B0E9430-E1EE-0855-2EE9-818323A1CD08}"/>
+                <a16:creationId xmlns:a16="http://schemas.microsoft.com/office/drawing/2014/main" id="{80C63C53-B3F2-8B8B-86C0-FD19F8B6F2B4}"/>
               </a:ext>
             </a:extLst>
           </p:cNvPr>
-          <p:cNvSpPr>
-            <a:spLocks noGrp="1"/>
-          </p:cNvSpPr>
-          <p:nvPr>
-            <p:ph type="title"/>
-          </p:nvPr>
-        </p:nvSpPr>
-        <p:spPr/>
-        <p:txBody>
-          <a:bodyPr>
-            <a:noAutofit/>
-          </a:bodyPr>
-          <a:lstStyle/>
-          <a:p>
-            <a:r>
-              <a:rPr lang="en-US" sz="5400" dirty="0">
-                <a:latin typeface="Roboto" panose="02000000000000000000" pitchFamily="2" charset="0"/>
-                <a:ea typeface="Roboto" panose="02000000000000000000" pitchFamily="2" charset="0"/>
-                <a:cs typeface="Roboto" panose="02000000000000000000" pitchFamily="2" charset="0"/>
-              </a:rPr>
-              <a:t>Data Analysis - Top Aircraft Models by Accident Count</a:t>
-            </a:r>
-          </a:p>
-        </p:txBody>
-      </p:sp>
-      <p:sp>
-        <p:nvSpPr>
-          <p:cNvPr id="3" name="Content Placeholder 2">
-            <a:extLst>
-              <a:ext uri="{FF2B5EF4-FFF2-40B4-BE49-F238E27FC236}">
-                <a16:creationId xmlns:a16="http://schemas.microsoft.com/office/drawing/2014/main" id="{24340F0C-7AC1-516B-94BF-F2E84E7796CF}"/>
-              </a:ext>
-            </a:extLst>
-          </p:cNvPr>
-          <p:cNvSpPr>
-            <a:spLocks noGrp="1"/>
-          </p:cNvSpPr>
-          <p:nvPr>
-            <p:ph idx="1"/>
-          </p:nvPr>
-        </p:nvSpPr>
-        <p:spPr/>
-        <p:txBody>
-          <a:bodyPr/>
-          <a:lstStyle/>
-          <a:p>
-            <a:r>
-              <a:rPr lang="en-US" sz="2400" b="1" dirty="0">
-                <a:latin typeface="Arial" panose="020B0604020202020204" pitchFamily="34" charset="0"/>
-                <a:cs typeface="Arial" panose="020B0604020202020204" pitchFamily="34" charset="0"/>
-              </a:rPr>
-              <a:t>Visualization</a:t>
-            </a:r>
-            <a:r>
-              <a:rPr lang="en-US" sz="2400" dirty="0">
-                <a:latin typeface="Arial" panose="020B0604020202020204" pitchFamily="34" charset="0"/>
-                <a:cs typeface="Arial" panose="020B0604020202020204" pitchFamily="34" charset="0"/>
-              </a:rPr>
-              <a:t>: </a:t>
-            </a:r>
-            <a:r>
-              <a:rPr lang="en-US" sz="2400" i="1" dirty="0">
-                <a:latin typeface="Arial" panose="020B0604020202020204" pitchFamily="34" charset="0"/>
-                <a:cs typeface="Arial" panose="020B0604020202020204" pitchFamily="34" charset="0"/>
-              </a:rPr>
-              <a:t>Top 10 Aircraft Makes by Accident Count (Bar Chart)</a:t>
-            </a:r>
-            <a:endParaRPr lang="en-US" sz="2400" dirty="0">
-              <a:latin typeface="Arial" panose="020B0604020202020204" pitchFamily="34" charset="0"/>
-              <a:cs typeface="Arial" panose="020B0604020202020204" pitchFamily="34" charset="0"/>
-            </a:endParaRPr>
-          </a:p>
-          <a:p>
-            <a:pPr>
-              <a:buFont typeface="Arial" panose="020B0604020202020204" pitchFamily="34" charset="0"/>
-              <a:buChar char="•"/>
-            </a:pPr>
-            <a:r>
-              <a:rPr lang="en-US" sz="2400" b="1" dirty="0">
-                <a:latin typeface="Arial" panose="020B0604020202020204" pitchFamily="34" charset="0"/>
-                <a:cs typeface="Arial" panose="020B0604020202020204" pitchFamily="34" charset="0"/>
-              </a:rPr>
-              <a:t>Key Insight</a:t>
-            </a:r>
-            <a:r>
-              <a:rPr lang="en-US" sz="2400" dirty="0">
-                <a:latin typeface="Arial" panose="020B0604020202020204" pitchFamily="34" charset="0"/>
-                <a:cs typeface="Arial" panose="020B0604020202020204" pitchFamily="34" charset="0"/>
-              </a:rPr>
-              <a:t>: High accident counts for some models (e.g., Cessna, Piper) may reflect widespread use rather than inherent risk.</a:t>
-            </a:r>
-          </a:p>
-          <a:p>
-            <a:r>
-              <a:rPr lang="en-US" sz="2400" b="1" dirty="0">
-                <a:latin typeface="Arial" panose="020B0604020202020204" pitchFamily="34" charset="0"/>
-                <a:cs typeface="Arial" panose="020B0604020202020204" pitchFamily="34" charset="0"/>
-              </a:rPr>
-              <a:t>Business Impact</a:t>
-            </a:r>
-            <a:r>
-              <a:rPr lang="en-US" sz="2400" dirty="0">
-                <a:latin typeface="Arial" panose="020B0604020202020204" pitchFamily="34" charset="0"/>
-                <a:cs typeface="Arial" panose="020B0604020202020204" pitchFamily="34" charset="0"/>
-              </a:rPr>
-              <a:t>: Assess usage rates alongside safety metrics to identify truly low-risk models.</a:t>
-            </a:r>
-          </a:p>
-          <a:p>
-            <a:endParaRPr lang="en-US" dirty="0"/>
-          </a:p>
-        </p:txBody>
-      </p:sp>
+          <p:cNvPicPr>
+            <a:picLocks noChangeAspect="1"/>
+          </p:cNvPicPr>
+          <p:nvPr/>
+        </p:nvPicPr>
+        <p:blipFill>
+          <a:blip r:embed="rId2"/>
+          <a:stretch>
+            <a:fillRect/>
+          </a:stretch>
+        </p:blipFill>
+        <p:spPr>
+          <a:xfrm>
+            <a:off x="1266825" y="833437"/>
+            <a:ext cx="9658350" cy="5191125"/>
+          </a:xfrm>
+          <a:prstGeom prst="rect">
+            <a:avLst/>
+          </a:prstGeom>
+        </p:spPr>
+      </p:pic>
     </p:spTree>
     <p:extLst>
       <p:ext uri="{BB962C8B-B14F-4D97-AF65-F5344CB8AC3E}">
-        <p14:creationId xmlns:p14="http://schemas.microsoft.com/office/powerpoint/2010/main" val="4082943146"/>
+        <p14:creationId xmlns:p14="http://schemas.microsoft.com/office/powerpoint/2010/main" val="3844785527"/>
       </p:ext>
     </p:extLst>
   </p:cSld>
@@ -6437,6 +6085,15 @@
 </file>
 
 <file path=customXml/item1.xml><?xml version="1.0" encoding="utf-8"?>
+<?mso-contentType ?>
+<FormTemplates xmlns="http://schemas.microsoft.com/sharepoint/v3/contenttype/forms">
+  <Display>DocumentLibraryForm</Display>
+  <Edit>DocumentLibraryForm</Edit>
+  <New>DocumentLibraryForm</New>
+</FormTemplates>
+</file>
+
+<file path=customXml/item2.xml><?xml version="1.0" encoding="utf-8"?>
 <p:properties xmlns:p="http://schemas.microsoft.com/office/2006/metadata/properties" xmlns:xsi="http://www.w3.org/2001/XMLSchema-instance" xmlns:pc="http://schemas.microsoft.com/office/infopath/2007/PartnerControls">
   <documentManagement>
     <_ip_UnifiedCompliancePolicyUIAction xmlns="http://schemas.microsoft.com/sharepoint/v3" xsi:nil="true"/>
@@ -6454,15 +6111,6 @@
     <MediaServiceKeyPoints xmlns="71af3243-3dd4-4a8d-8c0d-dd76da1f02a5" xsi:nil="true"/>
   </documentManagement>
 </p:properties>
-</file>
-
-<file path=customXml/item2.xml><?xml version="1.0" encoding="utf-8"?>
-<?mso-contentType ?>
-<FormTemplates xmlns="http://schemas.microsoft.com/sharepoint/v3/contenttype/forms">
-  <Display>DocumentLibraryForm</Display>
-  <Edit>DocumentLibraryForm</Edit>
-  <New>DocumentLibraryForm</New>
-</FormTemplates>
 </file>
 
 <file path=customXml/item3.xml><?xml version="1.0" encoding="utf-8"?>
@@ -6772,6 +6420,14 @@
 </file>
 
 <file path=customXml/itemProps1.xml><?xml version="1.0" encoding="utf-8"?>
+<ds:datastoreItem xmlns:ds="http://schemas.openxmlformats.org/officeDocument/2006/customXml" ds:itemID="{19DAD249-BF80-48EF-9AFB-36A11BCDC2CE}">
+  <ds:schemaRefs>
+    <ds:schemaRef ds:uri="http://schemas.microsoft.com/sharepoint/v3/contenttype/forms"/>
+  </ds:schemaRefs>
+</ds:datastoreItem>
+</file>
+
+<file path=customXml/itemProps2.xml><?xml version="1.0" encoding="utf-8"?>
 <ds:datastoreItem xmlns:ds="http://schemas.openxmlformats.org/officeDocument/2006/customXml" ds:itemID="{6F4F4D41-822D-40F2-A7AC-E4E6CB36CA7A}">
   <ds:schemaRefs>
     <ds:schemaRef ds:uri="http://schemas.microsoft.com/office/2006/metadata/properties"/>
@@ -6779,14 +6435,6 @@
     <ds:schemaRef ds:uri="http://schemas.microsoft.com/sharepoint/v3"/>
     <ds:schemaRef ds:uri="71af3243-3dd4-4a8d-8c0d-dd76da1f02a5"/>
     <ds:schemaRef ds:uri="230e9df3-be65-4c73-a93b-d1236ebd677e"/>
-  </ds:schemaRefs>
-</ds:datastoreItem>
-</file>
-
-<file path=customXml/itemProps2.xml><?xml version="1.0" encoding="utf-8"?>
-<ds:datastoreItem xmlns:ds="http://schemas.openxmlformats.org/officeDocument/2006/customXml" ds:itemID="{19DAD249-BF80-48EF-9AFB-36A11BCDC2CE}">
-  <ds:schemaRefs>
-    <ds:schemaRef ds:uri="http://schemas.microsoft.com/sharepoint/v3/contenttype/forms"/>
   </ds:schemaRefs>
 </ds:datastoreItem>
 </file>

</xml_diff>

<commit_message>
Commiting the PDF presentation
</commit_message>
<xml_diff>
--- a/Phase_1_Project Slides.pptx
+++ b/Phase_1_Project Slides.pptx
@@ -10,15 +10,16 @@
     <p:sldId id="261" r:id="rId7"/>
     <p:sldId id="262" r:id="rId8"/>
     <p:sldId id="263" r:id="rId9"/>
-    <p:sldId id="266" r:id="rId10"/>
-    <p:sldId id="271" r:id="rId11"/>
-    <p:sldId id="264" r:id="rId12"/>
-    <p:sldId id="272" r:id="rId13"/>
-    <p:sldId id="265" r:id="rId14"/>
-    <p:sldId id="273" r:id="rId15"/>
-    <p:sldId id="267" r:id="rId16"/>
-    <p:sldId id="268" r:id="rId17"/>
-    <p:sldId id="270" r:id="rId18"/>
+    <p:sldId id="274" r:id="rId10"/>
+    <p:sldId id="266" r:id="rId11"/>
+    <p:sldId id="271" r:id="rId12"/>
+    <p:sldId id="264" r:id="rId13"/>
+    <p:sldId id="272" r:id="rId14"/>
+    <p:sldId id="265" r:id="rId15"/>
+    <p:sldId id="273" r:id="rId16"/>
+    <p:sldId id="267" r:id="rId17"/>
+    <p:sldId id="268" r:id="rId18"/>
+    <p:sldId id="270" r:id="rId19"/>
   </p:sldIdLst>
   <p:sldSz cx="12192000" cy="6858000"/>
   <p:notesSz cx="6858000" cy="9144000"/>
@@ -4093,6 +4094,66 @@
           <a:chExt cx="0" cy="0"/>
         </a:xfrm>
       </p:grpSpPr>
+      <p:pic>
+        <p:nvPicPr>
+          <p:cNvPr id="3" name="Picture 2">
+            <a:extLst>
+              <a:ext uri="{FF2B5EF4-FFF2-40B4-BE49-F238E27FC236}">
+                <a16:creationId xmlns:a16="http://schemas.microsoft.com/office/drawing/2014/main" id="{80C63C53-B3F2-8B8B-86C0-FD19F8B6F2B4}"/>
+              </a:ext>
+            </a:extLst>
+          </p:cNvPr>
+          <p:cNvPicPr>
+            <a:picLocks noChangeAspect="1"/>
+          </p:cNvPicPr>
+          <p:nvPr/>
+        </p:nvPicPr>
+        <p:blipFill>
+          <a:blip r:embed="rId2"/>
+          <a:stretch>
+            <a:fillRect/>
+          </a:stretch>
+        </p:blipFill>
+        <p:spPr>
+          <a:xfrm>
+            <a:off x="1266825" y="833437"/>
+            <a:ext cx="9658350" cy="5191125"/>
+          </a:xfrm>
+          <a:prstGeom prst="rect">
+            <a:avLst/>
+          </a:prstGeom>
+        </p:spPr>
+      </p:pic>
+    </p:spTree>
+    <p:extLst>
+      <p:ext uri="{BB962C8B-B14F-4D97-AF65-F5344CB8AC3E}">
+        <p14:creationId xmlns:p14="http://schemas.microsoft.com/office/powerpoint/2010/main" val="3844785527"/>
+      </p:ext>
+    </p:extLst>
+  </p:cSld>
+  <p:clrMapOvr>
+    <a:masterClrMapping/>
+  </p:clrMapOvr>
+</p:sld>
+</file>
+
+<file path=ppt/slides/slide11.xml><?xml version="1.0" encoding="utf-8"?>
+<p:sld xmlns:a="http://schemas.openxmlformats.org/drawingml/2006/main" xmlns:r="http://schemas.openxmlformats.org/officeDocument/2006/relationships" xmlns:p="http://schemas.openxmlformats.org/presentationml/2006/main">
+  <p:cSld>
+    <p:spTree>
+      <p:nvGrpSpPr>
+        <p:cNvPr id="1" name=""/>
+        <p:cNvGrpSpPr/>
+        <p:nvPr/>
+      </p:nvGrpSpPr>
+      <p:grpSpPr>
+        <a:xfrm>
+          <a:off x="0" y="0"/>
+          <a:ext cx="0" cy="0"/>
+          <a:chOff x="0" y="0"/>
+          <a:chExt cx="0" cy="0"/>
+        </a:xfrm>
+      </p:grpSpPr>
       <p:sp>
         <p:nvSpPr>
           <p:cNvPr id="2" name="Title 1">
@@ -4122,7 +4183,23 @@
                 <a:ea typeface="Roboto" panose="02000000000000000000" pitchFamily="2" charset="0"/>
                 <a:cs typeface="Roboto" panose="02000000000000000000" pitchFamily="2" charset="0"/>
               </a:rPr>
-              <a:t>Data Analysis - Safety by Engine Configuration</a:t>
+              <a:t>Data Analysis </a:t>
+            </a:r>
+            <a:r>
+              <a:rPr lang="en-US" sz="5400" dirty="0" err="1">
+                <a:latin typeface="Roboto" panose="02000000000000000000" pitchFamily="2" charset="0"/>
+                <a:ea typeface="Roboto" panose="02000000000000000000" pitchFamily="2" charset="0"/>
+                <a:cs typeface="Roboto" panose="02000000000000000000" pitchFamily="2" charset="0"/>
+              </a:rPr>
+              <a:t>Cont</a:t>
+            </a:r>
+            <a:r>
+              <a:rPr lang="en-US" sz="5400" dirty="0">
+                <a:latin typeface="Roboto" panose="02000000000000000000" pitchFamily="2" charset="0"/>
+                <a:ea typeface="Roboto" panose="02000000000000000000" pitchFamily="2" charset="0"/>
+                <a:cs typeface="Roboto" panose="02000000000000000000" pitchFamily="2" charset="0"/>
+              </a:rPr>
+              <a:t>…</a:t>
             </a:r>
           </a:p>
         </p:txBody>
@@ -4153,26 +4230,15 @@
                 <a:latin typeface="Arial" panose="020B0604020202020204" pitchFamily="34" charset="0"/>
                 <a:cs typeface="Arial" panose="020B0604020202020204" pitchFamily="34" charset="0"/>
               </a:rPr>
-              <a:t>Visualization</a:t>
+              <a:t>Visualization 3</a:t>
             </a:r>
             <a:r>
               <a:rPr lang="en-US" sz="2400" dirty="0">
                 <a:latin typeface="Arial" panose="020B0604020202020204" pitchFamily="34" charset="0"/>
                 <a:cs typeface="Arial" panose="020B0604020202020204" pitchFamily="34" charset="0"/>
               </a:rPr>
-              <a:t>: </a:t>
-            </a:r>
-            <a:r>
-              <a:rPr lang="en-US" sz="2400" i="1" dirty="0">
-                <a:latin typeface="Arial" panose="020B0604020202020204" pitchFamily="34" charset="0"/>
-                <a:cs typeface="Arial" panose="020B0604020202020204" pitchFamily="34" charset="0"/>
-              </a:rPr>
-              <a:t>Fatality Rate by Number of Engines (Bar Chart)</a:t>
-            </a:r>
-            <a:endParaRPr lang="en-US" sz="2400" dirty="0">
-              <a:latin typeface="Arial" panose="020B0604020202020204" pitchFamily="34" charset="0"/>
-              <a:cs typeface="Arial" panose="020B0604020202020204" pitchFamily="34" charset="0"/>
-            </a:endParaRPr>
+              <a:t>: Fatality Rate by Number of Engines (Bar Chart)</a:t>
+            </a:r>
           </a:p>
           <a:p>
             <a:pPr>
@@ -4184,7 +4250,7 @@
                 <a:latin typeface="Arial" panose="020B0604020202020204" pitchFamily="34" charset="0"/>
                 <a:cs typeface="Arial" panose="020B0604020202020204" pitchFamily="34" charset="0"/>
               </a:rPr>
-              <a:t>Key Insight</a:t>
+              <a:t>Insight</a:t>
             </a:r>
             <a:r>
               <a:rPr lang="en-US" sz="2400" dirty="0">
@@ -4228,7 +4294,7 @@
 </p:sld>
 </file>
 
-<file path=ppt/slides/slide11.xml><?xml version="1.0" encoding="utf-8"?>
+<file path=ppt/slides/slide12.xml><?xml version="1.0" encoding="utf-8"?>
 <p:sld xmlns:a="http://schemas.openxmlformats.org/drawingml/2006/main" xmlns:r="http://schemas.openxmlformats.org/officeDocument/2006/relationships" xmlns:p="http://schemas.openxmlformats.org/presentationml/2006/main">
   <p:cSld>
     <p:spTree>
@@ -4288,200 +4354,6 @@
 </p:sld>
 </file>
 
-<file path=ppt/slides/slide12.xml><?xml version="1.0" encoding="utf-8"?>
-<p:sld xmlns:a="http://schemas.openxmlformats.org/drawingml/2006/main" xmlns:r="http://schemas.openxmlformats.org/officeDocument/2006/relationships" xmlns:p="http://schemas.openxmlformats.org/presentationml/2006/main">
-  <p:cSld>
-    <p:spTree>
-      <p:nvGrpSpPr>
-        <p:cNvPr id="1" name=""/>
-        <p:cNvGrpSpPr/>
-        <p:nvPr/>
-      </p:nvGrpSpPr>
-      <p:grpSpPr>
-        <a:xfrm>
-          <a:off x="0" y="0"/>
-          <a:ext cx="0" cy="0"/>
-          <a:chOff x="0" y="0"/>
-          <a:chExt cx="0" cy="0"/>
-        </a:xfrm>
-      </p:grpSpPr>
-      <p:sp>
-        <p:nvSpPr>
-          <p:cNvPr id="2" name="Title 1">
-            <a:extLst>
-              <a:ext uri="{FF2B5EF4-FFF2-40B4-BE49-F238E27FC236}">
-                <a16:creationId xmlns:a16="http://schemas.microsoft.com/office/drawing/2014/main" id="{00514E30-3524-FB92-0DA0-DA81FD42CDB1}"/>
-              </a:ext>
-            </a:extLst>
-          </p:cNvPr>
-          <p:cNvSpPr>
-            <a:spLocks noGrp="1"/>
-          </p:cNvSpPr>
-          <p:nvPr>
-            <p:ph type="title"/>
-          </p:nvPr>
-        </p:nvSpPr>
-        <p:spPr/>
-        <p:txBody>
-          <a:bodyPr>
-            <a:normAutofit/>
-          </a:bodyPr>
-          <a:lstStyle/>
-          <a:p>
-            <a:r>
-              <a:rPr lang="en-US" sz="5400" dirty="0">
-                <a:latin typeface="Roboto" panose="02000000000000000000" pitchFamily="2" charset="0"/>
-                <a:ea typeface="Roboto" panose="02000000000000000000" pitchFamily="2" charset="0"/>
-                <a:cs typeface="Roboto" panose="02000000000000000000" pitchFamily="2" charset="0"/>
-              </a:rPr>
-              <a:t>Recommendations</a:t>
-            </a:r>
-          </a:p>
-        </p:txBody>
-      </p:sp>
-      <p:sp>
-        <p:nvSpPr>
-          <p:cNvPr id="3" name="Content Placeholder 2">
-            <a:extLst>
-              <a:ext uri="{FF2B5EF4-FFF2-40B4-BE49-F238E27FC236}">
-                <a16:creationId xmlns:a16="http://schemas.microsoft.com/office/drawing/2014/main" id="{DC64E229-FD46-3D0A-7D99-7DA246770BB9}"/>
-              </a:ext>
-            </a:extLst>
-          </p:cNvPr>
-          <p:cNvSpPr>
-            <a:spLocks noGrp="1"/>
-          </p:cNvSpPr>
-          <p:nvPr>
-            <p:ph idx="1"/>
-          </p:nvPr>
-        </p:nvSpPr>
-        <p:spPr/>
-        <p:txBody>
-          <a:bodyPr>
-            <a:normAutofit fontScale="92500"/>
-          </a:bodyPr>
-          <a:lstStyle/>
-          <a:p>
-            <a:pPr>
-              <a:buFont typeface="+mj-lt"/>
-              <a:buAutoNum type="arabicPeriod"/>
-            </a:pPr>
-            <a:r>
-              <a:rPr lang="en-US" sz="2400" b="1" dirty="0">
-                <a:latin typeface="Arial" panose="020B0604020202020204" pitchFamily="34" charset="0"/>
-                <a:cs typeface="Arial" panose="020B0604020202020204" pitchFamily="34" charset="0"/>
-              </a:rPr>
-              <a:t>Focus on Proven Safe Models</a:t>
-            </a:r>
-            <a:r>
-              <a:rPr lang="en-US" sz="2400" dirty="0">
-                <a:latin typeface="Arial" panose="020B0604020202020204" pitchFamily="34" charset="0"/>
-                <a:cs typeface="Arial" panose="020B0604020202020204" pitchFamily="34" charset="0"/>
-              </a:rPr>
-              <a:t>:</a:t>
-            </a:r>
-          </a:p>
-          <a:p>
-            <a:pPr marL="457200" lvl="1" indent="0">
-              <a:buNone/>
-            </a:pPr>
-            <a:r>
-              <a:rPr lang="en-US" sz="2400" dirty="0">
-                <a:latin typeface="Arial" panose="020B0604020202020204" pitchFamily="34" charset="0"/>
-                <a:cs typeface="Arial" panose="020B0604020202020204" pitchFamily="34" charset="0"/>
-              </a:rPr>
-              <a:t> Select aircraft like modern iterations of Boeing and Airbus models with strong safety records.</a:t>
-            </a:r>
-          </a:p>
-          <a:p>
-            <a:pPr>
-              <a:buFont typeface="+mj-lt"/>
-              <a:buAutoNum type="arabicPeriod"/>
-            </a:pPr>
-            <a:r>
-              <a:rPr lang="en-US" sz="2400" b="1" dirty="0">
-                <a:latin typeface="Arial" panose="020B0604020202020204" pitchFamily="34" charset="0"/>
-                <a:cs typeface="Arial" panose="020B0604020202020204" pitchFamily="34" charset="0"/>
-              </a:rPr>
-              <a:t>Emphasize on Multi-Engine Aircraft</a:t>
-            </a:r>
-            <a:r>
-              <a:rPr lang="en-US" sz="2400" dirty="0">
-                <a:latin typeface="Arial" panose="020B0604020202020204" pitchFamily="34" charset="0"/>
-                <a:cs typeface="Arial" panose="020B0604020202020204" pitchFamily="34" charset="0"/>
-              </a:rPr>
-              <a:t>:</a:t>
-            </a:r>
-          </a:p>
-          <a:p>
-            <a:pPr marL="457200" lvl="1" indent="0">
-              <a:buNone/>
-            </a:pPr>
-            <a:r>
-              <a:rPr lang="en-US" sz="2400" dirty="0">
-                <a:latin typeface="Arial" panose="020B0604020202020204" pitchFamily="34" charset="0"/>
-                <a:cs typeface="Arial" panose="020B0604020202020204" pitchFamily="34" charset="0"/>
-              </a:rPr>
-              <a:t>Multi-engine redundancy enhances safety for high-stakes and commercial operations.</a:t>
-            </a:r>
-          </a:p>
-          <a:p>
-            <a:pPr>
-              <a:buFont typeface="+mj-lt"/>
-              <a:buAutoNum type="arabicPeriod"/>
-            </a:pPr>
-            <a:r>
-              <a:rPr lang="en-US" sz="2400" b="1" dirty="0">
-                <a:latin typeface="Arial" panose="020B0604020202020204" pitchFamily="34" charset="0"/>
-                <a:cs typeface="Arial" panose="020B0604020202020204" pitchFamily="34" charset="0"/>
-              </a:rPr>
-              <a:t>Invest in Technology</a:t>
-            </a:r>
-            <a:r>
-              <a:rPr lang="en-US" sz="2400" dirty="0">
-                <a:latin typeface="Arial" panose="020B0604020202020204" pitchFamily="34" charset="0"/>
-                <a:cs typeface="Arial" panose="020B0604020202020204" pitchFamily="34" charset="0"/>
-              </a:rPr>
-              <a:t>:</a:t>
-            </a:r>
-          </a:p>
-          <a:p>
-            <a:pPr marL="457200" lvl="1" indent="0">
-              <a:buNone/>
-            </a:pPr>
-            <a:r>
-              <a:rPr lang="en-US" sz="2400" dirty="0" err="1">
-                <a:latin typeface="Arial" panose="020B0604020202020204" pitchFamily="34" charset="0"/>
-                <a:cs typeface="Arial" panose="020B0604020202020204" pitchFamily="34" charset="0"/>
-              </a:rPr>
-              <a:t>Opt</a:t>
-            </a:r>
-            <a:r>
-              <a:rPr lang="en-US" sz="2400" dirty="0">
-                <a:latin typeface="Arial" panose="020B0604020202020204" pitchFamily="34" charset="0"/>
-                <a:cs typeface="Arial" panose="020B0604020202020204" pitchFamily="34" charset="0"/>
-              </a:rPr>
-              <a:t> for aircraft with advanced weather detection and automation features.</a:t>
-            </a:r>
-          </a:p>
-          <a:p>
-            <a:endParaRPr lang="en-US" dirty="0"/>
-          </a:p>
-        </p:txBody>
-      </p:sp>
-    </p:spTree>
-    <p:extLst>
-      <p:ext uri="{BB962C8B-B14F-4D97-AF65-F5344CB8AC3E}">
-        <p14:creationId xmlns:p14="http://schemas.microsoft.com/office/powerpoint/2010/main" val="3561342553"/>
-      </p:ext>
-    </p:extLst>
-  </p:cSld>
-  <p:clrMapOvr>
-    <a:masterClrMapping/>
-  </p:clrMapOvr>
-</p:sld>
-</file>
-
 <file path=ppt/slides/slide13.xml><?xml version="1.0" encoding="utf-8"?>
 <p:sld xmlns:a="http://schemas.openxmlformats.org/drawingml/2006/main" xmlns:r="http://schemas.openxmlformats.org/officeDocument/2006/relationships" xmlns:p="http://schemas.openxmlformats.org/presentationml/2006/main">
   <p:cSld>
@@ -4504,7 +4376,7 @@
           <p:cNvPr id="2" name="Title 1">
             <a:extLst>
               <a:ext uri="{FF2B5EF4-FFF2-40B4-BE49-F238E27FC236}">
-                <a16:creationId xmlns:a16="http://schemas.microsoft.com/office/drawing/2014/main" id="{74592DD9-94CD-F2D4-641D-92250202CD8D}"/>
+                <a16:creationId xmlns:a16="http://schemas.microsoft.com/office/drawing/2014/main" id="{00514E30-3524-FB92-0DA0-DA81FD42CDB1}"/>
               </a:ext>
             </a:extLst>
           </p:cNvPr>
@@ -4517,7 +4389,9 @@
         </p:nvSpPr>
         <p:spPr/>
         <p:txBody>
-          <a:bodyPr/>
+          <a:bodyPr>
+            <a:normAutofit/>
+          </a:bodyPr>
           <a:lstStyle/>
           <a:p>
             <a:r>
@@ -4526,19 +4400,7 @@
                 <a:ea typeface="Roboto" panose="02000000000000000000" pitchFamily="2" charset="0"/>
                 <a:cs typeface="Roboto" panose="02000000000000000000" pitchFamily="2" charset="0"/>
               </a:rPr>
-              <a:t>Next</a:t>
-            </a:r>
-            <a:r>
-              <a:rPr lang="en-US" dirty="0"/>
-              <a:t> </a:t>
-            </a:r>
-            <a:r>
-              <a:rPr lang="en-US" sz="5400" dirty="0">
-                <a:latin typeface="Roboto" panose="02000000000000000000" pitchFamily="2" charset="0"/>
-                <a:ea typeface="Roboto" panose="02000000000000000000" pitchFamily="2" charset="0"/>
-                <a:cs typeface="Roboto" panose="02000000000000000000" pitchFamily="2" charset="0"/>
-              </a:rPr>
-              <a:t>Steps</a:t>
+              <a:t>Recommendations</a:t>
             </a:r>
           </a:p>
         </p:txBody>
@@ -4548,7 +4410,7 @@
           <p:cNvPr id="3" name="Content Placeholder 2">
             <a:extLst>
               <a:ext uri="{FF2B5EF4-FFF2-40B4-BE49-F238E27FC236}">
-                <a16:creationId xmlns:a16="http://schemas.microsoft.com/office/drawing/2014/main" id="{C0FFBAA3-05B9-9C50-2A82-98A0EDC78671}"/>
+                <a16:creationId xmlns:a16="http://schemas.microsoft.com/office/drawing/2014/main" id="{DC64E229-FD46-3D0A-7D99-7DA246770BB9}"/>
               </a:ext>
             </a:extLst>
           </p:cNvPr>
@@ -4561,46 +4423,111 @@
         </p:nvSpPr>
         <p:spPr/>
         <p:txBody>
-          <a:bodyPr/>
-          <a:lstStyle/>
-          <a:p>
-            <a:r>
-              <a:rPr lang="en-US" b="1" dirty="0"/>
-              <a:t>Deep Dive into Top Models: </a:t>
-            </a:r>
-            <a:r>
-              <a:rPr lang="en-US" dirty="0"/>
-              <a:t>Conduct safety and reliability assessments for frequently used aircraft models.</a:t>
-            </a:r>
-          </a:p>
-          <a:p>
-            <a:r>
-              <a:rPr lang="en-US" b="1" dirty="0"/>
-              <a:t>Pilot Program for Multi-Engine Aircraft: </a:t>
-            </a:r>
-            <a:r>
-              <a:rPr lang="en-US" dirty="0"/>
-              <a:t>Test the operational and financial performance of multi-engine aircraft in select routes.</a:t>
-            </a:r>
-          </a:p>
-          <a:p>
-            <a:r>
-              <a:rPr lang="en-US" b="1" dirty="0"/>
-              <a:t>Strengthen Safety Culture: </a:t>
-            </a:r>
-            <a:r>
-              <a:rPr lang="en-US" dirty="0"/>
-              <a:t>Enhance training programs and maintenance schedules for high-usage aircraft.</a:t>
-            </a:r>
-          </a:p>
-          <a:p>
-            <a:r>
-              <a:rPr lang="en-US" b="1" dirty="0"/>
-              <a:t>Address Data Gaps: </a:t>
-            </a:r>
-            <a:r>
-              <a:rPr lang="en-US" dirty="0"/>
-              <a:t>Collaborate with aviation authorities to improve weather and accident reporting standards.</a:t>
+          <a:bodyPr>
+            <a:normAutofit fontScale="92500" lnSpcReduction="20000"/>
+          </a:bodyPr>
+          <a:lstStyle/>
+          <a:p>
+            <a:pPr>
+              <a:buFont typeface="+mj-lt"/>
+              <a:buAutoNum type="arabicPeriod"/>
+            </a:pPr>
+            <a:r>
+              <a:rPr lang="en-US" sz="2600" b="1" dirty="0">
+                <a:latin typeface="Arial" panose="020B0604020202020204" pitchFamily="34" charset="0"/>
+                <a:cs typeface="Arial" panose="020B0604020202020204" pitchFamily="34" charset="0"/>
+              </a:rPr>
+              <a:t>Focus on Proven Safe Models</a:t>
+            </a:r>
+            <a:r>
+              <a:rPr lang="en-US" sz="2600" dirty="0">
+                <a:latin typeface="Arial" panose="020B0604020202020204" pitchFamily="34" charset="0"/>
+                <a:cs typeface="Arial" panose="020B0604020202020204" pitchFamily="34" charset="0"/>
+              </a:rPr>
+              <a:t>:</a:t>
+            </a:r>
+          </a:p>
+          <a:p>
+            <a:pPr marL="457200" lvl="1" indent="0">
+              <a:buNone/>
+            </a:pPr>
+            <a:r>
+              <a:rPr lang="en-US" sz="2600" dirty="0">
+                <a:latin typeface="Arial" panose="020B0604020202020204" pitchFamily="34" charset="0"/>
+                <a:cs typeface="Arial" panose="020B0604020202020204" pitchFamily="34" charset="0"/>
+              </a:rPr>
+              <a:t> Select aircraft like modern iterations of Boeing and Airbus models with strong safety records.</a:t>
+            </a:r>
+          </a:p>
+          <a:p>
+            <a:pPr>
+              <a:buFont typeface="+mj-lt"/>
+              <a:buAutoNum type="arabicPeriod"/>
+            </a:pPr>
+            <a:r>
+              <a:rPr lang="en-US" sz="2600" b="1" dirty="0">
+                <a:latin typeface="Arial" panose="020B0604020202020204" pitchFamily="34" charset="0"/>
+                <a:cs typeface="Arial" panose="020B0604020202020204" pitchFamily="34" charset="0"/>
+              </a:rPr>
+              <a:t>Emphasize on Multi-Engine Aircraft</a:t>
+            </a:r>
+            <a:r>
+              <a:rPr lang="en-US" sz="2600" dirty="0">
+                <a:latin typeface="Arial" panose="020B0604020202020204" pitchFamily="34" charset="0"/>
+                <a:cs typeface="Arial" panose="020B0604020202020204" pitchFamily="34" charset="0"/>
+              </a:rPr>
+              <a:t>:</a:t>
+            </a:r>
+          </a:p>
+          <a:p>
+            <a:pPr marL="457200" lvl="1" indent="0">
+              <a:buNone/>
+            </a:pPr>
+            <a:r>
+              <a:rPr lang="en-US" sz="2600" dirty="0">
+                <a:latin typeface="Arial" panose="020B0604020202020204" pitchFamily="34" charset="0"/>
+                <a:cs typeface="Arial" panose="020B0604020202020204" pitchFamily="34" charset="0"/>
+              </a:rPr>
+              <a:t>Multi-engine redundancy enhances safety for high-stakes and commercial operations.</a:t>
+            </a:r>
+          </a:p>
+          <a:p>
+            <a:pPr>
+              <a:buFont typeface="+mj-lt"/>
+              <a:buAutoNum type="arabicPeriod"/>
+            </a:pPr>
+            <a:r>
+              <a:rPr lang="en-US" sz="2600" b="1" dirty="0">
+                <a:latin typeface="Arial" panose="020B0604020202020204" pitchFamily="34" charset="0"/>
+                <a:cs typeface="Arial" panose="020B0604020202020204" pitchFamily="34" charset="0"/>
+              </a:rPr>
+              <a:t>Invest in Technology</a:t>
+            </a:r>
+            <a:r>
+              <a:rPr lang="en-US" sz="2600" dirty="0">
+                <a:latin typeface="Arial" panose="020B0604020202020204" pitchFamily="34" charset="0"/>
+                <a:cs typeface="Arial" panose="020B0604020202020204" pitchFamily="34" charset="0"/>
+              </a:rPr>
+              <a:t>:</a:t>
+            </a:r>
+          </a:p>
+          <a:p>
+            <a:pPr marL="457200" lvl="1" indent="0">
+              <a:buNone/>
+            </a:pPr>
+            <a:r>
+              <a:rPr lang="en-US" sz="2600" dirty="0" err="1">
+                <a:latin typeface="Arial" panose="020B0604020202020204" pitchFamily="34" charset="0"/>
+                <a:cs typeface="Arial" panose="020B0604020202020204" pitchFamily="34" charset="0"/>
+              </a:rPr>
+              <a:t>Opt</a:t>
+            </a:r>
+            <a:r>
+              <a:rPr lang="en-US" sz="2600" dirty="0">
+                <a:latin typeface="Arial" panose="020B0604020202020204" pitchFamily="34" charset="0"/>
+                <a:cs typeface="Arial" panose="020B0604020202020204" pitchFamily="34" charset="0"/>
+              </a:rPr>
+              <a:t> for aircraft with advanced weather detection and automation features.</a:t>
             </a:r>
           </a:p>
           <a:p>
@@ -4611,7 +4538,7 @@
     </p:spTree>
     <p:extLst>
       <p:ext uri="{BB962C8B-B14F-4D97-AF65-F5344CB8AC3E}">
-        <p14:creationId xmlns:p14="http://schemas.microsoft.com/office/powerpoint/2010/main" val="589155919"/>
+        <p14:creationId xmlns:p14="http://schemas.microsoft.com/office/powerpoint/2010/main" val="3561342553"/>
       </p:ext>
     </p:extLst>
   </p:cSld>
@@ -4643,7 +4570,7 @@
           <p:cNvPr id="2" name="Title 1">
             <a:extLst>
               <a:ext uri="{FF2B5EF4-FFF2-40B4-BE49-F238E27FC236}">
-                <a16:creationId xmlns:a16="http://schemas.microsoft.com/office/drawing/2014/main" id="{0F38C349-4F17-D401-C6DA-07E04D720100}"/>
+                <a16:creationId xmlns:a16="http://schemas.microsoft.com/office/drawing/2014/main" id="{74592DD9-94CD-F2D4-641D-92250202CD8D}"/>
               </a:ext>
             </a:extLst>
           </p:cNvPr>
@@ -4651,6 +4578,171 @@
             <a:spLocks noGrp="1"/>
           </p:cNvSpPr>
           <p:nvPr>
+            <p:ph type="title"/>
+          </p:nvPr>
+        </p:nvSpPr>
+        <p:spPr/>
+        <p:txBody>
+          <a:bodyPr/>
+          <a:lstStyle/>
+          <a:p>
+            <a:r>
+              <a:rPr lang="en-US" sz="5400" dirty="0">
+                <a:latin typeface="Roboto" panose="02000000000000000000" pitchFamily="2" charset="0"/>
+                <a:ea typeface="Roboto" panose="02000000000000000000" pitchFamily="2" charset="0"/>
+                <a:cs typeface="Roboto" panose="02000000000000000000" pitchFamily="2" charset="0"/>
+              </a:rPr>
+              <a:t>Next</a:t>
+            </a:r>
+            <a:r>
+              <a:rPr lang="en-US" dirty="0"/>
+              <a:t> </a:t>
+            </a:r>
+            <a:r>
+              <a:rPr lang="en-US" sz="5400" dirty="0">
+                <a:latin typeface="Roboto" panose="02000000000000000000" pitchFamily="2" charset="0"/>
+                <a:ea typeface="Roboto" panose="02000000000000000000" pitchFamily="2" charset="0"/>
+                <a:cs typeface="Roboto" panose="02000000000000000000" pitchFamily="2" charset="0"/>
+              </a:rPr>
+              <a:t>Steps</a:t>
+            </a:r>
+          </a:p>
+        </p:txBody>
+      </p:sp>
+      <p:sp>
+        <p:nvSpPr>
+          <p:cNvPr id="3" name="Content Placeholder 2">
+            <a:extLst>
+              <a:ext uri="{FF2B5EF4-FFF2-40B4-BE49-F238E27FC236}">
+                <a16:creationId xmlns:a16="http://schemas.microsoft.com/office/drawing/2014/main" id="{C0FFBAA3-05B9-9C50-2A82-98A0EDC78671}"/>
+              </a:ext>
+            </a:extLst>
+          </p:cNvPr>
+          <p:cNvSpPr>
+            <a:spLocks noGrp="1"/>
+          </p:cNvSpPr>
+          <p:nvPr>
+            <p:ph idx="1"/>
+          </p:nvPr>
+        </p:nvSpPr>
+        <p:spPr/>
+        <p:txBody>
+          <a:bodyPr>
+            <a:normAutofit fontScale="92500"/>
+          </a:bodyPr>
+          <a:lstStyle/>
+          <a:p>
+            <a:r>
+              <a:rPr lang="en-US" sz="2400" b="1" dirty="0">
+                <a:latin typeface="Arial" panose="020B0604020202020204" pitchFamily="34" charset="0"/>
+                <a:cs typeface="Arial" panose="020B0604020202020204" pitchFamily="34" charset="0"/>
+              </a:rPr>
+              <a:t>Assess High-Usage Models: </a:t>
+            </a:r>
+            <a:r>
+              <a:rPr lang="en-US" sz="2400" dirty="0">
+                <a:latin typeface="Arial" panose="020B0604020202020204" pitchFamily="34" charset="0"/>
+                <a:cs typeface="Arial" panose="020B0604020202020204" pitchFamily="34" charset="0"/>
+              </a:rPr>
+              <a:t>Conduct safety and reliability assessments for frequently used aircraft models.</a:t>
+            </a:r>
+          </a:p>
+          <a:p>
+            <a:r>
+              <a:rPr lang="en-US" sz="2400" b="1" dirty="0">
+                <a:latin typeface="Arial" panose="020B0604020202020204" pitchFamily="34" charset="0"/>
+                <a:cs typeface="Arial" panose="020B0604020202020204" pitchFamily="34" charset="0"/>
+              </a:rPr>
+              <a:t>Pilot Program for Multi-Engine Aircraft: </a:t>
+            </a:r>
+            <a:r>
+              <a:rPr lang="en-US" sz="2400" dirty="0">
+                <a:latin typeface="Arial" panose="020B0604020202020204" pitchFamily="34" charset="0"/>
+                <a:cs typeface="Arial" panose="020B0604020202020204" pitchFamily="34" charset="0"/>
+              </a:rPr>
+              <a:t>Test the operational and financial performance of multi-engine aircraft in select routes.</a:t>
+            </a:r>
+          </a:p>
+          <a:p>
+            <a:r>
+              <a:rPr lang="en-US" sz="2400" b="1" dirty="0">
+                <a:latin typeface="Arial" panose="020B0604020202020204" pitchFamily="34" charset="0"/>
+                <a:cs typeface="Arial" panose="020B0604020202020204" pitchFamily="34" charset="0"/>
+              </a:rPr>
+              <a:t>Improve Safety Culture: </a:t>
+            </a:r>
+            <a:r>
+              <a:rPr lang="en-US" sz="2400" dirty="0">
+                <a:latin typeface="Arial" panose="020B0604020202020204" pitchFamily="34" charset="0"/>
+                <a:cs typeface="Arial" panose="020B0604020202020204" pitchFamily="34" charset="0"/>
+              </a:rPr>
+              <a:t>Enhance training programs and maintenance schedules for high-usage aircraft and high risk phases like takeoff and landing.</a:t>
+            </a:r>
+          </a:p>
+          <a:p>
+            <a:r>
+              <a:rPr lang="en-US" sz="2400" b="1" dirty="0">
+                <a:latin typeface="Arial" panose="020B0604020202020204" pitchFamily="34" charset="0"/>
+                <a:cs typeface="Arial" panose="020B0604020202020204" pitchFamily="34" charset="0"/>
+              </a:rPr>
+              <a:t>Address Data Gaps: </a:t>
+            </a:r>
+            <a:r>
+              <a:rPr lang="en-US" sz="2400" dirty="0">
+                <a:latin typeface="Arial" panose="020B0604020202020204" pitchFamily="34" charset="0"/>
+                <a:cs typeface="Arial" panose="020B0604020202020204" pitchFamily="34" charset="0"/>
+              </a:rPr>
+              <a:t>Collaborate with aviation authorities to improve weather and accident reporting standards.</a:t>
+            </a:r>
+          </a:p>
+          <a:p>
+            <a:endParaRPr lang="en-US" dirty="0"/>
+          </a:p>
+        </p:txBody>
+      </p:sp>
+    </p:spTree>
+    <p:extLst>
+      <p:ext uri="{BB962C8B-B14F-4D97-AF65-F5344CB8AC3E}">
+        <p14:creationId xmlns:p14="http://schemas.microsoft.com/office/powerpoint/2010/main" val="589155919"/>
+      </p:ext>
+    </p:extLst>
+  </p:cSld>
+  <p:clrMapOvr>
+    <a:masterClrMapping/>
+  </p:clrMapOvr>
+</p:sld>
+</file>
+
+<file path=ppt/slides/slide15.xml><?xml version="1.0" encoding="utf-8"?>
+<p:sld xmlns:a="http://schemas.openxmlformats.org/drawingml/2006/main" xmlns:r="http://schemas.openxmlformats.org/officeDocument/2006/relationships" xmlns:p="http://schemas.openxmlformats.org/presentationml/2006/main">
+  <p:cSld>
+    <p:spTree>
+      <p:nvGrpSpPr>
+        <p:cNvPr id="1" name=""/>
+        <p:cNvGrpSpPr/>
+        <p:nvPr/>
+      </p:nvGrpSpPr>
+      <p:grpSpPr>
+        <a:xfrm>
+          <a:off x="0" y="0"/>
+          <a:ext cx="0" cy="0"/>
+          <a:chOff x="0" y="0"/>
+          <a:chExt cx="0" cy="0"/>
+        </a:xfrm>
+      </p:grpSpPr>
+      <p:sp>
+        <p:nvSpPr>
+          <p:cNvPr id="2" name="Title 1">
+            <a:extLst>
+              <a:ext uri="{FF2B5EF4-FFF2-40B4-BE49-F238E27FC236}">
+                <a16:creationId xmlns:a16="http://schemas.microsoft.com/office/drawing/2014/main" id="{0F38C349-4F17-D401-C6DA-07E04D720100}"/>
+              </a:ext>
+            </a:extLst>
+          </p:cNvPr>
+          <p:cNvSpPr>
+            <a:spLocks noGrp="1"/>
+          </p:cNvSpPr>
+          <p:nvPr>
             <p:ph type="ctrTitle"/>
           </p:nvPr>
         </p:nvSpPr>
@@ -4661,17 +4753,33 @@
           <a:p>
             <a:pPr algn="ctr"/>
             <a:r>
-              <a:rPr lang="en-US" dirty="0"/>
+              <a:rPr lang="en-US" dirty="0">
+                <a:latin typeface="Roboto" panose="02000000000000000000" pitchFamily="2" charset="0"/>
+                <a:ea typeface="Roboto" panose="02000000000000000000" pitchFamily="2" charset="0"/>
+                <a:cs typeface="Roboto" panose="02000000000000000000" pitchFamily="2" charset="0"/>
+              </a:rPr>
               <a:t>Thank You. </a:t>
             </a:r>
             <a:br>
-              <a:rPr lang="en-US" dirty="0"/>
+              <a:rPr lang="en-US" dirty="0">
+                <a:latin typeface="Roboto" panose="02000000000000000000" pitchFamily="2" charset="0"/>
+                <a:ea typeface="Roboto" panose="02000000000000000000" pitchFamily="2" charset="0"/>
+                <a:cs typeface="Roboto" panose="02000000000000000000" pitchFamily="2" charset="0"/>
+              </a:rPr>
             </a:br>
             <a:br>
-              <a:rPr lang="en-US" dirty="0"/>
+              <a:rPr lang="en-US" dirty="0">
+                <a:latin typeface="Roboto" panose="02000000000000000000" pitchFamily="2" charset="0"/>
+                <a:ea typeface="Roboto" panose="02000000000000000000" pitchFamily="2" charset="0"/>
+                <a:cs typeface="Roboto" panose="02000000000000000000" pitchFamily="2" charset="0"/>
+              </a:rPr>
             </a:br>
             <a:r>
-              <a:rPr lang="en-US" dirty="0"/>
+              <a:rPr lang="en-US" dirty="0">
+                <a:latin typeface="Roboto" panose="02000000000000000000" pitchFamily="2" charset="0"/>
+                <a:ea typeface="Roboto" panose="02000000000000000000" pitchFamily="2" charset="0"/>
+                <a:cs typeface="Roboto" panose="02000000000000000000" pitchFamily="2" charset="0"/>
+              </a:rPr>
               <a:t>Q&amp;A</a:t>
             </a:r>
           </a:p>
@@ -4714,19 +4822,29 @@
               </a:rPr>
               <a:t>Lydia Mangoa</a:t>
             </a:r>
-            <a:endParaRPr lang="en-US" sz="1400" dirty="0">
+          </a:p>
+          <a:p>
+            <a:r>
+              <a:rPr lang="en-US" sz="1400" cap="none" dirty="0">
+                <a:latin typeface="Arial" panose="020B0604020202020204" pitchFamily="34" charset="0"/>
+                <a:cs typeface="Arial" panose="020B0604020202020204" pitchFamily="34" charset="0"/>
+              </a:rPr>
+              <a:t>LinkedIn: </a:t>
+            </a:r>
+            <a:r>
+              <a:rPr lang="en-US" sz="1400" cap="none" dirty="0">
+                <a:latin typeface="Arial" panose="020B0604020202020204" pitchFamily="34" charset="0"/>
+                <a:cs typeface="Arial" panose="020B0604020202020204" pitchFamily="34" charset="0"/>
+                <a:hlinkClick r:id="rId2"/>
+              </a:rPr>
+              <a:t>http://www.linkedin.com/in/lydia-mangoa-2b5b68a8</a:t>
+            </a:r>
+            <a:endParaRPr lang="en-US" sz="1400" cap="none" dirty="0">
               <a:latin typeface="Arial" panose="020B0604020202020204" pitchFamily="34" charset="0"/>
               <a:cs typeface="Arial" panose="020B0604020202020204" pitchFamily="34" charset="0"/>
             </a:endParaRPr>
           </a:p>
           <a:p>
-            <a:r>
-              <a:rPr lang="en-US" sz="1400" cap="none" dirty="0">
-                <a:latin typeface="Arial" panose="020B0604020202020204" pitchFamily="34" charset="0"/>
-                <a:cs typeface="Arial" panose="020B0604020202020204" pitchFamily="34" charset="0"/>
-              </a:rPr>
-              <a:t>LinkedIn profile: https://www.linkedin.com/in/lydia-mangoa-2b5b68a8?lipi=urn%3Ali%3Apage%3Ad_flagship3_profile_view_base_contact_details%3BsgMVvZ7QTASgptfjPpr2cw%3D%3D</a:t>
-            </a:r>
             <a:endParaRPr lang="en-US" sz="1400" dirty="0">
               <a:latin typeface="Arial" panose="020B0604020202020204" pitchFamily="34" charset="0"/>
               <a:cs typeface="Arial" panose="020B0604020202020204" pitchFamily="34" charset="0"/>
@@ -4817,32 +4935,47 @@
         <p:spPr/>
         <p:txBody>
           <a:bodyPr>
-            <a:normAutofit fontScale="85000" lnSpcReduction="20000"/>
+            <a:normAutofit fontScale="77500" lnSpcReduction="20000"/>
           </a:bodyPr>
           <a:lstStyle/>
           <a:p>
             <a:r>
-              <a:rPr lang="en-US" sz="2400" b="1" dirty="0"/>
+              <a:rPr lang="en-US" sz="2600" b="1" dirty="0">
+                <a:latin typeface="Arial" panose="020B0604020202020204" pitchFamily="34" charset="0"/>
+                <a:cs typeface="Arial" panose="020B0604020202020204" pitchFamily="34" charset="0"/>
+              </a:rPr>
               <a:t>Goal</a:t>
             </a:r>
             <a:r>
-              <a:rPr lang="en-US" sz="2400" dirty="0"/>
+              <a:rPr lang="en-US" sz="2600" dirty="0">
+                <a:latin typeface="Arial" panose="020B0604020202020204" pitchFamily="34" charset="0"/>
+                <a:cs typeface="Arial" panose="020B0604020202020204" pitchFamily="34" charset="0"/>
+              </a:rPr>
               <a:t>: </a:t>
             </a:r>
           </a:p>
           <a:p>
             <a:r>
-              <a:rPr lang="en-US" sz="2400" dirty="0"/>
+              <a:rPr lang="en-US" sz="2600" dirty="0">
+                <a:latin typeface="Arial" panose="020B0604020202020204" pitchFamily="34" charset="0"/>
+                <a:cs typeface="Arial" panose="020B0604020202020204" pitchFamily="34" charset="0"/>
+              </a:rPr>
               <a:t>Identify low-risk aircraft models for commercial and private operations by analyzing historical aviation accident data.</a:t>
             </a:r>
           </a:p>
           <a:p>
             <a:r>
-              <a:rPr lang="en-US" sz="2400" b="1" dirty="0"/>
+              <a:rPr lang="en-US" sz="2600" b="1" dirty="0">
+                <a:latin typeface="Arial" panose="020B0604020202020204" pitchFamily="34" charset="0"/>
+                <a:cs typeface="Arial" panose="020B0604020202020204" pitchFamily="34" charset="0"/>
+              </a:rPr>
               <a:t>Objectives</a:t>
             </a:r>
             <a:r>
-              <a:rPr lang="en-US" sz="2400" dirty="0"/>
+              <a:rPr lang="en-US" sz="2600" dirty="0">
+                <a:latin typeface="Arial" panose="020B0604020202020204" pitchFamily="34" charset="0"/>
+                <a:cs typeface="Arial" panose="020B0604020202020204" pitchFamily="34" charset="0"/>
+              </a:rPr>
               <a:t>:</a:t>
             </a:r>
           </a:p>
@@ -4852,8 +4985,11 @@
               <a:buChar char="•"/>
             </a:pPr>
             <a:r>
-              <a:rPr lang="en-US" sz="2400" dirty="0"/>
-              <a:t>Understand trends in aviation accidents.</a:t>
+              <a:rPr lang="en-US" sz="2600" dirty="0">
+                <a:latin typeface="Arial" panose="020B0604020202020204" pitchFamily="34" charset="0"/>
+                <a:cs typeface="Arial" panose="020B0604020202020204" pitchFamily="34" charset="0"/>
+              </a:rPr>
+              <a:t>Recognize accident patterns to minimize risk.</a:t>
             </a:r>
           </a:p>
           <a:p>
@@ -4862,8 +4998,11 @@
               <a:buChar char="•"/>
             </a:pPr>
             <a:r>
-              <a:rPr lang="en-US" sz="2400" dirty="0"/>
-              <a:t>Evaluate the impact of aircraft design (e.g., engine configurations) on safety.</a:t>
+              <a:rPr lang="en-US" sz="2600" dirty="0">
+                <a:latin typeface="Arial" panose="020B0604020202020204" pitchFamily="34" charset="0"/>
+                <a:cs typeface="Arial" panose="020B0604020202020204" pitchFamily="34" charset="0"/>
+              </a:rPr>
+              <a:t>Evaluate design factors like engine configuration on safety.</a:t>
             </a:r>
           </a:p>
           <a:p>
@@ -4872,8 +5011,11 @@
               <a:buChar char="•"/>
             </a:pPr>
             <a:r>
-              <a:rPr lang="en-US" sz="2400" dirty="0"/>
-              <a:t>Provide data-driven recommendations to guide fleet selection.</a:t>
+              <a:rPr lang="en-US" sz="2600" dirty="0">
+                <a:latin typeface="Arial" panose="020B0604020202020204" pitchFamily="34" charset="0"/>
+                <a:cs typeface="Arial" panose="020B0604020202020204" pitchFamily="34" charset="0"/>
+              </a:rPr>
+              <a:t>Deliver actionable recommendations for informed fleet selection.</a:t>
             </a:r>
           </a:p>
           <a:p>
@@ -4970,11 +5112,17 @@
           <a:lstStyle/>
           <a:p>
             <a:r>
-              <a:rPr lang="en-US" sz="2000" b="1" dirty="0"/>
+              <a:rPr lang="en-US" sz="2400" b="1" dirty="0">
+                <a:latin typeface="Arial" panose="020B0604020202020204" pitchFamily="34" charset="0"/>
+                <a:cs typeface="Arial" panose="020B0604020202020204" pitchFamily="34" charset="0"/>
+              </a:rPr>
               <a:t>Stakeholders</a:t>
             </a:r>
             <a:r>
-              <a:rPr lang="en-US" sz="2000" dirty="0"/>
+              <a:rPr lang="en-US" sz="2400" dirty="0">
+                <a:latin typeface="Arial" panose="020B0604020202020204" pitchFamily="34" charset="0"/>
+                <a:cs typeface="Arial" panose="020B0604020202020204" pitchFamily="34" charset="0"/>
+              </a:rPr>
               <a:t>:</a:t>
             </a:r>
           </a:p>
@@ -4984,12 +5132,18 @@
               <a:buChar char="•"/>
             </a:pPr>
             <a:r>
-              <a:rPr lang="en-US" sz="2000" b="1" dirty="0"/>
+              <a:rPr lang="en-US" sz="2400" b="1" dirty="0">
+                <a:latin typeface="Arial" panose="020B0604020202020204" pitchFamily="34" charset="0"/>
+                <a:cs typeface="Arial" panose="020B0604020202020204" pitchFamily="34" charset="0"/>
+              </a:rPr>
               <a:t>Head of Aviation Division</a:t>
             </a:r>
             <a:r>
-              <a:rPr lang="en-US" sz="2000" dirty="0"/>
-              <a:t>: Makes purchasing decisions.</a:t>
+              <a:rPr lang="en-US" sz="2400" dirty="0">
+                <a:latin typeface="Arial" panose="020B0604020202020204" pitchFamily="34" charset="0"/>
+                <a:cs typeface="Arial" panose="020B0604020202020204" pitchFamily="34" charset="0"/>
+              </a:rPr>
+              <a:t>: Makes purchasing decisions and oversees aircraft selection and safety strategies.</a:t>
             </a:r>
           </a:p>
           <a:p>
@@ -4998,12 +5152,18 @@
               <a:buChar char="•"/>
             </a:pPr>
             <a:r>
-              <a:rPr lang="en-US" sz="2000" b="1" dirty="0"/>
+              <a:rPr lang="en-US" sz="2400" b="1" dirty="0">
+                <a:latin typeface="Arial" panose="020B0604020202020204" pitchFamily="34" charset="0"/>
+                <a:cs typeface="Arial" panose="020B0604020202020204" pitchFamily="34" charset="0"/>
+              </a:rPr>
               <a:t>Leadership Team</a:t>
             </a:r>
             <a:r>
-              <a:rPr lang="en-US" sz="2000" dirty="0"/>
-              <a:t>: Focused on minimizing financial and operational risks.</a:t>
+              <a:rPr lang="en-US" sz="2400" dirty="0">
+                <a:latin typeface="Arial" panose="020B0604020202020204" pitchFamily="34" charset="0"/>
+                <a:cs typeface="Arial" panose="020B0604020202020204" pitchFamily="34" charset="0"/>
+              </a:rPr>
+              <a:t>: Focused on minimizing financial and operational risks and safeguard company reputation..</a:t>
             </a:r>
           </a:p>
           <a:p>
@@ -5078,7 +5238,7 @@
                 <a:ea typeface="Roboto" panose="02000000000000000000" pitchFamily="2" charset="0"/>
                 <a:cs typeface="Roboto" panose="02000000000000000000" pitchFamily="2" charset="0"/>
               </a:rPr>
-              <a:t>cont</a:t>
+              <a:t>Cont</a:t>
             </a:r>
             <a:r>
               <a:rPr lang="en-US" sz="5400" dirty="0">
@@ -5109,15 +5269,23 @@
         </p:nvSpPr>
         <p:spPr/>
         <p:txBody>
-          <a:bodyPr/>
-          <a:lstStyle/>
-          <a:p>
-            <a:r>
-              <a:rPr lang="en-US" sz="2000" b="1" dirty="0"/>
+          <a:bodyPr>
+            <a:noAutofit/>
+          </a:bodyPr>
+          <a:lstStyle/>
+          <a:p>
+            <a:r>
+              <a:rPr lang="en-US" sz="2400" b="1" dirty="0">
+                <a:latin typeface="Arial" panose="020B0604020202020204" pitchFamily="34" charset="0"/>
+                <a:cs typeface="Arial" panose="020B0604020202020204" pitchFamily="34" charset="0"/>
+              </a:rPr>
               <a:t>Key Business Questions</a:t>
             </a:r>
             <a:r>
-              <a:rPr lang="en-US" sz="2000" dirty="0"/>
+              <a:rPr lang="en-US" sz="2400" dirty="0">
+                <a:latin typeface="Arial" panose="020B0604020202020204" pitchFamily="34" charset="0"/>
+                <a:cs typeface="Arial" panose="020B0604020202020204" pitchFamily="34" charset="0"/>
+              </a:rPr>
               <a:t>:</a:t>
             </a:r>
           </a:p>
@@ -5127,8 +5295,11 @@
               <a:buAutoNum type="arabicPeriod"/>
             </a:pPr>
             <a:r>
-              <a:rPr lang="en-US" sz="2000" dirty="0"/>
-              <a:t>Which aircraft models have the lowest accident rates?</a:t>
+              <a:rPr lang="en-US" sz="2400" dirty="0">
+                <a:latin typeface="Arial" panose="020B0604020202020204" pitchFamily="34" charset="0"/>
+                <a:cs typeface="Arial" panose="020B0604020202020204" pitchFamily="34" charset="0"/>
+              </a:rPr>
+              <a:t>Which aircraft models offer the safest records for operation?</a:t>
             </a:r>
           </a:p>
           <a:p>
@@ -5137,8 +5308,11 @@
               <a:buAutoNum type="arabicPeriod"/>
             </a:pPr>
             <a:r>
-              <a:rPr lang="en-US" sz="2000" dirty="0"/>
-              <a:t>How does engine configuration affect safety and fatality rates?</a:t>
+              <a:rPr lang="en-US" sz="2400" dirty="0">
+                <a:latin typeface="Arial" panose="020B0604020202020204" pitchFamily="34" charset="0"/>
+                <a:cs typeface="Arial" panose="020B0604020202020204" pitchFamily="34" charset="0"/>
+              </a:rPr>
+              <a:t>How does design (e.g., engine configuration) influence accident outcomes?</a:t>
             </a:r>
           </a:p>
           <a:p>
@@ -5147,27 +5321,39 @@
               <a:buAutoNum type="arabicPeriod"/>
             </a:pPr>
             <a:r>
-              <a:rPr lang="en-US" sz="2000" dirty="0"/>
-              <a:t>What accident trends should inform aircraft selection?</a:t>
-            </a:r>
-          </a:p>
-          <a:p>
-            <a:endParaRPr lang="en-US" dirty="0"/>
-          </a:p>
-          <a:p>
-            <a:r>
-              <a:rPr lang="en-US" b="1" dirty="0"/>
+              <a:rPr lang="en-US" sz="2400" dirty="0">
+                <a:latin typeface="Arial" panose="020B0604020202020204" pitchFamily="34" charset="0"/>
+                <a:cs typeface="Arial" panose="020B0604020202020204" pitchFamily="34" charset="0"/>
+              </a:rPr>
+              <a:t>What historical trends should shape future decisions?</a:t>
+            </a:r>
+          </a:p>
+          <a:p>
+            <a:r>
+              <a:rPr lang="en-US" sz="2400" b="1" dirty="0">
+                <a:latin typeface="Arial" panose="020B0604020202020204" pitchFamily="34" charset="0"/>
+                <a:cs typeface="Arial" panose="020B0604020202020204" pitchFamily="34" charset="0"/>
+              </a:rPr>
               <a:t>Why This Matters</a:t>
             </a:r>
             <a:r>
-              <a:rPr lang="en-US" dirty="0"/>
+              <a:rPr lang="en-US" sz="2400" dirty="0">
+                <a:latin typeface="Arial" panose="020B0604020202020204" pitchFamily="34" charset="0"/>
+                <a:cs typeface="Arial" panose="020B0604020202020204" pitchFamily="34" charset="0"/>
+              </a:rPr>
               <a:t>:</a:t>
             </a:r>
             <a:br>
-              <a:rPr lang="en-US" dirty="0"/>
+              <a:rPr lang="en-US" sz="2400" dirty="0">
+                <a:latin typeface="Arial" panose="020B0604020202020204" pitchFamily="34" charset="0"/>
+                <a:cs typeface="Arial" panose="020B0604020202020204" pitchFamily="34" charset="0"/>
+              </a:rPr>
             </a:br>
             <a:r>
-              <a:rPr lang="en-US" dirty="0"/>
+              <a:rPr lang="en-US" sz="2400" dirty="0">
+                <a:latin typeface="Arial" panose="020B0604020202020204" pitchFamily="34" charset="0"/>
+                <a:cs typeface="Arial" panose="020B0604020202020204" pitchFamily="34" charset="0"/>
+              </a:rPr>
               <a:t>Reducing operational risks and improving safety enhances the company’s reputation and ensures financial sustainability.</a:t>
             </a:r>
           </a:p>
@@ -5255,28 +5441,53 @@
         </p:nvSpPr>
         <p:spPr/>
         <p:txBody>
-          <a:bodyPr/>
-          <a:lstStyle/>
-          <a:p>
-            <a:r>
-              <a:rPr lang="en-US" sz="2000" b="1" dirty="0"/>
+          <a:bodyPr>
+            <a:normAutofit fontScale="40000" lnSpcReduction="20000"/>
+          </a:bodyPr>
+          <a:lstStyle/>
+          <a:p>
+            <a:r>
+              <a:rPr lang="en-US" sz="4400" b="1" dirty="0">
+                <a:latin typeface="Arial" panose="020B0604020202020204" pitchFamily="34" charset="0"/>
+                <a:cs typeface="Arial" panose="020B0604020202020204" pitchFamily="34" charset="0"/>
+              </a:rPr>
               <a:t>Data Source</a:t>
             </a:r>
             <a:r>
-              <a:rPr lang="en-US" sz="2000" dirty="0"/>
-              <a:t>: The Kaggle Aviation Accident Database Synopses, a historical dataset with 88,889 records of aviation accidents.</a:t>
-            </a:r>
-            <a:br>
-              <a:rPr lang="en-US" sz="2000" dirty="0"/>
-            </a:br>
-            <a:r>
-              <a:rPr lang="en-US" sz="2000" b="1" dirty="0"/>
-              <a:t>Key Variables Analyzed</a:t>
-            </a:r>
-            <a:r>
-              <a:rPr lang="en-US" sz="2000" dirty="0"/>
-              <a:t>:</a:t>
-            </a:r>
+              <a:rPr lang="en-US" sz="4400" dirty="0">
+                <a:latin typeface="Arial" panose="020B0604020202020204" pitchFamily="34" charset="0"/>
+                <a:cs typeface="Arial" panose="020B0604020202020204" pitchFamily="34" charset="0"/>
+              </a:rPr>
+              <a:t>: </a:t>
+            </a:r>
+          </a:p>
+          <a:p>
+            <a:r>
+              <a:rPr lang="en-US" sz="4400" dirty="0">
+                <a:latin typeface="Arial" panose="020B0604020202020204" pitchFamily="34" charset="0"/>
+                <a:cs typeface="Arial" panose="020B0604020202020204" pitchFamily="34" charset="0"/>
+              </a:rPr>
+              <a:t>The Kaggle Aviation Accident Database Synopses, a historical dataset with 88,889 records of aviation accidents.</a:t>
+            </a:r>
+          </a:p>
+          <a:p>
+            <a:endParaRPr lang="en-US" sz="4400" b="1" dirty="0">
+              <a:latin typeface="Arial" panose="020B0604020202020204" pitchFamily="34" charset="0"/>
+              <a:cs typeface="Arial" panose="020B0604020202020204" pitchFamily="34" charset="0"/>
+            </a:endParaRPr>
+          </a:p>
+          <a:p>
+            <a:r>
+              <a:rPr lang="en-US" sz="4400" b="1" dirty="0">
+                <a:latin typeface="Arial" panose="020B0604020202020204" pitchFamily="34" charset="0"/>
+                <a:cs typeface="Arial" panose="020B0604020202020204" pitchFamily="34" charset="0"/>
+              </a:rPr>
+              <a:t>Key Data Points:</a:t>
+            </a:r>
+            <a:endParaRPr lang="en-US" sz="4400" dirty="0">
+              <a:latin typeface="Arial" panose="020B0604020202020204" pitchFamily="34" charset="0"/>
+              <a:cs typeface="Arial" panose="020B0604020202020204" pitchFamily="34" charset="0"/>
+            </a:endParaRPr>
           </a:p>
           <a:p>
             <a:pPr>
@@ -5284,12 +5495,18 @@
               <a:buChar char="•"/>
             </a:pPr>
             <a:r>
-              <a:rPr lang="en-US" sz="2000" b="1" dirty="0"/>
-              <a:t>Aircraft Models</a:t>
-            </a:r>
-            <a:r>
-              <a:rPr lang="en-US" sz="2000" dirty="0"/>
-              <a:t>: Accident frequency by model.</a:t>
+              <a:rPr lang="en-US" sz="4400" b="1" dirty="0">
+                <a:latin typeface="Arial" panose="020B0604020202020204" pitchFamily="34" charset="0"/>
+                <a:cs typeface="Arial" panose="020B0604020202020204" pitchFamily="34" charset="0"/>
+              </a:rPr>
+              <a:t>Aircraft Models:</a:t>
+            </a:r>
+            <a:r>
+              <a:rPr lang="en-US" sz="4400" dirty="0">
+                <a:latin typeface="Arial" panose="020B0604020202020204" pitchFamily="34" charset="0"/>
+                <a:cs typeface="Arial" panose="020B0604020202020204" pitchFamily="34" charset="0"/>
+              </a:rPr>
+              <a:t> Accident occurrences by type.</a:t>
             </a:r>
           </a:p>
           <a:p>
@@ -5298,12 +5515,18 @@
               <a:buChar char="•"/>
             </a:pPr>
             <a:r>
-              <a:rPr lang="en-US" sz="2000" b="1" dirty="0"/>
-              <a:t>Number of Engines</a:t>
-            </a:r>
-            <a:r>
-              <a:rPr lang="en-US" sz="2000" dirty="0"/>
-              <a:t>: Impact on safety and fatalities.</a:t>
+              <a:rPr lang="en-US" sz="4400" b="1" dirty="0">
+                <a:latin typeface="Arial" panose="020B0604020202020204" pitchFamily="34" charset="0"/>
+                <a:cs typeface="Arial" panose="020B0604020202020204" pitchFamily="34" charset="0"/>
+              </a:rPr>
+              <a:t>Engine Configuration:</a:t>
+            </a:r>
+            <a:r>
+              <a:rPr lang="en-US" sz="4400" dirty="0">
+                <a:latin typeface="Arial" panose="020B0604020202020204" pitchFamily="34" charset="0"/>
+                <a:cs typeface="Arial" panose="020B0604020202020204" pitchFamily="34" charset="0"/>
+              </a:rPr>
+              <a:t> Safety implications of single vs. multi-engine aircraft.</a:t>
             </a:r>
           </a:p>
           <a:p>
@@ -5312,26 +5535,24 @@
               <a:buChar char="•"/>
             </a:pPr>
             <a:r>
-              <a:rPr lang="en-US" sz="2000" b="1" dirty="0"/>
-              <a:t>Weather Conditions</a:t>
-            </a:r>
-            <a:r>
-              <a:rPr lang="en-US" sz="2000" dirty="0"/>
-              <a:t>: Influence on accident rates.</a:t>
-            </a:r>
+              <a:rPr lang="en-US" sz="4400" b="1" dirty="0">
+                <a:latin typeface="Arial" panose="020B0604020202020204" pitchFamily="34" charset="0"/>
+                <a:cs typeface="Arial" panose="020B0604020202020204" pitchFamily="34" charset="0"/>
+              </a:rPr>
+              <a:t>Weather Conditions:</a:t>
+            </a:r>
+            <a:r>
+              <a:rPr lang="en-US" sz="4400" dirty="0">
+                <a:latin typeface="Arial" panose="020B0604020202020204" pitchFamily="34" charset="0"/>
+                <a:cs typeface="Arial" panose="020B0604020202020204" pitchFamily="34" charset="0"/>
+              </a:rPr>
+              <a:t> Role of weather on accident frequencies.</a:t>
+            </a:r>
+          </a:p>
+          <a:p>
             <a:br>
               <a:rPr lang="en-US" sz="2000" dirty="0"/>
             </a:br>
-            <a:r>
-              <a:rPr lang="en-US" sz="2000" b="1" dirty="0"/>
-              <a:t>Challenges</a:t>
-            </a:r>
-            <a:r>
-              <a:rPr lang="en-US" sz="2000" dirty="0"/>
-              <a:t>: Addressing missing data and inconsistent reporting (e.g., unknown weather conditions).</a:t>
-            </a:r>
-          </a:p>
-          <a:p>
             <a:endParaRPr lang="en-US" dirty="0"/>
           </a:p>
         </p:txBody>
@@ -5354,6 +5575,156 @@
   <p:cSld>
     <p:spTree>
       <p:nvGrpSpPr>
+        <p:cNvPr id="1" name="">
+          <a:extLst>
+            <a:ext uri="{FF2B5EF4-FFF2-40B4-BE49-F238E27FC236}">
+              <a16:creationId xmlns:a16="http://schemas.microsoft.com/office/drawing/2014/main" id="{EE4B5F94-D7C4-0A93-5264-791C0702D421}"/>
+            </a:ext>
+          </a:extLst>
+        </p:cNvPr>
+        <p:cNvGrpSpPr/>
+        <p:nvPr/>
+      </p:nvGrpSpPr>
+      <p:grpSpPr>
+        <a:xfrm>
+          <a:off x="0" y="0"/>
+          <a:ext cx="0" cy="0"/>
+          <a:chOff x="0" y="0"/>
+          <a:chExt cx="0" cy="0"/>
+        </a:xfrm>
+      </p:grpSpPr>
+      <p:sp>
+        <p:nvSpPr>
+          <p:cNvPr id="2" name="Title 1">
+            <a:extLst>
+              <a:ext uri="{FF2B5EF4-FFF2-40B4-BE49-F238E27FC236}">
+                <a16:creationId xmlns:a16="http://schemas.microsoft.com/office/drawing/2014/main" id="{426B598B-CE7C-BE2B-F869-4FECF9007F8E}"/>
+              </a:ext>
+            </a:extLst>
+          </p:cNvPr>
+          <p:cNvSpPr>
+            <a:spLocks noGrp="1"/>
+          </p:cNvSpPr>
+          <p:nvPr>
+            <p:ph type="title"/>
+          </p:nvPr>
+        </p:nvSpPr>
+        <p:spPr/>
+        <p:txBody>
+          <a:bodyPr>
+            <a:normAutofit/>
+          </a:bodyPr>
+          <a:lstStyle/>
+          <a:p>
+            <a:r>
+              <a:rPr lang="en-US" sz="5400" dirty="0">
+                <a:latin typeface="Roboto" panose="02000000000000000000" pitchFamily="2" charset="0"/>
+                <a:ea typeface="Roboto" panose="02000000000000000000" pitchFamily="2" charset="0"/>
+                <a:cs typeface="Roboto" panose="02000000000000000000" pitchFamily="2" charset="0"/>
+              </a:rPr>
+              <a:t>Data Understanding</a:t>
+            </a:r>
+          </a:p>
+        </p:txBody>
+      </p:sp>
+      <p:sp>
+        <p:nvSpPr>
+          <p:cNvPr id="3" name="Content Placeholder 2">
+            <a:extLst>
+              <a:ext uri="{FF2B5EF4-FFF2-40B4-BE49-F238E27FC236}">
+                <a16:creationId xmlns:a16="http://schemas.microsoft.com/office/drawing/2014/main" id="{D6FE8B59-8026-F5C5-9AE6-8B56C5F3D9A3}"/>
+              </a:ext>
+            </a:extLst>
+          </p:cNvPr>
+          <p:cNvSpPr>
+            <a:spLocks noGrp="1"/>
+          </p:cNvSpPr>
+          <p:nvPr>
+            <p:ph idx="1"/>
+          </p:nvPr>
+        </p:nvSpPr>
+        <p:spPr/>
+        <p:txBody>
+          <a:bodyPr>
+            <a:normAutofit/>
+          </a:bodyPr>
+          <a:lstStyle/>
+          <a:p>
+            <a:r>
+              <a:rPr lang="en-US" sz="2400" b="1" dirty="0">
+                <a:latin typeface="Arial" panose="020B0604020202020204" pitchFamily="34" charset="0"/>
+                <a:cs typeface="Arial" panose="020B0604020202020204" pitchFamily="34" charset="0"/>
+              </a:rPr>
+              <a:t>Challenges Addressed:</a:t>
+            </a:r>
+            <a:endParaRPr lang="en-US" sz="2400" dirty="0">
+              <a:latin typeface="Arial" panose="020B0604020202020204" pitchFamily="34" charset="0"/>
+              <a:cs typeface="Arial" panose="020B0604020202020204" pitchFamily="34" charset="0"/>
+            </a:endParaRPr>
+          </a:p>
+          <a:p>
+            <a:pPr>
+              <a:buFont typeface="Arial" panose="020B0604020202020204" pitchFamily="34" charset="0"/>
+              <a:buChar char="•"/>
+            </a:pPr>
+            <a:r>
+              <a:rPr lang="en-US" sz="2400" b="1" dirty="0">
+                <a:latin typeface="Arial" panose="020B0604020202020204" pitchFamily="34" charset="0"/>
+                <a:cs typeface="Arial" panose="020B0604020202020204" pitchFamily="34" charset="0"/>
+              </a:rPr>
+              <a:t>Data Completeness:</a:t>
+            </a:r>
+            <a:r>
+              <a:rPr lang="en-US" sz="2400" dirty="0">
+                <a:latin typeface="Arial" panose="020B0604020202020204" pitchFamily="34" charset="0"/>
+                <a:cs typeface="Arial" panose="020B0604020202020204" pitchFamily="34" charset="0"/>
+              </a:rPr>
+              <a:t> Mitigating "unknown" classifications in weather data.</a:t>
+            </a:r>
+          </a:p>
+          <a:p>
+            <a:pPr>
+              <a:buFont typeface="Arial" panose="020B0604020202020204" pitchFamily="34" charset="0"/>
+              <a:buChar char="•"/>
+            </a:pPr>
+            <a:r>
+              <a:rPr lang="en-US" sz="2400" b="1" dirty="0">
+                <a:latin typeface="Arial" panose="020B0604020202020204" pitchFamily="34" charset="0"/>
+                <a:cs typeface="Arial" panose="020B0604020202020204" pitchFamily="34" charset="0"/>
+              </a:rPr>
+              <a:t>Consistency:</a:t>
+            </a:r>
+            <a:r>
+              <a:rPr lang="en-US" sz="2400" dirty="0">
+                <a:latin typeface="Arial" panose="020B0604020202020204" pitchFamily="34" charset="0"/>
+                <a:cs typeface="Arial" panose="020B0604020202020204" pitchFamily="34" charset="0"/>
+              </a:rPr>
+              <a:t> Standardizing reporting variances.</a:t>
+            </a:r>
+          </a:p>
+          <a:p>
+            <a:endParaRPr lang="en-US" dirty="0"/>
+          </a:p>
+        </p:txBody>
+      </p:sp>
+    </p:spTree>
+    <p:extLst>
+      <p:ext uri="{BB962C8B-B14F-4D97-AF65-F5344CB8AC3E}">
+        <p14:creationId xmlns:p14="http://schemas.microsoft.com/office/powerpoint/2010/main" val="3548099832"/>
+      </p:ext>
+    </p:extLst>
+  </p:cSld>
+  <p:clrMapOvr>
+    <a:masterClrMapping/>
+  </p:clrMapOvr>
+</p:sld>
+</file>
+
+<file path=ppt/slides/slide7.xml><?xml version="1.0" encoding="utf-8"?>
+<p:sld xmlns:a="http://schemas.openxmlformats.org/drawingml/2006/main" xmlns:r="http://schemas.openxmlformats.org/officeDocument/2006/relationships" xmlns:p="http://schemas.openxmlformats.org/presentationml/2006/main">
+  <p:cSld>
+    <p:spTree>
+      <p:nvGrpSpPr>
         <p:cNvPr id="1" name=""/>
         <p:cNvGrpSpPr/>
         <p:nvPr/>
@@ -5418,7 +5789,9 @@
         </p:nvSpPr>
         <p:spPr/>
         <p:txBody>
-          <a:bodyPr/>
+          <a:bodyPr>
+            <a:normAutofit/>
+          </a:bodyPr>
           <a:lstStyle/>
           <a:p>
             <a:r>
@@ -5426,26 +5799,15 @@
                 <a:latin typeface="Arial" panose="020B0604020202020204" pitchFamily="34" charset="0"/>
                 <a:cs typeface="Arial" panose="020B0604020202020204" pitchFamily="34" charset="0"/>
               </a:rPr>
-              <a:t>Visualization</a:t>
+              <a:t>Visualization 1</a:t>
             </a:r>
             <a:r>
               <a:rPr lang="en-US" sz="2400" dirty="0">
                 <a:latin typeface="Arial" panose="020B0604020202020204" pitchFamily="34" charset="0"/>
                 <a:cs typeface="Arial" panose="020B0604020202020204" pitchFamily="34" charset="0"/>
               </a:rPr>
-              <a:t>: </a:t>
-            </a:r>
-            <a:r>
-              <a:rPr lang="en-US" sz="2400" i="1" dirty="0">
-                <a:latin typeface="Arial" panose="020B0604020202020204" pitchFamily="34" charset="0"/>
-                <a:cs typeface="Arial" panose="020B0604020202020204" pitchFamily="34" charset="0"/>
-              </a:rPr>
-              <a:t>Top 10 Aircraft Makes by Accident Count (Bar Chart)</a:t>
-            </a:r>
-            <a:endParaRPr lang="en-US" sz="2400" dirty="0">
-              <a:latin typeface="Arial" panose="020B0604020202020204" pitchFamily="34" charset="0"/>
-              <a:cs typeface="Arial" panose="020B0604020202020204" pitchFamily="34" charset="0"/>
-            </a:endParaRPr>
+              <a:t>: Top 10 Aircraft Makes by Accident Count (Bar Chart)</a:t>
+            </a:r>
           </a:p>
           <a:p>
             <a:pPr>
@@ -5457,7 +5819,7 @@
                 <a:latin typeface="Arial" panose="020B0604020202020204" pitchFamily="34" charset="0"/>
                 <a:cs typeface="Arial" panose="020B0604020202020204" pitchFamily="34" charset="0"/>
               </a:rPr>
-              <a:t>Key Insight</a:t>
+              <a:t>Insight</a:t>
             </a:r>
             <a:r>
               <a:rPr lang="en-US" sz="2400" dirty="0">
@@ -5480,13 +5842,8 @@
                 <a:latin typeface="Arial" panose="020B0604020202020204" pitchFamily="34" charset="0"/>
                 <a:cs typeface="Arial" panose="020B0604020202020204" pitchFamily="34" charset="0"/>
               </a:rPr>
-              <a:t>: </a:t>
-            </a:r>
-            <a:r>
-              <a:rPr lang="en-US" sz="2000" dirty="0"/>
-              <a:t>Focus safety audits and maintenance efforts on these high-usage models</a:t>
-            </a:r>
-            <a:endParaRPr lang="en-US" dirty="0"/>
+              <a:t>: Focus safety audits and maintenance efforts on these high-usage models</a:t>
+            </a:r>
           </a:p>
         </p:txBody>
       </p:sp>
@@ -5503,7 +5860,7 @@
 </p:sld>
 </file>
 
-<file path=ppt/slides/slide7.xml><?xml version="1.0" encoding="utf-8"?>
+<file path=ppt/slides/slide8.xml><?xml version="1.0" encoding="utf-8"?>
 <p:sld xmlns:a="http://schemas.openxmlformats.org/drawingml/2006/main" xmlns:r="http://schemas.openxmlformats.org/officeDocument/2006/relationships" xmlns:p="http://schemas.openxmlformats.org/presentationml/2006/main">
   <p:cSld>
     <p:spTree>
@@ -5563,184 +5920,6 @@
 </p:sld>
 </file>
 
-<file path=ppt/slides/slide8.xml><?xml version="1.0" encoding="utf-8"?>
-<p:sld xmlns:a="http://schemas.openxmlformats.org/drawingml/2006/main" xmlns:r="http://schemas.openxmlformats.org/officeDocument/2006/relationships" xmlns:p="http://schemas.openxmlformats.org/presentationml/2006/main">
-  <p:cSld>
-    <p:spTree>
-      <p:nvGrpSpPr>
-        <p:cNvPr id="1" name=""/>
-        <p:cNvGrpSpPr/>
-        <p:nvPr/>
-      </p:nvGrpSpPr>
-      <p:grpSpPr>
-        <a:xfrm>
-          <a:off x="0" y="0"/>
-          <a:ext cx="0" cy="0"/>
-          <a:chOff x="0" y="0"/>
-          <a:chExt cx="0" cy="0"/>
-        </a:xfrm>
-      </p:grpSpPr>
-      <p:sp>
-        <p:nvSpPr>
-          <p:cNvPr id="2" name="Title 1">
-            <a:extLst>
-              <a:ext uri="{FF2B5EF4-FFF2-40B4-BE49-F238E27FC236}">
-                <a16:creationId xmlns:a16="http://schemas.microsoft.com/office/drawing/2014/main" id="{91410208-8E0A-EDBF-DC8F-055EC616847D}"/>
-              </a:ext>
-            </a:extLst>
-          </p:cNvPr>
-          <p:cNvSpPr>
-            <a:spLocks noGrp="1"/>
-          </p:cNvSpPr>
-          <p:nvPr>
-            <p:ph type="title"/>
-          </p:nvPr>
-        </p:nvSpPr>
-        <p:spPr/>
-        <p:txBody>
-          <a:bodyPr>
-            <a:noAutofit/>
-          </a:bodyPr>
-          <a:lstStyle/>
-          <a:p>
-            <a:r>
-              <a:rPr lang="en-US" sz="5400" dirty="0">
-                <a:latin typeface="Roboto" panose="02000000000000000000" pitchFamily="2" charset="0"/>
-                <a:ea typeface="Roboto" panose="02000000000000000000" pitchFamily="2" charset="0"/>
-                <a:cs typeface="Roboto" panose="02000000000000000000" pitchFamily="2" charset="0"/>
-              </a:rPr>
-              <a:t>Data Analysis </a:t>
-            </a:r>
-            <a:r>
-              <a:rPr lang="en-US" sz="5400" dirty="0" err="1">
-                <a:latin typeface="Roboto" panose="02000000000000000000" pitchFamily="2" charset="0"/>
-                <a:ea typeface="Roboto" panose="02000000000000000000" pitchFamily="2" charset="0"/>
-                <a:cs typeface="Roboto" panose="02000000000000000000" pitchFamily="2" charset="0"/>
-              </a:rPr>
-              <a:t>Cont</a:t>
-            </a:r>
-            <a:r>
-              <a:rPr lang="en-US" sz="5400" dirty="0">
-                <a:latin typeface="Roboto" panose="02000000000000000000" pitchFamily="2" charset="0"/>
-                <a:ea typeface="Roboto" panose="02000000000000000000" pitchFamily="2" charset="0"/>
-                <a:cs typeface="Roboto" panose="02000000000000000000" pitchFamily="2" charset="0"/>
-              </a:rPr>
-              <a:t>…</a:t>
-            </a:r>
-          </a:p>
-        </p:txBody>
-      </p:sp>
-      <p:sp>
-        <p:nvSpPr>
-          <p:cNvPr id="3" name="Content Placeholder 2">
-            <a:extLst>
-              <a:ext uri="{FF2B5EF4-FFF2-40B4-BE49-F238E27FC236}">
-                <a16:creationId xmlns:a16="http://schemas.microsoft.com/office/drawing/2014/main" id="{74CD5CB9-2678-608B-B4E7-852FEFB793BD}"/>
-              </a:ext>
-            </a:extLst>
-          </p:cNvPr>
-          <p:cNvSpPr>
-            <a:spLocks noGrp="1"/>
-          </p:cNvSpPr>
-          <p:nvPr>
-            <p:ph idx="1"/>
-          </p:nvPr>
-        </p:nvSpPr>
-        <p:spPr/>
-        <p:txBody>
-          <a:bodyPr/>
-          <a:lstStyle/>
-          <a:p>
-            <a:r>
-              <a:rPr lang="en-US" sz="2400" b="1" dirty="0">
-                <a:latin typeface="Arial" panose="020B0604020202020204" pitchFamily="34" charset="0"/>
-                <a:cs typeface="Arial" panose="020B0604020202020204" pitchFamily="34" charset="0"/>
-              </a:rPr>
-              <a:t>Visualization</a:t>
-            </a:r>
-            <a:r>
-              <a:rPr lang="en-US" sz="2400" dirty="0">
-                <a:latin typeface="Arial" panose="020B0604020202020204" pitchFamily="34" charset="0"/>
-                <a:cs typeface="Arial" panose="020B0604020202020204" pitchFamily="34" charset="0"/>
-              </a:rPr>
-              <a:t>: </a:t>
-            </a:r>
-            <a:r>
-              <a:rPr lang="en-US" sz="2400" i="1" dirty="0">
-                <a:latin typeface="Arial" panose="020B0604020202020204" pitchFamily="34" charset="0"/>
-                <a:cs typeface="Arial" panose="020B0604020202020204" pitchFamily="34" charset="0"/>
-              </a:rPr>
-              <a:t>Yearly Trend in Aviation Accidents (Line Chart)</a:t>
-            </a:r>
-            <a:endParaRPr lang="en-US" sz="2400" dirty="0">
-              <a:latin typeface="Arial" panose="020B0604020202020204" pitchFamily="34" charset="0"/>
-              <a:cs typeface="Arial" panose="020B0604020202020204" pitchFamily="34" charset="0"/>
-            </a:endParaRPr>
-          </a:p>
-          <a:p>
-            <a:pPr>
-              <a:buFont typeface="Arial" panose="020B0604020202020204" pitchFamily="34" charset="0"/>
-              <a:buChar char="•"/>
-            </a:pPr>
-            <a:r>
-              <a:rPr lang="en-US" sz="2400" b="1" dirty="0">
-                <a:latin typeface="Arial" panose="020B0604020202020204" pitchFamily="34" charset="0"/>
-                <a:cs typeface="Arial" panose="020B0604020202020204" pitchFamily="34" charset="0"/>
-              </a:rPr>
-              <a:t>Key Insight</a:t>
-            </a:r>
-            <a:r>
-              <a:rPr lang="en-US" sz="2400" dirty="0">
-                <a:latin typeface="Arial" panose="020B0604020202020204" pitchFamily="34" charset="0"/>
-                <a:cs typeface="Arial" panose="020B0604020202020204" pitchFamily="34" charset="0"/>
-              </a:rPr>
-              <a:t>: </a:t>
-            </a:r>
-            <a:r>
-              <a:rPr lang="en-US" sz="2000" dirty="0"/>
-              <a:t>A declining trend in accidents since the 1980s, reflecting technological advancements and improved safety practices. Modern aircraft are safer due to enhanced navigation, automation, and design improvements.</a:t>
-            </a:r>
-          </a:p>
-          <a:p>
-            <a:pPr>
-              <a:buFont typeface="Arial" panose="020B0604020202020204" pitchFamily="34" charset="0"/>
-              <a:buChar char="•"/>
-            </a:pPr>
-            <a:r>
-              <a:rPr lang="en-US" sz="2400" b="1" dirty="0">
-                <a:latin typeface="Arial" panose="020B0604020202020204" pitchFamily="34" charset="0"/>
-                <a:cs typeface="Arial" panose="020B0604020202020204" pitchFamily="34" charset="0"/>
-              </a:rPr>
-              <a:t>Business Recommendation</a:t>
-            </a:r>
-            <a:r>
-              <a:rPr lang="en-US" sz="2400" dirty="0">
-                <a:latin typeface="Arial" panose="020B0604020202020204" pitchFamily="34" charset="0"/>
-                <a:cs typeface="Arial" panose="020B0604020202020204" pitchFamily="34" charset="0"/>
-              </a:rPr>
-              <a:t>: </a:t>
-            </a:r>
-            <a:r>
-              <a:rPr lang="en-US" sz="2000" dirty="0"/>
-              <a:t>Focus fleet acquisitions on newer models with advanced safety features.</a:t>
-            </a:r>
-            <a:endParaRPr lang="en-US" dirty="0"/>
-          </a:p>
-        </p:txBody>
-      </p:sp>
-    </p:spTree>
-    <p:extLst>
-      <p:ext uri="{BB962C8B-B14F-4D97-AF65-F5344CB8AC3E}">
-        <p14:creationId xmlns:p14="http://schemas.microsoft.com/office/powerpoint/2010/main" val="1657394520"/>
-      </p:ext>
-    </p:extLst>
-  </p:cSld>
-  <p:clrMapOvr>
-    <a:masterClrMapping/>
-  </p:clrMapOvr>
-</p:sld>
-</file>
-
 <file path=ppt/slides/slide9.xml><?xml version="1.0" encoding="utf-8"?>
 <p:sld xmlns:a="http://schemas.openxmlformats.org/drawingml/2006/main" xmlns:r="http://schemas.openxmlformats.org/officeDocument/2006/relationships" xmlns:p="http://schemas.openxmlformats.org/presentationml/2006/main">
   <p:cSld>
@@ -5758,40 +5937,140 @@
           <a:chExt cx="0" cy="0"/>
         </a:xfrm>
       </p:grpSpPr>
-      <p:pic>
-        <p:nvPicPr>
-          <p:cNvPr id="3" name="Picture 2">
+      <p:sp>
+        <p:nvSpPr>
+          <p:cNvPr id="2" name="Title 1">
             <a:extLst>
               <a:ext uri="{FF2B5EF4-FFF2-40B4-BE49-F238E27FC236}">
-                <a16:creationId xmlns:a16="http://schemas.microsoft.com/office/drawing/2014/main" id="{80C63C53-B3F2-8B8B-86C0-FD19F8B6F2B4}"/>
+                <a16:creationId xmlns:a16="http://schemas.microsoft.com/office/drawing/2014/main" id="{91410208-8E0A-EDBF-DC8F-055EC616847D}"/>
               </a:ext>
             </a:extLst>
           </p:cNvPr>
-          <p:cNvPicPr>
-            <a:picLocks noChangeAspect="1"/>
-          </p:cNvPicPr>
-          <p:nvPr/>
-        </p:nvPicPr>
-        <p:blipFill>
-          <a:blip r:embed="rId2"/>
-          <a:stretch>
-            <a:fillRect/>
-          </a:stretch>
-        </p:blipFill>
-        <p:spPr>
-          <a:xfrm>
-            <a:off x="1266825" y="833437"/>
-            <a:ext cx="9658350" cy="5191125"/>
-          </a:xfrm>
-          <a:prstGeom prst="rect">
-            <a:avLst/>
-          </a:prstGeom>
-        </p:spPr>
-      </p:pic>
+          <p:cNvSpPr>
+            <a:spLocks noGrp="1"/>
+          </p:cNvSpPr>
+          <p:nvPr>
+            <p:ph type="title"/>
+          </p:nvPr>
+        </p:nvSpPr>
+        <p:spPr/>
+        <p:txBody>
+          <a:bodyPr>
+            <a:noAutofit/>
+          </a:bodyPr>
+          <a:lstStyle/>
+          <a:p>
+            <a:r>
+              <a:rPr lang="en-US" sz="5400" dirty="0">
+                <a:latin typeface="Roboto" panose="02000000000000000000" pitchFamily="2" charset="0"/>
+                <a:ea typeface="Roboto" panose="02000000000000000000" pitchFamily="2" charset="0"/>
+                <a:cs typeface="Roboto" panose="02000000000000000000" pitchFamily="2" charset="0"/>
+              </a:rPr>
+              <a:t>Data Analysis </a:t>
+            </a:r>
+            <a:r>
+              <a:rPr lang="en-US" sz="5400" dirty="0" err="1">
+                <a:latin typeface="Roboto" panose="02000000000000000000" pitchFamily="2" charset="0"/>
+                <a:ea typeface="Roboto" panose="02000000000000000000" pitchFamily="2" charset="0"/>
+                <a:cs typeface="Roboto" panose="02000000000000000000" pitchFamily="2" charset="0"/>
+              </a:rPr>
+              <a:t>Cont</a:t>
+            </a:r>
+            <a:r>
+              <a:rPr lang="en-US" sz="5400" dirty="0">
+                <a:latin typeface="Roboto" panose="02000000000000000000" pitchFamily="2" charset="0"/>
+                <a:ea typeface="Roboto" panose="02000000000000000000" pitchFamily="2" charset="0"/>
+                <a:cs typeface="Roboto" panose="02000000000000000000" pitchFamily="2" charset="0"/>
+              </a:rPr>
+              <a:t>…</a:t>
+            </a:r>
+          </a:p>
+        </p:txBody>
+      </p:sp>
+      <p:sp>
+        <p:nvSpPr>
+          <p:cNvPr id="3" name="Content Placeholder 2">
+            <a:extLst>
+              <a:ext uri="{FF2B5EF4-FFF2-40B4-BE49-F238E27FC236}">
+                <a16:creationId xmlns:a16="http://schemas.microsoft.com/office/drawing/2014/main" id="{74CD5CB9-2678-608B-B4E7-852FEFB793BD}"/>
+              </a:ext>
+            </a:extLst>
+          </p:cNvPr>
+          <p:cNvSpPr>
+            <a:spLocks noGrp="1"/>
+          </p:cNvSpPr>
+          <p:nvPr>
+            <p:ph idx="1"/>
+          </p:nvPr>
+        </p:nvSpPr>
+        <p:spPr/>
+        <p:txBody>
+          <a:bodyPr>
+            <a:normAutofit/>
+          </a:bodyPr>
+          <a:lstStyle/>
+          <a:p>
+            <a:r>
+              <a:rPr lang="en-US" sz="2400" b="1" dirty="0">
+                <a:latin typeface="Arial" panose="020B0604020202020204" pitchFamily="34" charset="0"/>
+                <a:cs typeface="Arial" panose="020B0604020202020204" pitchFamily="34" charset="0"/>
+              </a:rPr>
+              <a:t>Visualization 2</a:t>
+            </a:r>
+            <a:r>
+              <a:rPr lang="en-US" sz="2400" dirty="0">
+                <a:latin typeface="Arial" panose="020B0604020202020204" pitchFamily="34" charset="0"/>
+                <a:cs typeface="Arial" panose="020B0604020202020204" pitchFamily="34" charset="0"/>
+              </a:rPr>
+              <a:t>: Yearly Trend in Aviation Accidents (Line Chart)</a:t>
+            </a:r>
+          </a:p>
+          <a:p>
+            <a:pPr>
+              <a:buFont typeface="Arial" panose="020B0604020202020204" pitchFamily="34" charset="0"/>
+              <a:buChar char="•"/>
+            </a:pPr>
+            <a:r>
+              <a:rPr lang="en-US" sz="2400" b="1" dirty="0">
+                <a:latin typeface="Arial" panose="020B0604020202020204" pitchFamily="34" charset="0"/>
+                <a:cs typeface="Arial" panose="020B0604020202020204" pitchFamily="34" charset="0"/>
+              </a:rPr>
+              <a:t>Insight</a:t>
+            </a:r>
+            <a:r>
+              <a:rPr lang="en-US" sz="2400" dirty="0">
+                <a:latin typeface="Arial" panose="020B0604020202020204" pitchFamily="34" charset="0"/>
+                <a:cs typeface="Arial" panose="020B0604020202020204" pitchFamily="34" charset="0"/>
+              </a:rPr>
+              <a:t>: A declining trend in accidents since the 1980s, reflecting technological advancements and improved safety practices. Modern aircraft are safer due to enhanced navigation, automation, and design improvements.</a:t>
+            </a:r>
+          </a:p>
+          <a:p>
+            <a:pPr>
+              <a:buFont typeface="Arial" panose="020B0604020202020204" pitchFamily="34" charset="0"/>
+              <a:buChar char="•"/>
+            </a:pPr>
+            <a:r>
+              <a:rPr lang="en-US" sz="2400" b="1" dirty="0">
+                <a:latin typeface="Arial" panose="020B0604020202020204" pitchFamily="34" charset="0"/>
+                <a:cs typeface="Arial" panose="020B0604020202020204" pitchFamily="34" charset="0"/>
+              </a:rPr>
+              <a:t>Business Recommendation</a:t>
+            </a:r>
+            <a:r>
+              <a:rPr lang="en-US" sz="2400" dirty="0">
+                <a:latin typeface="Arial" panose="020B0604020202020204" pitchFamily="34" charset="0"/>
+                <a:cs typeface="Arial" panose="020B0604020202020204" pitchFamily="34" charset="0"/>
+              </a:rPr>
+              <a:t>: Invest in newer aircraft models equipped with modern safety technologies, including automated navigation systems.</a:t>
+            </a:r>
+          </a:p>
+        </p:txBody>
+      </p:sp>
     </p:spTree>
     <p:extLst>
       <p:ext uri="{BB962C8B-B14F-4D97-AF65-F5344CB8AC3E}">
-        <p14:creationId xmlns:p14="http://schemas.microsoft.com/office/powerpoint/2010/main" val="3844785527"/>
+        <p14:creationId xmlns:p14="http://schemas.microsoft.com/office/powerpoint/2010/main" val="1657394520"/>
       </p:ext>
     </p:extLst>
   </p:cSld>
@@ -6085,15 +6364,6 @@
 </file>
 
 <file path=customXml/item1.xml><?xml version="1.0" encoding="utf-8"?>
-<?mso-contentType ?>
-<FormTemplates xmlns="http://schemas.microsoft.com/sharepoint/v3/contenttype/forms">
-  <Display>DocumentLibraryForm</Display>
-  <Edit>DocumentLibraryForm</Edit>
-  <New>DocumentLibraryForm</New>
-</FormTemplates>
-</file>
-
-<file path=customXml/item2.xml><?xml version="1.0" encoding="utf-8"?>
 <p:properties xmlns:p="http://schemas.microsoft.com/office/2006/metadata/properties" xmlns:xsi="http://www.w3.org/2001/XMLSchema-instance" xmlns:pc="http://schemas.microsoft.com/office/infopath/2007/PartnerControls">
   <documentManagement>
     <_ip_UnifiedCompliancePolicyUIAction xmlns="http://schemas.microsoft.com/sharepoint/v3" xsi:nil="true"/>
@@ -6111,6 +6381,15 @@
     <MediaServiceKeyPoints xmlns="71af3243-3dd4-4a8d-8c0d-dd76da1f02a5" xsi:nil="true"/>
   </documentManagement>
 </p:properties>
+</file>
+
+<file path=customXml/item2.xml><?xml version="1.0" encoding="utf-8"?>
+<?mso-contentType ?>
+<FormTemplates xmlns="http://schemas.microsoft.com/sharepoint/v3/contenttype/forms">
+  <Display>DocumentLibraryForm</Display>
+  <Edit>DocumentLibraryForm</Edit>
+  <New>DocumentLibraryForm</New>
+</FormTemplates>
 </file>
 
 <file path=customXml/item3.xml><?xml version="1.0" encoding="utf-8"?>
@@ -6420,14 +6699,6 @@
 </file>
 
 <file path=customXml/itemProps1.xml><?xml version="1.0" encoding="utf-8"?>
-<ds:datastoreItem xmlns:ds="http://schemas.openxmlformats.org/officeDocument/2006/customXml" ds:itemID="{19DAD249-BF80-48EF-9AFB-36A11BCDC2CE}">
-  <ds:schemaRefs>
-    <ds:schemaRef ds:uri="http://schemas.microsoft.com/sharepoint/v3/contenttype/forms"/>
-  </ds:schemaRefs>
-</ds:datastoreItem>
-</file>
-
-<file path=customXml/itemProps2.xml><?xml version="1.0" encoding="utf-8"?>
 <ds:datastoreItem xmlns:ds="http://schemas.openxmlformats.org/officeDocument/2006/customXml" ds:itemID="{6F4F4D41-822D-40F2-A7AC-E4E6CB36CA7A}">
   <ds:schemaRefs>
     <ds:schemaRef ds:uri="http://schemas.microsoft.com/office/2006/metadata/properties"/>
@@ -6435,6 +6706,14 @@
     <ds:schemaRef ds:uri="http://schemas.microsoft.com/sharepoint/v3"/>
     <ds:schemaRef ds:uri="71af3243-3dd4-4a8d-8c0d-dd76da1f02a5"/>
     <ds:schemaRef ds:uri="230e9df3-be65-4c73-a93b-d1236ebd677e"/>
+  </ds:schemaRefs>
+</ds:datastoreItem>
+</file>
+
+<file path=customXml/itemProps2.xml><?xml version="1.0" encoding="utf-8"?>
+<ds:datastoreItem xmlns:ds="http://schemas.openxmlformats.org/officeDocument/2006/customXml" ds:itemID="{19DAD249-BF80-48EF-9AFB-36A11BCDC2CE}">
+  <ds:schemaRefs>
+    <ds:schemaRef ds:uri="http://schemas.microsoft.com/sharepoint/v3/contenttype/forms"/>
   </ds:schemaRefs>
 </ds:datastoreItem>
 </file>

</xml_diff>